<commit_message>
Updated after final check
</commit_message>
<xml_diff>
--- a/P7_presentation_Berezhnaia.pptx
+++ b/P7_presentation_Berezhnaia.pptx
@@ -12,16 +12,15 @@
     <p:sldId id="322" r:id="rId9"/>
     <p:sldId id="315" r:id="rId10"/>
     <p:sldId id="328" r:id="rId11"/>
-    <p:sldId id="316" r:id="rId12"/>
-    <p:sldId id="317" r:id="rId13"/>
-    <p:sldId id="318" r:id="rId14"/>
-    <p:sldId id="319" r:id="rId15"/>
-    <p:sldId id="320" r:id="rId16"/>
-    <p:sldId id="321" r:id="rId17"/>
-    <p:sldId id="323" r:id="rId18"/>
-    <p:sldId id="326" r:id="rId19"/>
-    <p:sldId id="329" r:id="rId20"/>
-    <p:sldId id="330" r:id="rId21"/>
+    <p:sldId id="317" r:id="rId12"/>
+    <p:sldId id="318" r:id="rId13"/>
+    <p:sldId id="319" r:id="rId14"/>
+    <p:sldId id="320" r:id="rId15"/>
+    <p:sldId id="321" r:id="rId16"/>
+    <p:sldId id="323" r:id="rId17"/>
+    <p:sldId id="326" r:id="rId18"/>
+    <p:sldId id="329" r:id="rId19"/>
+    <p:sldId id="330" r:id="rId20"/>
   </p:sldIdLst>
   <p:sldSz cx="12192000" cy="6858000"/>
   <p:notesSz cx="6858000" cy="9144000"/>
@@ -3408,7 +3407,7 @@
           <a:p>
             <a:fld id="{9184DA70-C731-4C70-880D-CCD4705E623C}" type="datetime1">
               <a:rPr lang="en-US" smtClean="0"/>
-              <a:t>2/16/2022</a:t>
+              <a:t>2/17/2022</a:t>
             </a:fld>
             <a:endParaRPr lang="en-US" dirty="0"/>
           </a:p>
@@ -3596,7 +3595,7 @@
           <a:p>
             <a:fld id="{4BE1D723-8F53-4F53-90B0-1982A396982E}" type="datetime1">
               <a:rPr lang="en-US" smtClean="0"/>
-              <a:t>2/16/2022</a:t>
+              <a:t>2/17/2022</a:t>
             </a:fld>
             <a:endParaRPr lang="en-US" dirty="0"/>
           </a:p>
@@ -3969,7 +3968,7 @@
           <a:p>
             <a:fld id="{97669AF7-7BEB-44E4-9852-375E34362B5B}" type="datetime1">
               <a:rPr lang="en-US" smtClean="0"/>
-              <a:t>2/16/2022</a:t>
+              <a:t>2/17/2022</a:t>
             </a:fld>
             <a:endParaRPr lang="en-US" dirty="0"/>
           </a:p>
@@ -4224,7 +4223,7 @@
           <a:p>
             <a:fld id="{BAAAC38D-0552-4C82-B593-E6124DFADBE2}" type="datetime1">
               <a:rPr lang="en-US" smtClean="0"/>
-              <a:t>2/16/2022</a:t>
+              <a:t>2/17/2022</a:t>
             </a:fld>
             <a:endParaRPr lang="en-US" dirty="0"/>
           </a:p>
@@ -4621,7 +4620,7 @@
           <a:p>
             <a:fld id="{D9DF0F1C-5577-4ACB-BB62-DF8F3C494C7E}" type="datetime1">
               <a:rPr lang="en-US" smtClean="0"/>
-              <a:t>2/16/2022</a:t>
+              <a:t>2/17/2022</a:t>
             </a:fld>
             <a:endParaRPr lang="en-US" dirty="0"/>
           </a:p>
@@ -4757,7 +4756,7 @@
           <a:p>
             <a:fld id="{1775B394-D9F9-4F0C-B15D-605F45CB9E9F}" type="datetime1">
               <a:rPr lang="en-US" smtClean="0"/>
-              <a:t>2/16/2022</a:t>
+              <a:t>2/17/2022</a:t>
             </a:fld>
             <a:endParaRPr lang="en-US" dirty="0"/>
           </a:p>
@@ -4914,7 +4913,7 @@
           <a:p>
             <a:fld id="{39667345-2558-425A-8533-9BFDBCE15005}" type="datetime1">
               <a:rPr lang="en-US" smtClean="0"/>
-              <a:t>2/16/2022</a:t>
+              <a:t>2/17/2022</a:t>
             </a:fld>
             <a:endParaRPr lang="en-US" dirty="0"/>
           </a:p>
@@ -5243,7 +5242,7 @@
           <a:p>
             <a:fld id="{92BEA474-078D-4E9B-9B14-09A87B19DC46}" type="datetime1">
               <a:rPr lang="en-US" smtClean="0"/>
-              <a:t>2/16/2022</a:t>
+              <a:t>2/17/2022</a:t>
             </a:fld>
             <a:endParaRPr lang="en-US" dirty="0"/>
           </a:p>
@@ -5593,7 +5592,7 @@
           <a:p>
             <a:fld id="{4907D986-8816-4272-A432-0437A28A9828}" type="datetime1">
               <a:rPr lang="en-US" smtClean="0"/>
-              <a:t>2/16/2022</a:t>
+              <a:t>2/17/2022</a:t>
             </a:fld>
             <a:endParaRPr lang="en-US" dirty="0"/>
           </a:p>
@@ -5854,7 +5853,7 @@
           <a:p>
             <a:fld id="{62D6E202-B606-4609-B914-27C9371A1F6D}" type="datetime1">
               <a:rPr lang="en-US" smtClean="0"/>
-              <a:t>2/16/2022</a:t>
+              <a:t>2/17/2022</a:t>
             </a:fld>
             <a:endParaRPr lang="en-US" dirty="0"/>
           </a:p>
@@ -7128,224 +7127,6 @@
 <file path=ppt/slides/slide10.xml><?xml version="1.0" encoding="utf-8"?>
 <p:sld xmlns:a="http://schemas.openxmlformats.org/drawingml/2006/main" xmlns:r="http://schemas.openxmlformats.org/officeDocument/2006/relationships" xmlns:p="http://schemas.openxmlformats.org/presentationml/2006/main">
   <p:cSld>
-    <p:spTree>
-      <p:nvGrpSpPr>
-        <p:cNvPr id="1" name=""/>
-        <p:cNvGrpSpPr/>
-        <p:nvPr/>
-      </p:nvGrpSpPr>
-      <p:grpSpPr>
-        <a:xfrm>
-          <a:off x="0" y="0"/>
-          <a:ext cx="0" cy="0"/>
-          <a:chOff x="0" y="0"/>
-          <a:chExt cx="0" cy="0"/>
-        </a:xfrm>
-      </p:grpSpPr>
-      <p:sp>
-        <p:nvSpPr>
-          <p:cNvPr id="9" name="Oval 8">
-            <a:extLst>
-              <a:ext uri="{FF2B5EF4-FFF2-40B4-BE49-F238E27FC236}">
-                <a16:creationId xmlns:a16="http://schemas.microsoft.com/office/drawing/2014/main" id="{DD904C89-17FF-4245-9834-6A54E894DF3A}"/>
-              </a:ext>
-            </a:extLst>
-          </p:cNvPr>
-          <p:cNvSpPr/>
-          <p:nvPr/>
-        </p:nvSpPr>
-        <p:spPr>
-          <a:xfrm>
-            <a:off x="7822342" y="3010537"/>
-            <a:ext cx="1818562" cy="1818562"/>
-          </a:xfrm>
-          <a:prstGeom prst="ellipse">
-            <a:avLst/>
-          </a:prstGeom>
-          <a:solidFill>
-            <a:schemeClr val="accent1"/>
-          </a:solidFill>
-        </p:spPr>
-        <p:style>
-          <a:lnRef idx="0">
-            <a:schemeClr val="lt1">
-              <a:alpha val="0"/>
-              <a:hueOff val="0"/>
-              <a:satOff val="0"/>
-              <a:lumOff val="0"/>
-              <a:alphaOff val="0"/>
-            </a:schemeClr>
-          </a:lnRef>
-          <a:fillRef idx="1">
-            <a:schemeClr val="accent2">
-              <a:hueOff val="0"/>
-              <a:satOff val="0"/>
-              <a:lumOff val="0"/>
-              <a:alphaOff val="0"/>
-            </a:schemeClr>
-          </a:fillRef>
-          <a:effectRef idx="0">
-            <a:schemeClr val="accent2">
-              <a:hueOff val="0"/>
-              <a:satOff val="0"/>
-              <a:lumOff val="0"/>
-              <a:alphaOff val="0"/>
-            </a:schemeClr>
-          </a:effectRef>
-          <a:fontRef idx="minor"/>
-        </p:style>
-      </p:sp>
-      <p:sp>
-        <p:nvSpPr>
-          <p:cNvPr id="2" name="Title 1">
-            <a:extLst>
-              <a:ext uri="{FF2B5EF4-FFF2-40B4-BE49-F238E27FC236}">
-                <a16:creationId xmlns:a16="http://schemas.microsoft.com/office/drawing/2014/main" id="{F3A2D1F6-6AB5-447A-B281-C0DF40125FC7}"/>
-              </a:ext>
-            </a:extLst>
-          </p:cNvPr>
-          <p:cNvSpPr>
-            <a:spLocks noGrp="1"/>
-          </p:cNvSpPr>
-          <p:nvPr>
-            <p:ph type="title"/>
-          </p:nvPr>
-        </p:nvSpPr>
-        <p:spPr/>
-        <p:txBody>
-          <a:bodyPr/>
-          <a:lstStyle/>
-          <a:p>
-            <a:r>
-              <a:rPr lang="fr-FR" dirty="0"/>
-              <a:t>Préparation finale</a:t>
-            </a:r>
-          </a:p>
-        </p:txBody>
-      </p:sp>
-      <p:sp>
-        <p:nvSpPr>
-          <p:cNvPr id="3" name="Content Placeholder 2">
-            <a:extLst>
-              <a:ext uri="{FF2B5EF4-FFF2-40B4-BE49-F238E27FC236}">
-                <a16:creationId xmlns:a16="http://schemas.microsoft.com/office/drawing/2014/main" id="{9251A13F-4438-4EA3-A93C-694B899DF5E7}"/>
-              </a:ext>
-            </a:extLst>
-          </p:cNvPr>
-          <p:cNvSpPr>
-            <a:spLocks noGrp="1"/>
-          </p:cNvSpPr>
-          <p:nvPr>
-            <p:ph sz="half" idx="1"/>
-          </p:nvPr>
-        </p:nvSpPr>
-        <p:spPr/>
-        <p:txBody>
-          <a:bodyPr/>
-          <a:lstStyle/>
-          <a:p>
-            <a:r>
-              <a:rPr lang="fr-FR" dirty="0"/>
-              <a:t>Tailler le jeu de données </a:t>
-            </a:r>
-            <a:r>
-              <a:rPr lang="fr-FR" dirty="0" err="1"/>
-              <a:t>por</a:t>
-            </a:r>
-            <a:r>
-              <a:rPr lang="fr-FR" dirty="0"/>
-              <a:t> réduire le temps d’exécution de notebook</a:t>
-            </a:r>
-          </a:p>
-          <a:p>
-            <a:r>
-              <a:rPr lang="fr-FR" dirty="0"/>
-              <a:t>Comment: </a:t>
-            </a:r>
-          </a:p>
-          <a:p>
-            <a:pPr lvl="1">
-              <a:buFont typeface="Arial" panose="020B0604020202020204" pitchFamily="34" charset="0"/>
-              <a:buChar char="•"/>
-            </a:pPr>
-            <a:r>
-              <a:rPr lang="fr-FR" dirty="0"/>
-              <a:t>Lancer le notebook avec l’ensemble entier des variables</a:t>
-            </a:r>
-          </a:p>
-          <a:p>
-            <a:pPr lvl="1">
-              <a:buFont typeface="Arial" panose="020B0604020202020204" pitchFamily="34" charset="0"/>
-              <a:buChar char="•"/>
-            </a:pPr>
-            <a:r>
-              <a:rPr lang="fr-FR" dirty="0"/>
-              <a:t>Tenter d’éliminer toutes les valeurs sauf les plus pertinents</a:t>
-            </a:r>
-          </a:p>
-          <a:p>
-            <a:pPr lvl="1">
-              <a:buFont typeface="Arial" panose="020B0604020202020204" pitchFamily="34" charset="0"/>
-              <a:buChar char="•"/>
-            </a:pPr>
-            <a:r>
-              <a:rPr lang="fr-FR" dirty="0"/>
-              <a:t>Voir à quel point tombe la performance du modèle (4%)</a:t>
-            </a:r>
-          </a:p>
-        </p:txBody>
-      </p:sp>
-      <p:pic>
-        <p:nvPicPr>
-          <p:cNvPr id="8" name="Content Placeholder 7" descr="Alterations &amp; Tailoring with solid fill">
-            <a:extLst>
-              <a:ext uri="{FF2B5EF4-FFF2-40B4-BE49-F238E27FC236}">
-                <a16:creationId xmlns:a16="http://schemas.microsoft.com/office/drawing/2014/main" id="{04F1173A-B67A-42DB-8614-0F368147BE77}"/>
-              </a:ext>
-            </a:extLst>
-          </p:cNvPr>
-          <p:cNvPicPr>
-            <a:picLocks noGrp="1" noChangeAspect="1"/>
-          </p:cNvPicPr>
-          <p:nvPr>
-            <p:ph sz="half" idx="2"/>
-          </p:nvPr>
-        </p:nvPicPr>
-        <p:blipFill>
-          <a:blip r:embed="rId2">
-            <a:extLst>
-              <a:ext uri="{96DAC541-7B7A-43D3-8B79-37D633B846F1}">
-                <asvg:svgBlip xmlns:asvg="http://schemas.microsoft.com/office/drawing/2016/SVG/main" r:embed="rId3"/>
-              </a:ext>
-            </a:extLst>
-          </a:blip>
-          <a:stretch>
-            <a:fillRect/>
-          </a:stretch>
-        </p:blipFill>
-        <p:spPr>
-          <a:xfrm>
-            <a:off x="8378825" y="3413055"/>
-            <a:ext cx="914400" cy="914400"/>
-          </a:xfrm>
-        </p:spPr>
-      </p:pic>
-    </p:spTree>
-    <p:extLst>
-      <p:ext uri="{BB962C8B-B14F-4D97-AF65-F5344CB8AC3E}">
-        <p14:creationId xmlns:p14="http://schemas.microsoft.com/office/powerpoint/2010/main" val="1299145213"/>
-      </p:ext>
-    </p:extLst>
-  </p:cSld>
-  <p:clrMapOvr>
-    <a:masterClrMapping/>
-  </p:clrMapOvr>
-</p:sld>
-</file>
-
-<file path=ppt/slides/slide11.xml><?xml version="1.0" encoding="utf-8"?>
-<p:sld xmlns:a="http://schemas.openxmlformats.org/drawingml/2006/main" xmlns:r="http://schemas.openxmlformats.org/officeDocument/2006/relationships" xmlns:p="http://schemas.openxmlformats.org/presentationml/2006/main">
-  <p:cSld>
     <p:bg>
       <p:bgPr>
         <a:solidFill>
@@ -7873,7 +7654,7 @@
 </p:sld>
 </file>
 
-<file path=ppt/slides/slide12.xml><?xml version="1.0" encoding="utf-8"?>
+<file path=ppt/slides/slide11.xml><?xml version="1.0" encoding="utf-8"?>
 <p:sld xmlns:a="http://schemas.openxmlformats.org/drawingml/2006/main" xmlns:r="http://schemas.openxmlformats.org/officeDocument/2006/relationships" xmlns:p="http://schemas.openxmlformats.org/presentationml/2006/main">
   <p:cSld>
     <p:spTree>
@@ -8457,7 +8238,7 @@
 </p:sld>
 </file>
 
-<file path=ppt/slides/slide13.xml><?xml version="1.0" encoding="utf-8"?>
+<file path=ppt/slides/slide12.xml><?xml version="1.0" encoding="utf-8"?>
 <p:sld xmlns:a="http://schemas.openxmlformats.org/drawingml/2006/main" xmlns:r="http://schemas.openxmlformats.org/officeDocument/2006/relationships" xmlns:p="http://schemas.openxmlformats.org/presentationml/2006/main">
   <p:cSld>
     <p:bg>
@@ -8915,7 +8696,7 @@
 </p:sld>
 </file>
 
-<file path=ppt/slides/slide14.xml><?xml version="1.0" encoding="utf-8"?>
+<file path=ppt/slides/slide13.xml><?xml version="1.0" encoding="utf-8"?>
 <p:sld xmlns:a="http://schemas.openxmlformats.org/drawingml/2006/main" xmlns:r="http://schemas.openxmlformats.org/officeDocument/2006/relationships" xmlns:p="http://schemas.openxmlformats.org/presentationml/2006/main">
   <p:cSld>
     <p:bg>
@@ -9311,7 +9092,7 @@
 </p:sld>
 </file>
 
-<file path=ppt/slides/slide15.xml><?xml version="1.0" encoding="utf-8"?>
+<file path=ppt/slides/slide14.xml><?xml version="1.0" encoding="utf-8"?>
 <p:sld xmlns:a="http://schemas.openxmlformats.org/drawingml/2006/main" xmlns:r="http://schemas.openxmlformats.org/officeDocument/2006/relationships" xmlns:p="http://schemas.openxmlformats.org/presentationml/2006/main">
   <p:cSld>
     <p:bg>
@@ -9928,7 +9709,7 @@
 </p:sld>
 </file>
 
-<file path=ppt/slides/slide16.xml><?xml version="1.0" encoding="utf-8"?>
+<file path=ppt/slides/slide15.xml><?xml version="1.0" encoding="utf-8"?>
 <p:sld xmlns:a="http://schemas.openxmlformats.org/drawingml/2006/main" xmlns:r="http://schemas.openxmlformats.org/officeDocument/2006/relationships" xmlns:p="http://schemas.openxmlformats.org/presentationml/2006/main">
   <p:cSld>
     <p:bg>
@@ -10521,8 +10302,8 @@
         </p:blipFill>
         <p:spPr bwMode="auto">
           <a:xfrm>
-            <a:off x="475926" y="3984926"/>
-            <a:ext cx="5125410" cy="2495968"/>
+            <a:off x="285911" y="4090208"/>
+            <a:ext cx="4921409" cy="2396623"/>
           </a:xfrm>
           <a:prstGeom prst="rect">
             <a:avLst/>
@@ -10552,7 +10333,7 @@
 </p:sld>
 </file>
 
-<file path=ppt/slides/slide17.xml><?xml version="1.0" encoding="utf-8"?>
+<file path=ppt/slides/slide16.xml><?xml version="1.0" encoding="utf-8"?>
 <p:sld xmlns:a="http://schemas.openxmlformats.org/drawingml/2006/main" xmlns:r="http://schemas.openxmlformats.org/officeDocument/2006/relationships" xmlns:p="http://schemas.openxmlformats.org/presentationml/2006/main">
   <p:cSld>
     <p:bg>
@@ -15162,14 +14943,6 @@
 <file path=ppt/slides/slide8.xml><?xml version="1.0" encoding="utf-8"?>
 <p:sld xmlns:a="http://schemas.openxmlformats.org/drawingml/2006/main" xmlns:r="http://schemas.openxmlformats.org/officeDocument/2006/relationships" xmlns:p="http://schemas.openxmlformats.org/presentationml/2006/main">
   <p:cSld>
-    <p:bg>
-      <p:bgPr>
-        <a:solidFill>
-          <a:schemeClr val="bg1"/>
-        </a:solidFill>
-        <a:effectLst/>
-      </p:bgPr>
-    </p:bg>
     <p:spTree>
       <p:nvGrpSpPr>
         <p:cNvPr id="1" name=""/>
@@ -15186,180 +14959,10 @@
       </p:grpSpPr>
       <p:sp>
         <p:nvSpPr>
-          <p:cNvPr id="2066" name="Rectangle 148">
-            <a:extLst>
-              <a:ext uri="{FF2B5EF4-FFF2-40B4-BE49-F238E27FC236}">
-                <a16:creationId xmlns:a16="http://schemas.microsoft.com/office/drawing/2014/main" id="{416A0E3C-60E6-4F39-BC55-5F7C224E1F7C}"/>
-              </a:ext>
-              <a:ext uri="{C183D7F6-B498-43B3-948B-1728B52AA6E4}">
-                <adec:decorative xmlns:adec="http://schemas.microsoft.com/office/drawing/2017/decorative" val="1"/>
-              </a:ext>
-            </a:extLst>
-          </p:cNvPr>
-          <p:cNvSpPr>
-            <a:spLocks noGrp="1" noRot="1" noChangeAspect="1" noMove="1" noResize="1" noEditPoints="1" noAdjustHandles="1" noChangeArrowheads="1" noChangeShapeType="1" noTextEdit="1"/>
-          </p:cNvSpPr>
-          <p:nvPr>
-            <p:extLst>
-              <p:ext uri="{386F3935-93C4-4BCD-93E2-E3B085C9AB24}">
-                <p16:designElem xmlns:p16="http://schemas.microsoft.com/office/powerpoint/2015/main" val="1"/>
-              </p:ext>
-            </p:extLst>
-          </p:nvPr>
-        </p:nvSpPr>
-        <p:spPr>
-          <a:xfrm>
-            <a:off x="3175" y="6400800"/>
-            <a:ext cx="12188825" cy="457200"/>
-          </a:xfrm>
-          <a:prstGeom prst="rect">
-            <a:avLst/>
-          </a:prstGeom>
-          <a:solidFill>
-            <a:srgbClr val="262626"/>
-          </a:solidFill>
-          <a:ln>
-            <a:noFill/>
-          </a:ln>
-        </p:spPr>
-        <p:style>
-          <a:lnRef idx="2">
-            <a:schemeClr val="accent1">
-              <a:shade val="50000"/>
-            </a:schemeClr>
-          </a:lnRef>
-          <a:fillRef idx="1">
-            <a:schemeClr val="accent1"/>
-          </a:fillRef>
-          <a:effectRef idx="0">
-            <a:schemeClr val="accent1"/>
-          </a:effectRef>
-          <a:fontRef idx="minor">
-            <a:schemeClr val="lt1"/>
-          </a:fontRef>
-        </p:style>
-      </p:sp>
-      <p:cxnSp>
-        <p:nvCxnSpPr>
-          <p:cNvPr id="2067" name="Straight Connector 150">
-            <a:extLst>
-              <a:ext uri="{FF2B5EF4-FFF2-40B4-BE49-F238E27FC236}">
-                <a16:creationId xmlns:a16="http://schemas.microsoft.com/office/drawing/2014/main" id="{C5025DAC-8B93-4160-B017-3A274A5828C0}"/>
-              </a:ext>
-              <a:ext uri="{C183D7F6-B498-43B3-948B-1728B52AA6E4}">
-                <adec:decorative xmlns:adec="http://schemas.microsoft.com/office/drawing/2017/decorative" val="1"/>
-              </a:ext>
-            </a:extLst>
-          </p:cNvPr>
-          <p:cNvCxnSpPr>
-            <a:cxnSpLocks noGrp="1" noRot="1" noChangeAspect="1" noMove="1" noResize="1" noEditPoints="1" noAdjustHandles="1" noChangeArrowheads="1" noChangeShapeType="1"/>
-          </p:cNvCxnSpPr>
-          <p:nvPr>
-            <p:extLst>
-              <p:ext uri="{386F3935-93C4-4BCD-93E2-E3B085C9AB24}">
-                <p16:designElem xmlns:p16="http://schemas.microsoft.com/office/powerpoint/2015/main" val="1"/>
-              </p:ext>
-            </p:extLst>
-          </p:nvPr>
-        </p:nvCxnSpPr>
-        <p:spPr>
-          <a:xfrm>
-            <a:off x="1193532" y="1897380"/>
-            <a:ext cx="9966960" cy="0"/>
-          </a:xfrm>
-          <a:prstGeom prst="line">
-            <a:avLst/>
-          </a:prstGeom>
-          <a:ln w="12700">
-            <a:solidFill>
-              <a:schemeClr val="tx1">
-                <a:lumMod val="75000"/>
-                <a:lumOff val="25000"/>
-              </a:schemeClr>
-            </a:solidFill>
-          </a:ln>
-        </p:spPr>
-        <p:style>
-          <a:lnRef idx="1">
-            <a:schemeClr val="accent1"/>
-          </a:lnRef>
-          <a:fillRef idx="0">
-            <a:schemeClr val="accent1"/>
-          </a:fillRef>
-          <a:effectRef idx="0">
-            <a:schemeClr val="accent1"/>
-          </a:effectRef>
-          <a:fontRef idx="minor">
-            <a:schemeClr val="tx1"/>
-          </a:fontRef>
-        </p:style>
-      </p:cxnSp>
-      <p:sp useBgFill="1">
-        <p:nvSpPr>
-          <p:cNvPr id="2068" name="Rectangle 152">
-            <a:extLst>
-              <a:ext uri="{FF2B5EF4-FFF2-40B4-BE49-F238E27FC236}">
-                <a16:creationId xmlns:a16="http://schemas.microsoft.com/office/drawing/2014/main" id="{990D0034-F768-41E7-85D4-F38C4DE85770}"/>
-              </a:ext>
-              <a:ext uri="{C183D7F6-B498-43B3-948B-1728B52AA6E4}">
-                <adec:decorative xmlns:adec="http://schemas.microsoft.com/office/drawing/2017/decorative" val="1"/>
-              </a:ext>
-            </a:extLst>
-          </p:cNvPr>
-          <p:cNvSpPr>
-            <a:spLocks noGrp="1" noRot="1" noChangeAspect="1" noMove="1" noResize="1" noEditPoints="1" noAdjustHandles="1" noChangeArrowheads="1" noChangeShapeType="1" noTextEdit="1"/>
-          </p:cNvSpPr>
-          <p:nvPr>
-            <p:extLst>
-              <p:ext uri="{386F3935-93C4-4BCD-93E2-E3B085C9AB24}">
-                <p16:designElem xmlns:p16="http://schemas.microsoft.com/office/powerpoint/2015/main" val="1"/>
-              </p:ext>
-            </p:extLst>
-          </p:nvPr>
-        </p:nvSpPr>
-        <p:spPr>
-          <a:xfrm>
-            <a:off x="5685" y="0"/>
-            <a:ext cx="12186315" cy="6858000"/>
-          </a:xfrm>
-          <a:prstGeom prst="rect">
-            <a:avLst/>
-          </a:prstGeom>
-          <a:ln>
-            <a:noFill/>
-          </a:ln>
-        </p:spPr>
-        <p:style>
-          <a:lnRef idx="2">
-            <a:schemeClr val="accent6">
-              <a:shade val="50000"/>
-            </a:schemeClr>
-          </a:lnRef>
-          <a:fillRef idx="1001">
-            <a:schemeClr val="lt1"/>
-          </a:fillRef>
-          <a:effectRef idx="0">
-            <a:schemeClr val="accent6"/>
-          </a:effectRef>
-          <a:fontRef idx="minor">
-            <a:schemeClr val="lt1"/>
-          </a:fontRef>
-        </p:style>
-        <p:txBody>
-          <a:bodyPr rtlCol="0" anchor="ctr"/>
-          <a:lstStyle/>
-          <a:p>
-            <a:pPr algn="ctr"/>
-            <a:endParaRPr lang="en-US"/>
-          </a:p>
-        </p:txBody>
-      </p:sp>
-      <p:sp>
-        <p:nvSpPr>
           <p:cNvPr id="5" name="Title 4">
             <a:extLst>
               <a:ext uri="{FF2B5EF4-FFF2-40B4-BE49-F238E27FC236}">
-                <a16:creationId xmlns:a16="http://schemas.microsoft.com/office/drawing/2014/main" id="{3F6AD94F-39C9-4A63-8D35-DBABBB6B4B23}"/>
+                <a16:creationId xmlns:a16="http://schemas.microsoft.com/office/drawing/2014/main" id="{DB4ABC5D-0F6B-4CFA-9F86-93C8623A8BF7}"/>
               </a:ext>
             </a:extLst>
           </p:cNvPr>
@@ -15370,329 +14973,28 @@
             <p:ph type="title"/>
           </p:nvPr>
         </p:nvSpPr>
-        <p:spPr>
-          <a:xfrm>
-            <a:off x="8614786" y="516836"/>
-            <a:ext cx="3100136" cy="1960234"/>
-          </a:xfrm>
-        </p:spPr>
+        <p:spPr/>
         <p:txBody>
-          <a:bodyPr vert="horz" lIns="91440" tIns="45720" rIns="91440" bIns="45720" rtlCol="0" anchor="b">
-            <a:normAutofit/>
-          </a:bodyPr>
+          <a:bodyPr/>
           <a:lstStyle/>
           <a:p>
             <a:r>
-              <a:rPr lang="en-US" sz="4000" b="1" dirty="0" err="1">
-                <a:solidFill>
-                  <a:schemeClr val="tx1">
-                    <a:lumMod val="75000"/>
-                    <a:lumOff val="25000"/>
-                  </a:schemeClr>
-                </a:solidFill>
-              </a:rPr>
-              <a:t>L’analyse</a:t>
-            </a:r>
-            <a:r>
-              <a:rPr lang="en-US" sz="4000" b="1" dirty="0">
-                <a:solidFill>
-                  <a:schemeClr val="tx1">
-                    <a:lumMod val="75000"/>
-                    <a:lumOff val="25000"/>
-                  </a:schemeClr>
-                </a:solidFill>
-              </a:rPr>
-              <a:t> des </a:t>
-            </a:r>
-            <a:r>
-              <a:rPr lang="en-US" sz="4000" b="1" dirty="0" err="1">
-                <a:solidFill>
-                  <a:schemeClr val="tx1">
-                    <a:lumMod val="75000"/>
-                    <a:lumOff val="25000"/>
-                  </a:schemeClr>
-                </a:solidFill>
-              </a:rPr>
-              <a:t>données</a:t>
-            </a:r>
-            <a:r>
-              <a:rPr lang="en-US" sz="4000" b="1" dirty="0">
-                <a:solidFill>
-                  <a:schemeClr val="tx1">
-                    <a:lumMod val="75000"/>
-                    <a:lumOff val="25000"/>
-                  </a:schemeClr>
-                </a:solidFill>
-              </a:rPr>
-              <a:t> </a:t>
-            </a:r>
-            <a:r>
-              <a:rPr lang="en-US" sz="4000" b="1" dirty="0" err="1">
-                <a:solidFill>
-                  <a:schemeClr val="tx1">
-                    <a:lumMod val="75000"/>
-                    <a:lumOff val="25000"/>
-                  </a:schemeClr>
-                </a:solidFill>
-              </a:rPr>
-              <a:t>exploratoire</a:t>
-            </a:r>
-            <a:endParaRPr lang="en-US" sz="4000" dirty="0">
-              <a:solidFill>
-                <a:schemeClr val="tx1">
-                  <a:lumMod val="75000"/>
-                  <a:lumOff val="25000"/>
-                </a:schemeClr>
-              </a:solidFill>
-            </a:endParaRPr>
+              <a:rPr lang="fr-FR" dirty="0" err="1"/>
+              <a:t>Dependent</a:t>
+            </a:r>
+            <a:r>
+              <a:rPr lang="fr-FR" dirty="0"/>
+              <a:t> tables</a:t>
+            </a:r>
           </a:p>
         </p:txBody>
       </p:sp>
-      <p:pic>
-        <p:nvPicPr>
-          <p:cNvPr id="2056" name="Picture 8">
+      <p:sp>
+        <p:nvSpPr>
+          <p:cNvPr id="6" name="Content Placeholder 5">
             <a:extLst>
               <a:ext uri="{FF2B5EF4-FFF2-40B4-BE49-F238E27FC236}">
-                <a16:creationId xmlns:a16="http://schemas.microsoft.com/office/drawing/2014/main" id="{85BC3073-AC21-4800-B053-870AF1284C4A}"/>
-              </a:ext>
-            </a:extLst>
-          </p:cNvPr>
-          <p:cNvPicPr>
-            <a:picLocks noChangeAspect="1" noChangeArrowheads="1"/>
-          </p:cNvPicPr>
-          <p:nvPr/>
-        </p:nvPicPr>
-        <p:blipFill>
-          <a:blip r:embed="rId2">
-            <a:extLst>
-              <a:ext uri="{28A0092B-C50C-407E-A947-70E740481C1C}">
-                <a14:useLocalDpi xmlns:a14="http://schemas.microsoft.com/office/drawing/2010/main" val="0"/>
-              </a:ext>
-            </a:extLst>
-          </a:blip>
-          <a:stretch>
-            <a:fillRect/>
-          </a:stretch>
-        </p:blipFill>
-        <p:spPr bwMode="auto">
-          <a:xfrm>
-            <a:off x="643468" y="750708"/>
-            <a:ext cx="3583439" cy="2410181"/>
-          </a:xfrm>
-          <a:prstGeom prst="rect">
-            <a:avLst/>
-          </a:prstGeom>
-          <a:noFill/>
-          <a:extLst>
-            <a:ext uri="{909E8E84-426E-40DD-AFC4-6F175D3DCCD1}">
-              <a14:hiddenFill xmlns:a14="http://schemas.microsoft.com/office/drawing/2010/main">
-                <a:solidFill>
-                  <a:srgbClr val="FFFFFF"/>
-                </a:solidFill>
-              </a14:hiddenFill>
-            </a:ext>
-          </a:extLst>
-        </p:spPr>
-      </p:pic>
-      <p:pic>
-        <p:nvPicPr>
-          <p:cNvPr id="2062" name="Picture 14" descr="Chart, line chart&#10;&#10;Description automatically generated">
-            <a:extLst>
-              <a:ext uri="{FF2B5EF4-FFF2-40B4-BE49-F238E27FC236}">
-                <a16:creationId xmlns:a16="http://schemas.microsoft.com/office/drawing/2014/main" id="{F2147E39-6094-4C43-9D7E-A08D431302FB}"/>
-              </a:ext>
-            </a:extLst>
-          </p:cNvPr>
-          <p:cNvPicPr>
-            <a:picLocks noChangeAspect="1" noChangeArrowheads="1"/>
-          </p:cNvPicPr>
-          <p:nvPr/>
-        </p:nvPicPr>
-        <p:blipFill>
-          <a:blip r:embed="rId3">
-            <a:extLst>
-              <a:ext uri="{28A0092B-C50C-407E-A947-70E740481C1C}">
-                <a14:useLocalDpi xmlns:a14="http://schemas.microsoft.com/office/drawing/2010/main" val="0"/>
-              </a:ext>
-            </a:extLst>
-          </a:blip>
-          <a:stretch>
-            <a:fillRect/>
-          </a:stretch>
-        </p:blipFill>
-        <p:spPr bwMode="auto">
-          <a:xfrm>
-            <a:off x="4629127" y="303336"/>
-            <a:ext cx="3583439" cy="1881305"/>
-          </a:xfrm>
-          <a:prstGeom prst="rect">
-            <a:avLst/>
-          </a:prstGeom>
-          <a:noFill/>
-          <a:extLst>
-            <a:ext uri="{909E8E84-426E-40DD-AFC4-6F175D3DCCD1}">
-              <a14:hiddenFill xmlns:a14="http://schemas.microsoft.com/office/drawing/2010/main">
-                <a:solidFill>
-                  <a:srgbClr val="FFFFFF"/>
-                </a:solidFill>
-              </a14:hiddenFill>
-            </a:ext>
-          </a:extLst>
-        </p:spPr>
-      </p:pic>
-      <p:cxnSp>
-        <p:nvCxnSpPr>
-          <p:cNvPr id="155" name="Straight Connector 154">
-            <a:extLst>
-              <a:ext uri="{FF2B5EF4-FFF2-40B4-BE49-F238E27FC236}">
-                <a16:creationId xmlns:a16="http://schemas.microsoft.com/office/drawing/2014/main" id="{5A0A5CF6-407C-4691-8122-49DF69D0020D}"/>
-              </a:ext>
-              <a:ext uri="{C183D7F6-B498-43B3-948B-1728B52AA6E4}">
-                <adec:decorative xmlns:adec="http://schemas.microsoft.com/office/drawing/2017/decorative" val="1"/>
-              </a:ext>
-            </a:extLst>
-          </p:cNvPr>
-          <p:cNvCxnSpPr>
-            <a:cxnSpLocks noGrp="1" noRot="1" noChangeAspect="1" noMove="1" noResize="1" noEditPoints="1" noAdjustHandles="1" noChangeArrowheads="1" noChangeShapeType="1"/>
-          </p:cNvCxnSpPr>
-          <p:nvPr>
-            <p:extLst>
-              <p:ext uri="{386F3935-93C4-4BCD-93E2-E3B085C9AB24}">
-                <p16:designElem xmlns:p16="http://schemas.microsoft.com/office/powerpoint/2015/main" val="1"/>
-              </p:ext>
-            </p:extLst>
-          </p:nvPr>
-        </p:nvCxnSpPr>
-        <p:spPr>
-          <a:xfrm>
-            <a:off x="8745961" y="2633962"/>
-            <a:ext cx="2834640" cy="0"/>
-          </a:xfrm>
-          <a:prstGeom prst="line">
-            <a:avLst/>
-          </a:prstGeom>
-          <a:ln w="12700">
-            <a:solidFill>
-              <a:schemeClr val="tx1">
-                <a:lumMod val="75000"/>
-                <a:lumOff val="25000"/>
-              </a:schemeClr>
-            </a:solidFill>
-          </a:ln>
-        </p:spPr>
-        <p:style>
-          <a:lnRef idx="1">
-            <a:schemeClr val="accent1"/>
-          </a:lnRef>
-          <a:fillRef idx="0">
-            <a:schemeClr val="accent1"/>
-          </a:fillRef>
-          <a:effectRef idx="0">
-            <a:schemeClr val="accent1"/>
-          </a:effectRef>
-          <a:fontRef idx="minor">
-            <a:schemeClr val="tx1"/>
-          </a:fontRef>
-        </p:style>
-      </p:cxnSp>
-      <p:pic>
-        <p:nvPicPr>
-          <p:cNvPr id="2064" name="Picture 16" descr="Chart, line chart&#10;&#10;Description automatically generated">
-            <a:extLst>
-              <a:ext uri="{FF2B5EF4-FFF2-40B4-BE49-F238E27FC236}">
-                <a16:creationId xmlns:a16="http://schemas.microsoft.com/office/drawing/2014/main" id="{6F7FAA9A-3977-4819-AD96-261CDEEAB17A}"/>
-              </a:ext>
-            </a:extLst>
-          </p:cNvPr>
-          <p:cNvPicPr>
-            <a:picLocks noChangeAspect="1" noChangeArrowheads="1"/>
-          </p:cNvPicPr>
-          <p:nvPr/>
-        </p:nvPicPr>
-        <p:blipFill>
-          <a:blip r:embed="rId4">
-            <a:extLst>
-              <a:ext uri="{28A0092B-C50C-407E-A947-70E740481C1C}">
-                <a14:useLocalDpi xmlns:a14="http://schemas.microsoft.com/office/drawing/2010/main" val="0"/>
-              </a:ext>
-            </a:extLst>
-          </a:blip>
-          <a:stretch>
-            <a:fillRect/>
-          </a:stretch>
-        </p:blipFill>
-        <p:spPr bwMode="auto">
-          <a:xfrm>
-            <a:off x="4554269" y="4382559"/>
-            <a:ext cx="3619330" cy="1873002"/>
-          </a:xfrm>
-          <a:prstGeom prst="rect">
-            <a:avLst/>
-          </a:prstGeom>
-          <a:noFill/>
-          <a:extLst>
-            <a:ext uri="{909E8E84-426E-40DD-AFC4-6F175D3DCCD1}">
-              <a14:hiddenFill xmlns:a14="http://schemas.microsoft.com/office/drawing/2010/main">
-                <a:solidFill>
-                  <a:srgbClr val="FFFFFF"/>
-                </a:solidFill>
-              </a14:hiddenFill>
-            </a:ext>
-          </a:extLst>
-        </p:spPr>
-      </p:pic>
-      <p:pic>
-        <p:nvPicPr>
-          <p:cNvPr id="2060" name="Picture 12" descr="A computer screen capture&#10;&#10;Description automatically generated with low confidence">
-            <a:extLst>
-              <a:ext uri="{FF2B5EF4-FFF2-40B4-BE49-F238E27FC236}">
-                <a16:creationId xmlns:a16="http://schemas.microsoft.com/office/drawing/2014/main" id="{9F6D0935-E95E-4967-975C-F227804FE1D6}"/>
-              </a:ext>
-            </a:extLst>
-          </p:cNvPr>
-          <p:cNvPicPr>
-            <a:picLocks noChangeAspect="1" noChangeArrowheads="1"/>
-          </p:cNvPicPr>
-          <p:nvPr/>
-        </p:nvPicPr>
-        <p:blipFill>
-          <a:blip r:embed="rId5">
-            <a:extLst>
-              <a:ext uri="{28A0092B-C50C-407E-A947-70E740481C1C}">
-                <a14:useLocalDpi xmlns:a14="http://schemas.microsoft.com/office/drawing/2010/main" val="0"/>
-              </a:ext>
-            </a:extLst>
-          </a:blip>
-          <a:stretch>
-            <a:fillRect/>
-          </a:stretch>
-        </p:blipFill>
-        <p:spPr bwMode="auto">
-          <a:xfrm>
-            <a:off x="649005" y="3617119"/>
-            <a:ext cx="3583438" cy="2546605"/>
-          </a:xfrm>
-          <a:prstGeom prst="rect">
-            <a:avLst/>
-          </a:prstGeom>
-          <a:noFill/>
-          <a:extLst>
-            <a:ext uri="{909E8E84-426E-40DD-AFC4-6F175D3DCCD1}">
-              <a14:hiddenFill xmlns:a14="http://schemas.microsoft.com/office/drawing/2010/main">
-                <a:solidFill>
-                  <a:srgbClr val="FFFFFF"/>
-                </a:solidFill>
-              </a14:hiddenFill>
-            </a:ext>
-          </a:extLst>
-        </p:spPr>
-      </p:pic>
-      <p:sp>
-        <p:nvSpPr>
-          <p:cNvPr id="7" name="Text Placeholder 6">
-            <a:extLst>
-              <a:ext uri="{FF2B5EF4-FFF2-40B4-BE49-F238E27FC236}">
-                <a16:creationId xmlns:a16="http://schemas.microsoft.com/office/drawing/2014/main" id="{A995C57E-0E15-479B-BBA4-52641F6F304B}"/>
+                <a16:creationId xmlns:a16="http://schemas.microsoft.com/office/drawing/2014/main" id="{73919704-A3E0-446A-B2AC-4C96C72227BE}"/>
               </a:ext>
             </a:extLst>
           </p:cNvPr>
@@ -15700,202 +15002,140 @@
             <a:spLocks noGrp="1"/>
           </p:cNvSpPr>
           <p:nvPr>
-            <p:ph type="body" sz="half" idx="2"/>
+            <p:ph sz="half" idx="1"/>
           </p:nvPr>
         </p:nvSpPr>
-        <p:spPr>
-          <a:xfrm>
-            <a:off x="8614786" y="2790855"/>
-            <a:ext cx="3084844" cy="3311766"/>
-          </a:xfrm>
-        </p:spPr>
+        <p:spPr/>
         <p:txBody>
-          <a:bodyPr vert="horz" lIns="0" tIns="45720" rIns="0" bIns="45720" rtlCol="0">
+          <a:bodyPr>
             <a:normAutofit/>
           </a:bodyPr>
           <a:lstStyle/>
           <a:p>
-            <a:pPr>
-              <a:lnSpc>
-                <a:spcPct val="100000"/>
-              </a:lnSpc>
-            </a:pPr>
-            <a:r>
-              <a:rPr lang="en-US" sz="1600" dirty="0">
-                <a:solidFill>
-                  <a:schemeClr val="tx1">
-                    <a:lumMod val="75000"/>
-                    <a:lumOff val="25000"/>
-                  </a:schemeClr>
-                </a:solidFill>
-              </a:rPr>
-              <a:t>Type Object</a:t>
-            </a:r>
-          </a:p>
-          <a:p>
-            <a:pPr>
-              <a:lnSpc>
-                <a:spcPct val="100000"/>
-              </a:lnSpc>
-            </a:pPr>
-            <a:r>
-              <a:rPr lang="en-US" sz="1600" dirty="0">
-                <a:solidFill>
-                  <a:schemeClr val="tx1">
-                    <a:lumMod val="75000"/>
-                    <a:lumOff val="25000"/>
-                  </a:schemeClr>
-                </a:solidFill>
-              </a:rPr>
-              <a:t>Type Flags</a:t>
-            </a:r>
-          </a:p>
-          <a:p>
-            <a:pPr>
-              <a:lnSpc>
-                <a:spcPct val="100000"/>
-              </a:lnSpc>
-            </a:pPr>
-            <a:r>
-              <a:rPr lang="en-US" sz="1600" b="1" u="sng" dirty="0">
-                <a:solidFill>
-                  <a:schemeClr val="tx1">
-                    <a:lumMod val="75000"/>
-                    <a:lumOff val="25000"/>
-                  </a:schemeClr>
-                </a:solidFill>
-              </a:rPr>
-              <a:t>Type Integer</a:t>
-            </a:r>
-          </a:p>
-          <a:p>
-            <a:pPr>
-              <a:lnSpc>
-                <a:spcPct val="100000"/>
-              </a:lnSpc>
-            </a:pPr>
-            <a:r>
-              <a:rPr lang="en-US" sz="1600" b="1" u="sng" dirty="0">
-                <a:solidFill>
-                  <a:schemeClr val="tx1">
-                    <a:lumMod val="75000"/>
-                    <a:lumOff val="25000"/>
-                  </a:schemeClr>
-                </a:solidFill>
-              </a:rPr>
-              <a:t>Type Float</a:t>
+            <a:r>
+              <a:rPr lang="fr-FR" dirty="0" err="1"/>
+              <a:t>Bureau_balance</a:t>
+            </a:r>
+            <a:r>
+              <a:rPr lang="fr-FR" dirty="0"/>
+              <a:t>:</a:t>
+            </a:r>
+          </a:p>
+          <a:p>
+            <a:r>
+              <a:rPr lang="fr-FR" dirty="0"/>
+              <a:t>Analyser (pas de valeurs manquantes)</a:t>
+            </a:r>
+          </a:p>
+          <a:p>
+            <a:r>
+              <a:rPr lang="fr-FR" dirty="0" err="1"/>
+              <a:t>Aggréger</a:t>
+            </a:r>
+            <a:endParaRPr lang="fr-FR" dirty="0"/>
+          </a:p>
+          <a:p>
+            <a:r>
+              <a:rPr lang="fr-FR" dirty="0"/>
+              <a:t>Joindre à Bureau</a:t>
+            </a:r>
+          </a:p>
+          <a:p>
+            <a:r>
+              <a:rPr lang="fr-FR" dirty="0"/>
+              <a:t>Imputer des valeurs manquantes venants du </a:t>
+            </a:r>
+            <a:r>
+              <a:rPr lang="fr-FR" dirty="0" err="1"/>
+              <a:t>bureau_balance</a:t>
+            </a:r>
+            <a:r>
+              <a:rPr lang="fr-FR" dirty="0"/>
+              <a:t>:</a:t>
+            </a:r>
+          </a:p>
+          <a:p>
+            <a:r>
+              <a:rPr lang="fr-FR" dirty="0" err="1"/>
+              <a:t>dummies</a:t>
+            </a:r>
+            <a:r>
+              <a:rPr lang="fr-FR" dirty="0"/>
+              <a:t> avec 1 sur inconnu et 0 ailleurs</a:t>
             </a:r>
           </a:p>
         </p:txBody>
       </p:sp>
       <p:sp>
         <p:nvSpPr>
-          <p:cNvPr id="157" name="Rectangle 156">
+          <p:cNvPr id="7" name="Content Placeholder 6">
             <a:extLst>
               <a:ext uri="{FF2B5EF4-FFF2-40B4-BE49-F238E27FC236}">
-                <a16:creationId xmlns:a16="http://schemas.microsoft.com/office/drawing/2014/main" id="{7A3E0404-86A9-40FA-8DB8-302414EE2D9E}"/>
-              </a:ext>
-              <a:ext uri="{C183D7F6-B498-43B3-948B-1728B52AA6E4}">
-                <adec:decorative xmlns:adec="http://schemas.microsoft.com/office/drawing/2017/decorative" val="1"/>
+                <a16:creationId xmlns:a16="http://schemas.microsoft.com/office/drawing/2014/main" id="{D54F6221-7A01-4BD5-B512-A4548E7FCEB2}"/>
               </a:ext>
             </a:extLst>
           </p:cNvPr>
           <p:cNvSpPr>
-            <a:spLocks noGrp="1" noRot="1" noChangeAspect="1" noMove="1" noResize="1" noEditPoints="1" noAdjustHandles="1" noChangeArrowheads="1" noChangeShapeType="1" noTextEdit="1"/>
+            <a:spLocks noGrp="1"/>
           </p:cNvSpPr>
           <p:nvPr>
-            <p:extLst>
-              <p:ext uri="{386F3935-93C4-4BCD-93E2-E3B085C9AB24}">
-                <p16:designElem xmlns:p16="http://schemas.microsoft.com/office/powerpoint/2015/main" val="1"/>
-              </p:ext>
-            </p:extLst>
+            <p:ph sz="half" idx="2"/>
           </p:nvPr>
         </p:nvSpPr>
-        <p:spPr>
-          <a:xfrm>
-            <a:off x="-1" y="6400800"/>
-            <a:ext cx="12192000" cy="457200"/>
-          </a:xfrm>
-          <a:prstGeom prst="rect">
-            <a:avLst/>
-          </a:prstGeom>
-          <a:solidFill>
-            <a:srgbClr val="262626">
-              <a:alpha val="95000"/>
-            </a:srgbClr>
-          </a:solidFill>
-          <a:ln>
-            <a:noFill/>
-          </a:ln>
-        </p:spPr>
-        <p:style>
-          <a:lnRef idx="2">
-            <a:schemeClr val="accent1">
-              <a:shade val="50000"/>
-            </a:schemeClr>
-          </a:lnRef>
-          <a:fillRef idx="1">
-            <a:schemeClr val="accent1"/>
-          </a:fillRef>
-          <a:effectRef idx="0">
-            <a:schemeClr val="accent1"/>
-          </a:effectRef>
-          <a:fontRef idx="minor">
-            <a:schemeClr val="lt1"/>
-          </a:fontRef>
-        </p:style>
+        <p:spPr/>
+        <p:txBody>
+          <a:bodyPr>
+            <a:normAutofit/>
+          </a:bodyPr>
+          <a:lstStyle/>
+          <a:p>
+            <a:r>
+              <a:rPr lang="fr-FR" dirty="0"/>
+              <a:t>Bureau:</a:t>
+            </a:r>
+          </a:p>
+          <a:p>
+            <a:r>
+              <a:rPr lang="fr-FR" dirty="0"/>
+              <a:t>Analyser </a:t>
+            </a:r>
+          </a:p>
+          <a:p>
+            <a:r>
+              <a:rPr lang="fr-FR" dirty="0"/>
+              <a:t>Imputer des valeurs manquantes</a:t>
+            </a:r>
+          </a:p>
+          <a:p>
+            <a:r>
+              <a:rPr lang="fr-FR" dirty="0" err="1"/>
+              <a:t>Aggréger</a:t>
+            </a:r>
+            <a:endParaRPr lang="fr-FR" dirty="0"/>
+          </a:p>
+          <a:p>
+            <a:r>
+              <a:rPr lang="fr-FR" dirty="0"/>
+              <a:t>Joindre à </a:t>
+            </a:r>
+            <a:r>
+              <a:rPr lang="fr-FR" dirty="0" err="1"/>
+              <a:t>application_train</a:t>
+            </a:r>
+            <a:endParaRPr lang="fr-FR" dirty="0"/>
+          </a:p>
+          <a:p>
+            <a:r>
+              <a:rPr lang="fr-FR" dirty="0"/>
+              <a:t>Imputer des valeurs manquantes venants du Bureau</a:t>
+            </a:r>
+          </a:p>
+        </p:txBody>
       </p:sp>
-      <p:pic>
-        <p:nvPicPr>
-          <p:cNvPr id="2" name="Picture 18">
-            <a:extLst>
-              <a:ext uri="{FF2B5EF4-FFF2-40B4-BE49-F238E27FC236}">
-                <a16:creationId xmlns:a16="http://schemas.microsoft.com/office/drawing/2014/main" id="{D8D7402C-AA9F-43FA-864F-E31AB4AC7FDF}"/>
-              </a:ext>
-            </a:extLst>
-          </p:cNvPr>
-          <p:cNvPicPr>
-            <a:picLocks noChangeAspect="1" noChangeArrowheads="1"/>
-          </p:cNvPicPr>
-          <p:nvPr/>
-        </p:nvPicPr>
-        <p:blipFill>
-          <a:blip r:embed="rId6">
-            <a:extLst>
-              <a:ext uri="{28A0092B-C50C-407E-A947-70E740481C1C}">
-                <a14:useLocalDpi xmlns:a14="http://schemas.microsoft.com/office/drawing/2010/main" val="0"/>
-              </a:ext>
-            </a:extLst>
-          </a:blip>
-          <a:srcRect/>
-          <a:stretch>
-            <a:fillRect/>
-          </a:stretch>
-        </p:blipFill>
-        <p:spPr bwMode="auto">
-          <a:xfrm>
-            <a:off x="4549439" y="2427199"/>
-            <a:ext cx="3619330" cy="1871458"/>
-          </a:xfrm>
-          <a:prstGeom prst="rect">
-            <a:avLst/>
-          </a:prstGeom>
-          <a:noFill/>
-          <a:extLst>
-            <a:ext uri="{909E8E84-426E-40DD-AFC4-6F175D3DCCD1}">
-              <a14:hiddenFill xmlns:a14="http://schemas.microsoft.com/office/drawing/2010/main">
-                <a:solidFill>
-                  <a:srgbClr val="FFFFFF"/>
-                </a:solidFill>
-              </a14:hiddenFill>
-            </a:ext>
-          </a:extLst>
-        </p:spPr>
-      </p:pic>
     </p:spTree>
     <p:extLst>
       <p:ext uri="{BB962C8B-B14F-4D97-AF65-F5344CB8AC3E}">
-        <p14:creationId xmlns:p14="http://schemas.microsoft.com/office/powerpoint/2010/main" val="2378468676"/>
+        <p14:creationId xmlns:p14="http://schemas.microsoft.com/office/powerpoint/2010/main" val="881562698"/>
       </p:ext>
     </p:extLst>
   </p:cSld>
@@ -15924,10 +15164,63 @@
       </p:grpSpPr>
       <p:sp>
         <p:nvSpPr>
-          <p:cNvPr id="5" name="Title 4">
+          <p:cNvPr id="9" name="Oval 8">
             <a:extLst>
               <a:ext uri="{FF2B5EF4-FFF2-40B4-BE49-F238E27FC236}">
-                <a16:creationId xmlns:a16="http://schemas.microsoft.com/office/drawing/2014/main" id="{DB4ABC5D-0F6B-4CFA-9F86-93C8623A8BF7}"/>
+                <a16:creationId xmlns:a16="http://schemas.microsoft.com/office/drawing/2014/main" id="{DD904C89-17FF-4245-9834-6A54E894DF3A}"/>
+              </a:ext>
+            </a:extLst>
+          </p:cNvPr>
+          <p:cNvSpPr/>
+          <p:nvPr/>
+        </p:nvSpPr>
+        <p:spPr>
+          <a:xfrm>
+            <a:off x="7822342" y="3010537"/>
+            <a:ext cx="1818562" cy="1818562"/>
+          </a:xfrm>
+          <a:prstGeom prst="ellipse">
+            <a:avLst/>
+          </a:prstGeom>
+          <a:solidFill>
+            <a:schemeClr val="accent1"/>
+          </a:solidFill>
+        </p:spPr>
+        <p:style>
+          <a:lnRef idx="0">
+            <a:schemeClr val="lt1">
+              <a:alpha val="0"/>
+              <a:hueOff val="0"/>
+              <a:satOff val="0"/>
+              <a:lumOff val="0"/>
+              <a:alphaOff val="0"/>
+            </a:schemeClr>
+          </a:lnRef>
+          <a:fillRef idx="1">
+            <a:schemeClr val="accent2">
+              <a:hueOff val="0"/>
+              <a:satOff val="0"/>
+              <a:lumOff val="0"/>
+              <a:alphaOff val="0"/>
+            </a:schemeClr>
+          </a:fillRef>
+          <a:effectRef idx="0">
+            <a:schemeClr val="accent2">
+              <a:hueOff val="0"/>
+              <a:satOff val="0"/>
+              <a:lumOff val="0"/>
+              <a:alphaOff val="0"/>
+            </a:schemeClr>
+          </a:effectRef>
+          <a:fontRef idx="minor"/>
+        </p:style>
+      </p:sp>
+      <p:sp>
+        <p:nvSpPr>
+          <p:cNvPr id="2" name="Title 1">
+            <a:extLst>
+              <a:ext uri="{FF2B5EF4-FFF2-40B4-BE49-F238E27FC236}">
+                <a16:creationId xmlns:a16="http://schemas.microsoft.com/office/drawing/2014/main" id="{F3A2D1F6-6AB5-447A-B281-C0DF40125FC7}"/>
               </a:ext>
             </a:extLst>
           </p:cNvPr>
@@ -15944,22 +15237,18 @@
           <a:lstStyle/>
           <a:p>
             <a:r>
-              <a:rPr lang="fr-FR" dirty="0" err="1"/>
-              <a:t>Dependent</a:t>
-            </a:r>
-            <a:r>
               <a:rPr lang="fr-FR" dirty="0"/>
-              <a:t> tables</a:t>
+              <a:t>Préparation finale</a:t>
             </a:r>
           </a:p>
         </p:txBody>
       </p:sp>
       <p:sp>
         <p:nvSpPr>
-          <p:cNvPr id="6" name="Content Placeholder 5">
+          <p:cNvPr id="3" name="Content Placeholder 2">
             <a:extLst>
               <a:ext uri="{FF2B5EF4-FFF2-40B4-BE49-F238E27FC236}">
-                <a16:creationId xmlns:a16="http://schemas.microsoft.com/office/drawing/2014/main" id="{73919704-A3E0-446A-B2AC-4C96C72227BE}"/>
+                <a16:creationId xmlns:a16="http://schemas.microsoft.com/office/drawing/2014/main" id="{9251A13F-4438-4EA3-A93C-694B899DF5E7}"/>
               </a:ext>
             </a:extLst>
           </p:cNvPr>
@@ -15972,135 +15261,99 @@
         </p:nvSpPr>
         <p:spPr/>
         <p:txBody>
-          <a:bodyPr>
-            <a:normAutofit/>
-          </a:bodyPr>
+          <a:bodyPr/>
           <a:lstStyle/>
           <a:p>
             <a:r>
+              <a:rPr lang="fr-FR" dirty="0"/>
+              <a:t>Tailler le jeu de données </a:t>
+            </a:r>
+            <a:r>
               <a:rPr lang="fr-FR" dirty="0" err="1"/>
-              <a:t>Bureau_balance</a:t>
+              <a:t>por</a:t>
             </a:r>
             <a:r>
               <a:rPr lang="fr-FR" dirty="0"/>
-              <a:t>:</a:t>
+              <a:t> réduire le temps d’exécution de notebook</a:t>
             </a:r>
           </a:p>
           <a:p>
             <a:r>
               <a:rPr lang="fr-FR" dirty="0"/>
-              <a:t>Analyser (pas de valeurs manquantes)</a:t>
-            </a:r>
-          </a:p>
-          <a:p>
-            <a:r>
-              <a:rPr lang="fr-FR" dirty="0" err="1"/>
-              <a:t>Aggréger</a:t>
-            </a:r>
-            <a:endParaRPr lang="fr-FR" dirty="0"/>
-          </a:p>
-          <a:p>
+              <a:t>Comment: </a:t>
+            </a:r>
+          </a:p>
+          <a:p>
+            <a:pPr lvl="1">
+              <a:buFont typeface="Arial" panose="020B0604020202020204" pitchFamily="34" charset="0"/>
+              <a:buChar char="•"/>
+            </a:pPr>
             <a:r>
               <a:rPr lang="fr-FR" dirty="0"/>
-              <a:t>Joindre à Bureau</a:t>
-            </a:r>
-          </a:p>
-          <a:p>
+              <a:t>Lancer le notebook avec l’ensemble entier des variables</a:t>
+            </a:r>
+          </a:p>
+          <a:p>
+            <a:pPr lvl="1">
+              <a:buFont typeface="Arial" panose="020B0604020202020204" pitchFamily="34" charset="0"/>
+              <a:buChar char="•"/>
+            </a:pPr>
             <a:r>
               <a:rPr lang="fr-FR" dirty="0"/>
-              <a:t>Imputer des valeurs manquantes venants du </a:t>
-            </a:r>
-            <a:r>
-              <a:rPr lang="fr-FR" dirty="0" err="1"/>
-              <a:t>bureau_balance</a:t>
-            </a:r>
+              <a:t>Tenter d’éliminer toutes les valeurs sauf les plus pertinents</a:t>
+            </a:r>
+          </a:p>
+          <a:p>
+            <a:pPr lvl="1">
+              <a:buFont typeface="Arial" panose="020B0604020202020204" pitchFamily="34" charset="0"/>
+              <a:buChar char="•"/>
+            </a:pPr>
             <a:r>
               <a:rPr lang="fr-FR" dirty="0"/>
-              <a:t>:</a:t>
-            </a:r>
-          </a:p>
-          <a:p>
-            <a:r>
-              <a:rPr lang="fr-FR" dirty="0" err="1"/>
-              <a:t>dummies</a:t>
-            </a:r>
-            <a:r>
-              <a:rPr lang="fr-FR" dirty="0"/>
-              <a:t> avec 1 sur inconnu et 0 ailleurs</a:t>
+              <a:t>Voir à quel point tombe la performance du modèle (4%)</a:t>
             </a:r>
           </a:p>
         </p:txBody>
       </p:sp>
-      <p:sp>
-        <p:nvSpPr>
-          <p:cNvPr id="7" name="Content Placeholder 6">
+      <p:pic>
+        <p:nvPicPr>
+          <p:cNvPr id="8" name="Content Placeholder 7" descr="Alterations &amp; Tailoring with solid fill">
             <a:extLst>
               <a:ext uri="{FF2B5EF4-FFF2-40B4-BE49-F238E27FC236}">
-                <a16:creationId xmlns:a16="http://schemas.microsoft.com/office/drawing/2014/main" id="{D54F6221-7A01-4BD5-B512-A4548E7FCEB2}"/>
+                <a16:creationId xmlns:a16="http://schemas.microsoft.com/office/drawing/2014/main" id="{04F1173A-B67A-42DB-8614-0F368147BE77}"/>
               </a:ext>
             </a:extLst>
           </p:cNvPr>
-          <p:cNvSpPr>
-            <a:spLocks noGrp="1"/>
-          </p:cNvSpPr>
+          <p:cNvPicPr>
+            <a:picLocks noGrp="1" noChangeAspect="1"/>
+          </p:cNvPicPr>
           <p:nvPr>
             <p:ph sz="half" idx="2"/>
           </p:nvPr>
-        </p:nvSpPr>
-        <p:spPr/>
-        <p:txBody>
-          <a:bodyPr>
-            <a:normAutofit/>
-          </a:bodyPr>
-          <a:lstStyle/>
-          <a:p>
-            <a:r>
-              <a:rPr lang="fr-FR" dirty="0"/>
-              <a:t>Bureau:</a:t>
-            </a:r>
-          </a:p>
-          <a:p>
-            <a:r>
-              <a:rPr lang="fr-FR" dirty="0"/>
-              <a:t>Analyser </a:t>
-            </a:r>
-          </a:p>
-          <a:p>
-            <a:r>
-              <a:rPr lang="fr-FR" dirty="0"/>
-              <a:t>Imputer des valeurs manquantes</a:t>
-            </a:r>
-          </a:p>
-          <a:p>
-            <a:r>
-              <a:rPr lang="fr-FR" dirty="0" err="1"/>
-              <a:t>Aggréger</a:t>
-            </a:r>
-            <a:endParaRPr lang="fr-FR" dirty="0"/>
-          </a:p>
-          <a:p>
-            <a:r>
-              <a:rPr lang="fr-FR" dirty="0"/>
-              <a:t>Joindre à </a:t>
-            </a:r>
-            <a:r>
-              <a:rPr lang="fr-FR" dirty="0" err="1"/>
-              <a:t>application_train</a:t>
-            </a:r>
-            <a:endParaRPr lang="fr-FR" dirty="0"/>
-          </a:p>
-          <a:p>
-            <a:r>
-              <a:rPr lang="fr-FR" dirty="0"/>
-              <a:t>Imputer des valeurs manquantes venants du Bureau</a:t>
-            </a:r>
-          </a:p>
-        </p:txBody>
-      </p:sp>
+        </p:nvPicPr>
+        <p:blipFill>
+          <a:blip r:embed="rId2">
+            <a:extLst>
+              <a:ext uri="{96DAC541-7B7A-43D3-8B79-37D633B846F1}">
+                <asvg:svgBlip xmlns:asvg="http://schemas.microsoft.com/office/drawing/2016/SVG/main" r:embed="rId3"/>
+              </a:ext>
+            </a:extLst>
+          </a:blip>
+          <a:stretch>
+            <a:fillRect/>
+          </a:stretch>
+        </p:blipFill>
+        <p:spPr>
+          <a:xfrm>
+            <a:off x="8378825" y="3413055"/>
+            <a:ext cx="914400" cy="914400"/>
+          </a:xfrm>
+        </p:spPr>
+      </p:pic>
     </p:spTree>
     <p:extLst>
       <p:ext uri="{BB962C8B-B14F-4D97-AF65-F5344CB8AC3E}">
-        <p14:creationId xmlns:p14="http://schemas.microsoft.com/office/powerpoint/2010/main" val="881562698"/>
+        <p14:creationId xmlns:p14="http://schemas.microsoft.com/office/powerpoint/2010/main" val="1299145213"/>
       </p:ext>
     </p:extLst>
   </p:cSld>
@@ -16446,15 +15699,6 @@
 </file>
 
 <file path=customXml/item2.xml><?xml version="1.0" encoding="utf-8"?>
-<?mso-contentType ?>
-<FormTemplates xmlns="http://schemas.microsoft.com/sharepoint/v3/contenttype/forms">
-  <Display>DocumentLibraryForm</Display>
-  <Edit>DocumentLibraryForm</Edit>
-  <New>DocumentLibraryForm</New>
-</FormTemplates>
-</file>
-
-<file path=customXml/item3.xml><?xml version="1.0" encoding="utf-8"?>
 <ct:contentTypeSchema xmlns:ct="http://schemas.microsoft.com/office/2006/metadata/contentType" xmlns:ma="http://schemas.microsoft.com/office/2006/metadata/properties/metaAttributes" ct:_="" ma:_="" ma:contentTypeName="Document" ma:contentTypeID="0x01010079F111ED35F8CC479449609E8A0923A6" ma:contentTypeVersion="12" ma:contentTypeDescription="Create a new document." ma:contentTypeScope="" ma:versionID="a410dd7f93c95333ffa1b60ed6adedd1">
   <xsd:schema xmlns:xsd="http://www.w3.org/2001/XMLSchema" xmlns:xs="http://www.w3.org/2001/XMLSchema" xmlns:p="http://schemas.microsoft.com/office/2006/metadata/properties" xmlns:ns2="71af3243-3dd4-4a8d-8c0d-dd76da1f02a5" xmlns:ns3="16c05727-aa75-4e4a-9b5f-8a80a1165891" targetNamespace="http://schemas.microsoft.com/office/2006/metadata/properties" ma:root="true" ma:fieldsID="a936d9baba76aa3866493feff160faab" ns2:_="" ns3:_="">
     <xsd:import namespace="71af3243-3dd4-4a8d-8c0d-dd76da1f02a5"/>
@@ -16675,6 +15919,15 @@
 </ct:contentTypeSchema>
 </file>
 
+<file path=customXml/item3.xml><?xml version="1.0" encoding="utf-8"?>
+<?mso-contentType ?>
+<FormTemplates xmlns="http://schemas.microsoft.com/sharepoint/v3/contenttype/forms">
+  <Display>DocumentLibraryForm</Display>
+  <Edit>DocumentLibraryForm</Edit>
+  <New>DocumentLibraryForm</New>
+</FormTemplates>
+</file>
+
 <file path=customXml/itemProps1.xml><?xml version="1.0" encoding="utf-8"?>
 <ds:datastoreItem xmlns:ds="http://schemas.openxmlformats.org/officeDocument/2006/customXml" ds:itemID="{8F3CD65D-61A5-43C9-A837-6EC73C7DA8AB}">
   <ds:schemaRefs>
@@ -16686,14 +15939,6 @@
 </file>
 
 <file path=customXml/itemProps2.xml><?xml version="1.0" encoding="utf-8"?>
-<ds:datastoreItem xmlns:ds="http://schemas.openxmlformats.org/officeDocument/2006/customXml" ds:itemID="{31F006B4-A9E1-4F39-85C8-FB836F919348}">
-  <ds:schemaRefs>
-    <ds:schemaRef ds:uri="http://schemas.microsoft.com/sharepoint/v3/contenttype/forms"/>
-  </ds:schemaRefs>
-</ds:datastoreItem>
-</file>
-
-<file path=customXml/itemProps3.xml><?xml version="1.0" encoding="utf-8"?>
 <ds:datastoreItem xmlns:ds="http://schemas.openxmlformats.org/officeDocument/2006/customXml" ds:itemID="{16377351-63A1-4C2E-8C9A-66CDD70F16AC}">
   <ds:schemaRefs>
     <ds:schemaRef ds:uri="http://schemas.microsoft.com/office/2006/metadata/contentType"/>
@@ -16710,4 +15955,12 @@
     <ds:schemaRef ds:uri="http://schemas.microsoft.com/internal/obd"/>
   </ds:schemaRefs>
 </ds:datastoreItem>
+</file>
+
+<file path=customXml/itemProps3.xml><?xml version="1.0" encoding="utf-8"?>
+<ds:datastoreItem xmlns:ds="http://schemas.openxmlformats.org/officeDocument/2006/customXml" ds:itemID="{31F006B4-A9E1-4F39-85C8-FB836F919348}">
+  <ds:schemaRefs>
+    <ds:schemaRef ds:uri="http://schemas.microsoft.com/sharepoint/v3/contenttype/forms"/>
+  </ds:schemaRefs>
+</ds:datastoreItem>
 </file>
</xml_diff>

<commit_message>
added 3 interactive graphics plotly: scatter and 2 histograms
</commit_message>
<xml_diff>
--- a/P7_presentation_Berezhnaia.pptx
+++ b/P7_presentation_Berezhnaia.pptx
@@ -1,9 +1,12 @@
 
 <file path=ppt/presentation.xml><?xml version="1.0" encoding="utf-8"?>
-<p:presentation xmlns:a="http://schemas.openxmlformats.org/drawingml/2006/main" xmlns:r="http://schemas.openxmlformats.org/officeDocument/2006/relationships" xmlns:p="http://schemas.openxmlformats.org/presentationml/2006/main" saveSubsetFonts="1" autoCompressPictures="0">
+<p:presentation xmlns:a="http://schemas.openxmlformats.org/drawingml/2006/main" xmlns:r="http://schemas.openxmlformats.org/officeDocument/2006/relationships" xmlns:p="http://schemas.openxmlformats.org/presentationml/2006/main" showSpecialPlsOnTitleSld="0" saveSubsetFonts="1" autoCompressPictures="0">
   <p:sldMasterIdLst>
     <p:sldMasterId id="2147483660" r:id="rId4"/>
   </p:sldMasterIdLst>
+  <p:notesMasterIdLst>
+    <p:notesMasterId r:id="rId21"/>
+  </p:notesMasterIdLst>
   <p:sldIdLst>
     <p:sldId id="310" r:id="rId5"/>
     <p:sldId id="308" r:id="rId6"/>
@@ -17,8 +20,8 @@
     <p:sldId id="319" r:id="rId14"/>
     <p:sldId id="320" r:id="rId15"/>
     <p:sldId id="321" r:id="rId16"/>
-    <p:sldId id="323" r:id="rId17"/>
-    <p:sldId id="326" r:id="rId18"/>
+    <p:sldId id="326" r:id="rId17"/>
+    <p:sldId id="323" r:id="rId18"/>
     <p:sldId id="329" r:id="rId19"/>
     <p:sldId id="330" r:id="rId20"/>
   </p:sldIdLst>
@@ -3163,6 +3166,356 @@
 </dgm:styleDef>
 </file>
 
+<file path=ppt/notesMasters/notesMaster1.xml><?xml version="1.0" encoding="utf-8"?>
+<p:notesMaster xmlns:a="http://schemas.openxmlformats.org/drawingml/2006/main" xmlns:r="http://schemas.openxmlformats.org/officeDocument/2006/relationships" xmlns:p="http://schemas.openxmlformats.org/presentationml/2006/main">
+  <p:cSld>
+    <p:bg>
+      <p:bgRef idx="1001">
+        <a:schemeClr val="bg1"/>
+      </p:bgRef>
+    </p:bg>
+    <p:spTree>
+      <p:nvGrpSpPr>
+        <p:cNvPr id="1" name=""/>
+        <p:cNvGrpSpPr/>
+        <p:nvPr/>
+      </p:nvGrpSpPr>
+      <p:grpSpPr>
+        <a:xfrm>
+          <a:off x="0" y="0"/>
+          <a:ext cx="0" cy="0"/>
+          <a:chOff x="0" y="0"/>
+          <a:chExt cx="0" cy="0"/>
+        </a:xfrm>
+      </p:grpSpPr>
+      <p:sp>
+        <p:nvSpPr>
+          <p:cNvPr id="2" name="Header Placeholder 1"/>
+          <p:cNvSpPr>
+            <a:spLocks noGrp="1"/>
+          </p:cNvSpPr>
+          <p:nvPr>
+            <p:ph type="hdr" sz="quarter"/>
+          </p:nvPr>
+        </p:nvSpPr>
+        <p:spPr>
+          <a:xfrm>
+            <a:off x="0" y="0"/>
+            <a:ext cx="2971800" cy="458788"/>
+          </a:xfrm>
+          <a:prstGeom prst="rect">
+            <a:avLst/>
+          </a:prstGeom>
+        </p:spPr>
+        <p:txBody>
+          <a:bodyPr vert="horz" lIns="91440" tIns="45720" rIns="91440" bIns="45720" rtlCol="0"/>
+          <a:lstStyle>
+            <a:lvl1pPr algn="l">
+              <a:defRPr sz="1200"/>
+            </a:lvl1pPr>
+          </a:lstStyle>
+          <a:p>
+            <a:endParaRPr lang="fr-FR"/>
+          </a:p>
+        </p:txBody>
+      </p:sp>
+      <p:sp>
+        <p:nvSpPr>
+          <p:cNvPr id="3" name="Date Placeholder 2"/>
+          <p:cNvSpPr>
+            <a:spLocks noGrp="1"/>
+          </p:cNvSpPr>
+          <p:nvPr>
+            <p:ph type="dt" idx="1"/>
+          </p:nvPr>
+        </p:nvSpPr>
+        <p:spPr>
+          <a:xfrm>
+            <a:off x="3884613" y="0"/>
+            <a:ext cx="2971800" cy="458788"/>
+          </a:xfrm>
+          <a:prstGeom prst="rect">
+            <a:avLst/>
+          </a:prstGeom>
+        </p:spPr>
+        <p:txBody>
+          <a:bodyPr vert="horz" lIns="91440" tIns="45720" rIns="91440" bIns="45720" rtlCol="0"/>
+          <a:lstStyle>
+            <a:lvl1pPr algn="r">
+              <a:defRPr sz="1200"/>
+            </a:lvl1pPr>
+          </a:lstStyle>
+          <a:p>
+            <a:fld id="{BE8DFBBE-2FAB-49A6-9B2E-16859AA07AE7}" type="datetimeFigureOut">
+              <a:rPr lang="fr-FR" smtClean="0"/>
+              <a:t>20/02/2022</a:t>
+            </a:fld>
+            <a:endParaRPr lang="fr-FR"/>
+          </a:p>
+        </p:txBody>
+      </p:sp>
+      <p:sp>
+        <p:nvSpPr>
+          <p:cNvPr id="4" name="Slide Image Placeholder 3"/>
+          <p:cNvSpPr>
+            <a:spLocks noGrp="1" noRot="1" noChangeAspect="1"/>
+          </p:cNvSpPr>
+          <p:nvPr>
+            <p:ph type="sldImg" idx="2"/>
+          </p:nvPr>
+        </p:nvSpPr>
+        <p:spPr>
+          <a:xfrm>
+            <a:off x="685800" y="1143000"/>
+            <a:ext cx="5486400" cy="3086100"/>
+          </a:xfrm>
+          <a:prstGeom prst="rect">
+            <a:avLst/>
+          </a:prstGeom>
+          <a:noFill/>
+          <a:ln w="12700">
+            <a:solidFill>
+              <a:prstClr val="black"/>
+            </a:solidFill>
+          </a:ln>
+        </p:spPr>
+        <p:txBody>
+          <a:bodyPr vert="horz" lIns="91440" tIns="45720" rIns="91440" bIns="45720" rtlCol="0" anchor="ctr"/>
+          <a:lstStyle/>
+          <a:p>
+            <a:endParaRPr lang="fr-FR"/>
+          </a:p>
+        </p:txBody>
+      </p:sp>
+      <p:sp>
+        <p:nvSpPr>
+          <p:cNvPr id="5" name="Notes Placeholder 4"/>
+          <p:cNvSpPr>
+            <a:spLocks noGrp="1"/>
+          </p:cNvSpPr>
+          <p:nvPr>
+            <p:ph type="body" sz="quarter" idx="3"/>
+          </p:nvPr>
+        </p:nvSpPr>
+        <p:spPr>
+          <a:xfrm>
+            <a:off x="685800" y="4400550"/>
+            <a:ext cx="5486400" cy="3600450"/>
+          </a:xfrm>
+          <a:prstGeom prst="rect">
+            <a:avLst/>
+          </a:prstGeom>
+        </p:spPr>
+        <p:txBody>
+          <a:bodyPr vert="horz" lIns="91440" tIns="45720" rIns="91440" bIns="45720" rtlCol="0"/>
+          <a:lstStyle/>
+          <a:p>
+            <a:pPr lvl="0"/>
+            <a:r>
+              <a:rPr lang="en-US"/>
+              <a:t>Click to edit Master text styles</a:t>
+            </a:r>
+          </a:p>
+          <a:p>
+            <a:pPr lvl="1"/>
+            <a:r>
+              <a:rPr lang="en-US"/>
+              <a:t>Second level</a:t>
+            </a:r>
+          </a:p>
+          <a:p>
+            <a:pPr lvl="2"/>
+            <a:r>
+              <a:rPr lang="en-US"/>
+              <a:t>Third level</a:t>
+            </a:r>
+          </a:p>
+          <a:p>
+            <a:pPr lvl="3"/>
+            <a:r>
+              <a:rPr lang="en-US"/>
+              <a:t>Fourth level</a:t>
+            </a:r>
+          </a:p>
+          <a:p>
+            <a:pPr lvl="4"/>
+            <a:r>
+              <a:rPr lang="en-US"/>
+              <a:t>Fifth level</a:t>
+            </a:r>
+            <a:endParaRPr lang="fr-FR"/>
+          </a:p>
+        </p:txBody>
+      </p:sp>
+      <p:sp>
+        <p:nvSpPr>
+          <p:cNvPr id="6" name="Footer Placeholder 5"/>
+          <p:cNvSpPr>
+            <a:spLocks noGrp="1"/>
+          </p:cNvSpPr>
+          <p:nvPr>
+            <p:ph type="ftr" sz="quarter" idx="4"/>
+          </p:nvPr>
+        </p:nvSpPr>
+        <p:spPr>
+          <a:xfrm>
+            <a:off x="0" y="8685213"/>
+            <a:ext cx="2971800" cy="458787"/>
+          </a:xfrm>
+          <a:prstGeom prst="rect">
+            <a:avLst/>
+          </a:prstGeom>
+        </p:spPr>
+        <p:txBody>
+          <a:bodyPr vert="horz" lIns="91440" tIns="45720" rIns="91440" bIns="45720" rtlCol="0" anchor="b"/>
+          <a:lstStyle>
+            <a:lvl1pPr algn="l">
+              <a:defRPr sz="1200"/>
+            </a:lvl1pPr>
+          </a:lstStyle>
+          <a:p>
+            <a:endParaRPr lang="fr-FR"/>
+          </a:p>
+        </p:txBody>
+      </p:sp>
+      <p:sp>
+        <p:nvSpPr>
+          <p:cNvPr id="7" name="Slide Number Placeholder 6"/>
+          <p:cNvSpPr>
+            <a:spLocks noGrp="1"/>
+          </p:cNvSpPr>
+          <p:nvPr>
+            <p:ph type="sldNum" sz="quarter" idx="5"/>
+          </p:nvPr>
+        </p:nvSpPr>
+        <p:spPr>
+          <a:xfrm>
+            <a:off x="3884613" y="8685213"/>
+            <a:ext cx="2971800" cy="458787"/>
+          </a:xfrm>
+          <a:prstGeom prst="rect">
+            <a:avLst/>
+          </a:prstGeom>
+        </p:spPr>
+        <p:txBody>
+          <a:bodyPr vert="horz" lIns="91440" tIns="45720" rIns="91440" bIns="45720" rtlCol="0" anchor="b"/>
+          <a:lstStyle>
+            <a:lvl1pPr algn="r">
+              <a:defRPr sz="1200"/>
+            </a:lvl1pPr>
+          </a:lstStyle>
+          <a:p>
+            <a:fld id="{66E36A39-BE46-4561-ADF9-E7BA3E4B397A}" type="slidenum">
+              <a:rPr lang="fr-FR" smtClean="0"/>
+              <a:t>‹#›</a:t>
+            </a:fld>
+            <a:endParaRPr lang="fr-FR"/>
+          </a:p>
+        </p:txBody>
+      </p:sp>
+    </p:spTree>
+    <p:extLst>
+      <p:ext uri="{BB962C8B-B14F-4D97-AF65-F5344CB8AC3E}">
+        <p14:creationId xmlns:p14="http://schemas.microsoft.com/office/powerpoint/2010/main" val="370620650"/>
+      </p:ext>
+    </p:extLst>
+  </p:cSld>
+  <p:clrMap bg1="lt1" tx1="dk1" bg2="lt2" tx2="dk2" accent1="accent1" accent2="accent2" accent3="accent3" accent4="accent4" accent5="accent5" accent6="accent6" hlink="hlink" folHlink="folHlink"/>
+  <p:notesStyle>
+    <a:lvl1pPr marL="0" algn="l" defTabSz="914400" rtl="0" eaLnBrk="1" latinLnBrk="0" hangingPunct="1">
+      <a:defRPr sz="1200" kern="1200">
+        <a:solidFill>
+          <a:schemeClr val="tx1"/>
+        </a:solidFill>
+        <a:latin typeface="+mn-lt"/>
+        <a:ea typeface="+mn-ea"/>
+        <a:cs typeface="+mn-cs"/>
+      </a:defRPr>
+    </a:lvl1pPr>
+    <a:lvl2pPr marL="457200" algn="l" defTabSz="914400" rtl="0" eaLnBrk="1" latinLnBrk="0" hangingPunct="1">
+      <a:defRPr sz="1200" kern="1200">
+        <a:solidFill>
+          <a:schemeClr val="tx1"/>
+        </a:solidFill>
+        <a:latin typeface="+mn-lt"/>
+        <a:ea typeface="+mn-ea"/>
+        <a:cs typeface="+mn-cs"/>
+      </a:defRPr>
+    </a:lvl2pPr>
+    <a:lvl3pPr marL="914400" algn="l" defTabSz="914400" rtl="0" eaLnBrk="1" latinLnBrk="0" hangingPunct="1">
+      <a:defRPr sz="1200" kern="1200">
+        <a:solidFill>
+          <a:schemeClr val="tx1"/>
+        </a:solidFill>
+        <a:latin typeface="+mn-lt"/>
+        <a:ea typeface="+mn-ea"/>
+        <a:cs typeface="+mn-cs"/>
+      </a:defRPr>
+    </a:lvl3pPr>
+    <a:lvl4pPr marL="1371600" algn="l" defTabSz="914400" rtl="0" eaLnBrk="1" latinLnBrk="0" hangingPunct="1">
+      <a:defRPr sz="1200" kern="1200">
+        <a:solidFill>
+          <a:schemeClr val="tx1"/>
+        </a:solidFill>
+        <a:latin typeface="+mn-lt"/>
+        <a:ea typeface="+mn-ea"/>
+        <a:cs typeface="+mn-cs"/>
+      </a:defRPr>
+    </a:lvl4pPr>
+    <a:lvl5pPr marL="1828800" algn="l" defTabSz="914400" rtl="0" eaLnBrk="1" latinLnBrk="0" hangingPunct="1">
+      <a:defRPr sz="1200" kern="1200">
+        <a:solidFill>
+          <a:schemeClr val="tx1"/>
+        </a:solidFill>
+        <a:latin typeface="+mn-lt"/>
+        <a:ea typeface="+mn-ea"/>
+        <a:cs typeface="+mn-cs"/>
+      </a:defRPr>
+    </a:lvl5pPr>
+    <a:lvl6pPr marL="2286000" algn="l" defTabSz="914400" rtl="0" eaLnBrk="1" latinLnBrk="0" hangingPunct="1">
+      <a:defRPr sz="1200" kern="1200">
+        <a:solidFill>
+          <a:schemeClr val="tx1"/>
+        </a:solidFill>
+        <a:latin typeface="+mn-lt"/>
+        <a:ea typeface="+mn-ea"/>
+        <a:cs typeface="+mn-cs"/>
+      </a:defRPr>
+    </a:lvl6pPr>
+    <a:lvl7pPr marL="2743200" algn="l" defTabSz="914400" rtl="0" eaLnBrk="1" latinLnBrk="0" hangingPunct="1">
+      <a:defRPr sz="1200" kern="1200">
+        <a:solidFill>
+          <a:schemeClr val="tx1"/>
+        </a:solidFill>
+        <a:latin typeface="+mn-lt"/>
+        <a:ea typeface="+mn-ea"/>
+        <a:cs typeface="+mn-cs"/>
+      </a:defRPr>
+    </a:lvl7pPr>
+    <a:lvl8pPr marL="3200400" algn="l" defTabSz="914400" rtl="0" eaLnBrk="1" latinLnBrk="0" hangingPunct="1">
+      <a:defRPr sz="1200" kern="1200">
+        <a:solidFill>
+          <a:schemeClr val="tx1"/>
+        </a:solidFill>
+        <a:latin typeface="+mn-lt"/>
+        <a:ea typeface="+mn-ea"/>
+        <a:cs typeface="+mn-cs"/>
+      </a:defRPr>
+    </a:lvl8pPr>
+    <a:lvl9pPr marL="3657600" algn="l" defTabSz="914400" rtl="0" eaLnBrk="1" latinLnBrk="0" hangingPunct="1">
+      <a:defRPr sz="1200" kern="1200">
+        <a:solidFill>
+          <a:schemeClr val="tx1"/>
+        </a:solidFill>
+        <a:latin typeface="+mn-lt"/>
+        <a:ea typeface="+mn-ea"/>
+        <a:cs typeface="+mn-cs"/>
+      </a:defRPr>
+    </a:lvl9pPr>
+  </p:notesStyle>
+</p:notesMaster>
+</file>
+
 <file path=ppt/slideLayouts/slideLayout1.xml><?xml version="1.0" encoding="utf-8"?>
 <p:sldLayout xmlns:a="http://schemas.openxmlformats.org/drawingml/2006/main" xmlns:r="http://schemas.openxmlformats.org/officeDocument/2006/relationships" xmlns:p="http://schemas.openxmlformats.org/presentationml/2006/main" showMasterSp="0" type="title" preserve="1">
   <p:cSld name="Title Slide">
@@ -3405,9 +3758,9 @@
           <a:bodyPr/>
           <a:lstStyle/>
           <a:p>
-            <a:fld id="{9184DA70-C731-4C70-880D-CCD4705E623C}" type="datetime1">
+            <a:fld id="{81273D60-3121-45F0-ADB5-F9A244FEE5EA}" type="datetime1">
               <a:rPr lang="en-US" smtClean="0"/>
-              <a:t>2/17/2022</a:t>
+              <a:t>2/20/2022</a:t>
             </a:fld>
             <a:endParaRPr lang="en-US" dirty="0"/>
           </a:p>
@@ -3593,9 +3946,9 @@
           <a:bodyPr/>
           <a:lstStyle/>
           <a:p>
-            <a:fld id="{4BE1D723-8F53-4F53-90B0-1982A396982E}" type="datetime1">
+            <a:fld id="{34016D6E-9B51-4B29-9A9C-A846006153DB}" type="datetime1">
               <a:rPr lang="en-US" smtClean="0"/>
-              <a:t>2/17/2022</a:t>
+              <a:t>2/20/2022</a:t>
             </a:fld>
             <a:endParaRPr lang="en-US" dirty="0"/>
           </a:p>
@@ -3966,9 +4319,9 @@
           <a:bodyPr/>
           <a:lstStyle/>
           <a:p>
-            <a:fld id="{97669AF7-7BEB-44E4-9852-375E34362B5B}" type="datetime1">
+            <a:fld id="{1B66323D-FDA0-47C6-A1A4-1E9E0FB0E248}" type="datetime1">
               <a:rPr lang="en-US" smtClean="0"/>
-              <a:t>2/17/2022</a:t>
+              <a:t>2/20/2022</a:t>
             </a:fld>
             <a:endParaRPr lang="en-US" dirty="0"/>
           </a:p>
@@ -4221,9 +4574,9 @@
           <a:bodyPr/>
           <a:lstStyle/>
           <a:p>
-            <a:fld id="{BAAAC38D-0552-4C82-B593-E6124DFADBE2}" type="datetime1">
+            <a:fld id="{55D1BC7F-0E84-4A9C-9288-73363F2579E3}" type="datetime1">
               <a:rPr lang="en-US" smtClean="0"/>
-              <a:t>2/17/2022</a:t>
+              <a:t>2/20/2022</a:t>
             </a:fld>
             <a:endParaRPr lang="en-US" dirty="0"/>
           </a:p>
@@ -4273,10 +4626,15 @@
         <p:spPr/>
         <p:txBody>
           <a:bodyPr/>
-          <a:lstStyle/>
+          <a:lstStyle>
+            <a:lvl1pPr>
+              <a:defRPr sz="1100" b="1"/>
+            </a:lvl1pPr>
+          </a:lstStyle>
           <a:p>
             <a:fld id="{3A98EE3D-8CD1-4C3F-BD1C-C98C9596463C}" type="slidenum">
               <a:rPr lang="en-US" smtClean="0"/>
+              <a:pPr/>
               <a:t>‹#›</a:t>
             </a:fld>
             <a:endParaRPr lang="en-US" dirty="0"/>
@@ -4618,9 +4976,9 @@
           <a:bodyPr/>
           <a:lstStyle/>
           <a:p>
-            <a:fld id="{D9DF0F1C-5577-4ACB-BB62-DF8F3C494C7E}" type="datetime1">
+            <a:fld id="{13555670-F8FD-46E8-AABE-381649464687}" type="datetime1">
               <a:rPr lang="en-US" smtClean="0"/>
-              <a:t>2/17/2022</a:t>
+              <a:t>2/20/2022</a:t>
             </a:fld>
             <a:endParaRPr lang="en-US" dirty="0"/>
           </a:p>
@@ -4754,9 +5112,9 @@
           <a:bodyPr/>
           <a:lstStyle/>
           <a:p>
-            <a:fld id="{1775B394-D9F9-4F0C-B15D-605F45CB9E9F}" type="datetime1">
+            <a:fld id="{EE0C3078-769F-4662-AB4B-9CCFDFDEE482}" type="datetime1">
               <a:rPr lang="en-US" smtClean="0"/>
-              <a:t>2/17/2022</a:t>
+              <a:t>2/20/2022</a:t>
             </a:fld>
             <a:endParaRPr lang="en-US" dirty="0"/>
           </a:p>
@@ -4911,9 +5269,9 @@
           <a:bodyPr/>
           <a:lstStyle/>
           <a:p>
-            <a:fld id="{39667345-2558-425A-8533-9BFDBCE15005}" type="datetime1">
+            <a:fld id="{A3FA4E93-0CE3-44A1-8415-9756B4044FDA}" type="datetime1">
               <a:rPr lang="en-US" smtClean="0"/>
-              <a:t>2/17/2022</a:t>
+              <a:t>2/20/2022</a:t>
             </a:fld>
             <a:endParaRPr lang="en-US" dirty="0"/>
           </a:p>
@@ -5240,9 +5598,9 @@
             </a:lvl1pPr>
           </a:lstStyle>
           <a:p>
-            <a:fld id="{92BEA474-078D-4E9B-9B14-09A87B19DC46}" type="datetime1">
+            <a:fld id="{6200A0A2-1323-4327-B9F8-3D51F5DB0465}" type="datetime1">
               <a:rPr lang="en-US" smtClean="0"/>
-              <a:t>2/17/2022</a:t>
+              <a:t>2/20/2022</a:t>
             </a:fld>
             <a:endParaRPr lang="en-US" dirty="0"/>
           </a:p>
@@ -5590,9 +5948,9 @@
             </a:lvl1pPr>
           </a:lstStyle>
           <a:p>
-            <a:fld id="{4907D986-8816-4272-A432-0437A28A9828}" type="datetime1">
+            <a:fld id="{827EE39F-7F6A-4643-ABD4-E403AA6F24C2}" type="datetime1">
               <a:rPr lang="en-US" smtClean="0"/>
-              <a:t>2/17/2022</a:t>
+              <a:t>2/20/2022</a:t>
             </a:fld>
             <a:endParaRPr lang="en-US" dirty="0"/>
           </a:p>
@@ -5851,9 +6209,9 @@
             </a:lvl1pPr>
           </a:lstStyle>
           <a:p>
-            <a:fld id="{62D6E202-B606-4609-B914-27C9371A1F6D}" type="datetime1">
+            <a:fld id="{9965C727-0E07-40FF-9A5F-3B4E23CD0814}" type="datetime1">
               <a:rPr lang="en-US" smtClean="0"/>
-              <a:t>2/17/2022</a:t>
+              <a:t>2/20/2022</a:t>
             </a:fld>
             <a:endParaRPr lang="en-US" dirty="0"/>
           </a:p>
@@ -5996,7 +6354,7 @@
     <p:sldLayoutId id="2147483668" r:id="rId8"/>
     <p:sldLayoutId id="2147483669" r:id="rId9"/>
   </p:sldLayoutIdLst>
-  <p:hf sldNum="0" hdr="0" ftr="0" dt="0"/>
+  <p:hf hdr="0" ftr="0" dt="0"/>
   <p:txStyles>
     <p:titleStyle>
       <a:lvl1pPr algn="l" defTabSz="914400" rtl="0" eaLnBrk="1" latinLnBrk="0" hangingPunct="1">
@@ -7111,6 +7469,35 @@
           </a:p>
         </p:txBody>
       </p:sp>
+      <p:sp>
+        <p:nvSpPr>
+          <p:cNvPr id="2" name="Slide Number Placeholder 1">
+            <a:extLst>
+              <a:ext uri="{FF2B5EF4-FFF2-40B4-BE49-F238E27FC236}">
+                <a16:creationId xmlns:a16="http://schemas.microsoft.com/office/drawing/2014/main" id="{40CD5225-43E7-4E86-AA06-93156B4DECAC}"/>
+              </a:ext>
+            </a:extLst>
+          </p:cNvPr>
+          <p:cNvSpPr>
+            <a:spLocks noGrp="1"/>
+          </p:cNvSpPr>
+          <p:nvPr>
+            <p:ph type="sldNum" sz="quarter" idx="12"/>
+          </p:nvPr>
+        </p:nvSpPr>
+        <p:spPr/>
+        <p:txBody>
+          <a:bodyPr/>
+          <a:lstStyle/>
+          <a:p>
+            <a:fld id="{3A98EE3D-8CD1-4C3F-BD1C-C98C9596463C}" type="slidenum">
+              <a:rPr lang="en-US" sz="1100" b="1" smtClean="0"/>
+              <a:t>1</a:t>
+            </a:fld>
+            <a:endParaRPr lang="en-US" sz="1100" b="1" dirty="0"/>
+          </a:p>
+        </p:txBody>
+      </p:sp>
     </p:spTree>
     <p:extLst>
       <p:ext uri="{BB962C8B-B14F-4D97-AF65-F5344CB8AC3E}">
@@ -7151,7 +7538,7 @@
       </p:grpSpPr>
       <p:sp>
         <p:nvSpPr>
-          <p:cNvPr id="71" name="Rectangle 70">
+          <p:cNvPr id="199" name="Rectangle 198">
             <a:extLst>
               <a:ext uri="{FF2B5EF4-FFF2-40B4-BE49-F238E27FC236}">
                 <a16:creationId xmlns:a16="http://schemas.microsoft.com/office/drawing/2014/main" id="{416A0E3C-60E6-4F39-BC55-5F7C224E1F7C}"/>
@@ -7206,7 +7593,7 @@
       </p:sp>
       <p:cxnSp>
         <p:nvCxnSpPr>
-          <p:cNvPr id="73" name="Straight Connector 72">
+          <p:cNvPr id="201" name="Straight Connector 200">
             <a:extLst>
               <a:ext uri="{FF2B5EF4-FFF2-40B4-BE49-F238E27FC236}">
                 <a16:creationId xmlns:a16="http://schemas.microsoft.com/office/drawing/2014/main" id="{C5025DAC-8B93-4160-B017-3A274A5828C0}"/>
@@ -7261,7 +7648,7 @@
       </p:cxnSp>
       <p:sp useBgFill="1">
         <p:nvSpPr>
-          <p:cNvPr id="75" name="Rectangle 74">
+          <p:cNvPr id="203" name="Rectangle 202">
             <a:extLst>
               <a:ext uri="{FF2B5EF4-FFF2-40B4-BE49-F238E27FC236}">
                 <a16:creationId xmlns:a16="http://schemas.microsoft.com/office/drawing/2014/main" id="{D40791F6-715D-481A-9C4A-3645AECFD5A0}"/>
@@ -7338,7 +7725,7 @@
         <p:spPr>
           <a:xfrm>
             <a:off x="642257" y="634946"/>
-            <a:ext cx="6432434" cy="1450757"/>
+            <a:ext cx="5453741" cy="1450757"/>
           </a:xfrm>
         </p:spPr>
         <p:txBody>
@@ -7348,15 +7735,20 @@
           <a:lstStyle/>
           <a:p>
             <a:r>
-              <a:rPr lang="en-US" sz="4800"/>
-              <a:t>Gestion des classes deséquilibrés</a:t>
-            </a:r>
+              <a:rPr lang="en-US" sz="4800" dirty="0"/>
+              <a:t>Gestion des classes </a:t>
+            </a:r>
+            <a:r>
+              <a:rPr lang="en-US" sz="4800" dirty="0" err="1"/>
+              <a:t>deséquilibrées</a:t>
+            </a:r>
+            <a:endParaRPr lang="en-US" sz="4800" dirty="0"/>
           </a:p>
         </p:txBody>
       </p:sp>
       <p:cxnSp>
         <p:nvCxnSpPr>
-          <p:cNvPr id="77" name="Straight Connector 76">
+          <p:cNvPr id="205" name="Straight Connector 204">
             <a:extLst>
               <a:ext uri="{FF2B5EF4-FFF2-40B4-BE49-F238E27FC236}">
                 <a16:creationId xmlns:a16="http://schemas.microsoft.com/office/drawing/2014/main" id="{740F83A4-FAC4-4867-95A5-BBFD280C7BF5}"/>
@@ -7379,8 +7771,8 @@
         </p:nvCxnSpPr>
         <p:spPr>
           <a:xfrm>
-            <a:off x="976240" y="2267421"/>
-            <a:ext cx="6035040" cy="0"/>
+            <a:off x="721553" y="2267421"/>
+            <a:ext cx="4846320" cy="0"/>
           </a:xfrm>
           <a:prstGeom prst="line">
             <a:avLst/>
@@ -7411,31 +7803,269 @@
       </p:cxnSp>
       <p:sp>
         <p:nvSpPr>
-          <p:cNvPr id="3" name="Content Placeholder 2">
+          <p:cNvPr id="12" name="Content Placeholder 2">
             <a:extLst>
               <a:ext uri="{FF2B5EF4-FFF2-40B4-BE49-F238E27FC236}">
-                <a16:creationId xmlns:a16="http://schemas.microsoft.com/office/drawing/2014/main" id="{18B3E540-C909-4DCD-985F-ADB73C699F4F}"/>
+                <a16:creationId xmlns:a16="http://schemas.microsoft.com/office/drawing/2014/main" id="{73554510-843E-4112-BD66-3F8EDBE203C0}"/>
               </a:ext>
             </a:extLst>
           </p:cNvPr>
-          <p:cNvSpPr>
-            <a:spLocks noGrp="1"/>
+          <p:cNvSpPr txBox="1">
+            <a:spLocks/>
           </p:cNvSpPr>
-          <p:nvPr>
-            <p:ph sz="half" idx="1"/>
-          </p:nvPr>
+          <p:nvPr/>
         </p:nvSpPr>
         <p:spPr>
           <a:xfrm>
             <a:off x="642257" y="2407436"/>
-            <a:ext cx="6432434" cy="3461658"/>
+            <a:ext cx="5453739" cy="3461658"/>
           </a:xfrm>
+          <a:prstGeom prst="rect">
+            <a:avLst/>
+          </a:prstGeom>
         </p:spPr>
         <p:txBody>
           <a:bodyPr vert="horz" lIns="0" tIns="45720" rIns="0" bIns="45720" rtlCol="0">
             <a:normAutofit/>
           </a:bodyPr>
-          <a:lstStyle/>
+          <a:lstStyle>
+            <a:lvl1pPr marL="91440" indent="-91440" algn="l" defTabSz="914400" rtl="0" eaLnBrk="1" latinLnBrk="0" hangingPunct="1">
+              <a:lnSpc>
+                <a:spcPct val="110000"/>
+              </a:lnSpc>
+              <a:spcBef>
+                <a:spcPts val="1200"/>
+              </a:spcBef>
+              <a:spcAft>
+                <a:spcPts val="200"/>
+              </a:spcAft>
+              <a:buClr>
+                <a:schemeClr val="accent1"/>
+              </a:buClr>
+              <a:buSzPct val="100000"/>
+              <a:buFont typeface="Calibri" panose="020F0502020204030204" pitchFamily="34" charset="0"/>
+              <a:buChar char=" "/>
+              <a:defRPr sz="2000" kern="1200">
+                <a:solidFill>
+                  <a:schemeClr val="tx1">
+                    <a:lumMod val="75000"/>
+                    <a:lumOff val="25000"/>
+                  </a:schemeClr>
+                </a:solidFill>
+                <a:latin typeface="+mn-lt"/>
+                <a:ea typeface="+mn-ea"/>
+                <a:cs typeface="+mn-cs"/>
+              </a:defRPr>
+            </a:lvl1pPr>
+            <a:lvl2pPr marL="384048" indent="-182880" algn="l" defTabSz="914400" rtl="0" eaLnBrk="1" latinLnBrk="0" hangingPunct="1">
+              <a:lnSpc>
+                <a:spcPct val="100000"/>
+              </a:lnSpc>
+              <a:spcBef>
+                <a:spcPts val="200"/>
+              </a:spcBef>
+              <a:spcAft>
+                <a:spcPts val="400"/>
+              </a:spcAft>
+              <a:buClrTx/>
+              <a:buFont typeface="Calibri" pitchFamily="34" charset="0"/>
+              <a:buChar char="◦"/>
+              <a:defRPr sz="1800" kern="1200">
+                <a:solidFill>
+                  <a:schemeClr val="tx1">
+                    <a:lumMod val="75000"/>
+                    <a:lumOff val="25000"/>
+                  </a:schemeClr>
+                </a:solidFill>
+                <a:latin typeface="+mn-lt"/>
+                <a:ea typeface="+mn-ea"/>
+                <a:cs typeface="+mn-cs"/>
+              </a:defRPr>
+            </a:lvl2pPr>
+            <a:lvl3pPr marL="566928" indent="-182880" algn="l" defTabSz="914400" rtl="0" eaLnBrk="1" latinLnBrk="0" hangingPunct="1">
+              <a:lnSpc>
+                <a:spcPct val="100000"/>
+              </a:lnSpc>
+              <a:spcBef>
+                <a:spcPts val="200"/>
+              </a:spcBef>
+              <a:spcAft>
+                <a:spcPts val="400"/>
+              </a:spcAft>
+              <a:buClrTx/>
+              <a:buFont typeface="Calibri" pitchFamily="34" charset="0"/>
+              <a:buChar char="◦"/>
+              <a:defRPr sz="1400" kern="1200">
+                <a:solidFill>
+                  <a:schemeClr val="tx1">
+                    <a:lumMod val="75000"/>
+                    <a:lumOff val="25000"/>
+                  </a:schemeClr>
+                </a:solidFill>
+                <a:latin typeface="+mn-lt"/>
+                <a:ea typeface="+mn-ea"/>
+                <a:cs typeface="+mn-cs"/>
+              </a:defRPr>
+            </a:lvl3pPr>
+            <a:lvl4pPr marL="749808" indent="-182880" algn="l" defTabSz="914400" rtl="0" eaLnBrk="1" latinLnBrk="0" hangingPunct="1">
+              <a:lnSpc>
+                <a:spcPct val="100000"/>
+              </a:lnSpc>
+              <a:spcBef>
+                <a:spcPts val="200"/>
+              </a:spcBef>
+              <a:spcAft>
+                <a:spcPts val="400"/>
+              </a:spcAft>
+              <a:buClrTx/>
+              <a:buFont typeface="Calibri" pitchFamily="34" charset="0"/>
+              <a:buChar char="◦"/>
+              <a:defRPr sz="1400" kern="1200">
+                <a:solidFill>
+                  <a:schemeClr val="tx1">
+                    <a:lumMod val="75000"/>
+                    <a:lumOff val="25000"/>
+                  </a:schemeClr>
+                </a:solidFill>
+                <a:latin typeface="+mn-lt"/>
+                <a:ea typeface="+mn-ea"/>
+                <a:cs typeface="+mn-cs"/>
+              </a:defRPr>
+            </a:lvl4pPr>
+            <a:lvl5pPr marL="932688" indent="-182880" algn="l" defTabSz="914400" rtl="0" eaLnBrk="1" latinLnBrk="0" hangingPunct="1">
+              <a:lnSpc>
+                <a:spcPct val="100000"/>
+              </a:lnSpc>
+              <a:spcBef>
+                <a:spcPts val="200"/>
+              </a:spcBef>
+              <a:spcAft>
+                <a:spcPts val="400"/>
+              </a:spcAft>
+              <a:buClrTx/>
+              <a:buFont typeface="Calibri" pitchFamily="34" charset="0"/>
+              <a:buChar char="◦"/>
+              <a:defRPr sz="1400" kern="1200">
+                <a:solidFill>
+                  <a:schemeClr val="tx1">
+                    <a:lumMod val="75000"/>
+                    <a:lumOff val="25000"/>
+                  </a:schemeClr>
+                </a:solidFill>
+                <a:latin typeface="+mn-lt"/>
+                <a:ea typeface="+mn-ea"/>
+                <a:cs typeface="+mn-cs"/>
+              </a:defRPr>
+            </a:lvl5pPr>
+            <a:lvl6pPr marL="1100000" indent="-228600" algn="l" defTabSz="914400" rtl="0" eaLnBrk="1" latinLnBrk="0" hangingPunct="1">
+              <a:lnSpc>
+                <a:spcPct val="90000"/>
+              </a:lnSpc>
+              <a:spcBef>
+                <a:spcPts val="200"/>
+              </a:spcBef>
+              <a:spcAft>
+                <a:spcPts val="400"/>
+              </a:spcAft>
+              <a:buClr>
+                <a:schemeClr val="accent1"/>
+              </a:buClr>
+              <a:buFont typeface="Calibri" pitchFamily="34" charset="0"/>
+              <a:buChar char="◦"/>
+              <a:defRPr sz="1400" kern="1200">
+                <a:solidFill>
+                  <a:schemeClr val="tx1">
+                    <a:lumMod val="75000"/>
+                    <a:lumOff val="25000"/>
+                  </a:schemeClr>
+                </a:solidFill>
+                <a:latin typeface="+mn-lt"/>
+                <a:ea typeface="+mn-ea"/>
+                <a:cs typeface="+mn-cs"/>
+              </a:defRPr>
+            </a:lvl6pPr>
+            <a:lvl7pPr marL="1300000" indent="-228600" algn="l" defTabSz="914400" rtl="0" eaLnBrk="1" latinLnBrk="0" hangingPunct="1">
+              <a:lnSpc>
+                <a:spcPct val="90000"/>
+              </a:lnSpc>
+              <a:spcBef>
+                <a:spcPts val="200"/>
+              </a:spcBef>
+              <a:spcAft>
+                <a:spcPts val="400"/>
+              </a:spcAft>
+              <a:buClr>
+                <a:schemeClr val="accent1"/>
+              </a:buClr>
+              <a:buFont typeface="Calibri" pitchFamily="34" charset="0"/>
+              <a:buChar char="◦"/>
+              <a:defRPr sz="1400" kern="1200">
+                <a:solidFill>
+                  <a:schemeClr val="tx1">
+                    <a:lumMod val="75000"/>
+                    <a:lumOff val="25000"/>
+                  </a:schemeClr>
+                </a:solidFill>
+                <a:latin typeface="+mn-lt"/>
+                <a:ea typeface="+mn-ea"/>
+                <a:cs typeface="+mn-cs"/>
+              </a:defRPr>
+            </a:lvl7pPr>
+            <a:lvl8pPr marL="1500000" indent="-228600" algn="l" defTabSz="914400" rtl="0" eaLnBrk="1" latinLnBrk="0" hangingPunct="1">
+              <a:lnSpc>
+                <a:spcPct val="90000"/>
+              </a:lnSpc>
+              <a:spcBef>
+                <a:spcPts val="200"/>
+              </a:spcBef>
+              <a:spcAft>
+                <a:spcPts val="400"/>
+              </a:spcAft>
+              <a:buClr>
+                <a:schemeClr val="accent1"/>
+              </a:buClr>
+              <a:buFont typeface="Calibri" pitchFamily="34" charset="0"/>
+              <a:buChar char="◦"/>
+              <a:defRPr sz="1400" kern="1200">
+                <a:solidFill>
+                  <a:schemeClr val="tx1">
+                    <a:lumMod val="75000"/>
+                    <a:lumOff val="25000"/>
+                  </a:schemeClr>
+                </a:solidFill>
+                <a:latin typeface="+mn-lt"/>
+                <a:ea typeface="+mn-ea"/>
+                <a:cs typeface="+mn-cs"/>
+              </a:defRPr>
+            </a:lvl8pPr>
+            <a:lvl9pPr marL="1700000" indent="-228600" algn="l" defTabSz="914400" rtl="0" eaLnBrk="1" latinLnBrk="0" hangingPunct="1">
+              <a:lnSpc>
+                <a:spcPct val="90000"/>
+              </a:lnSpc>
+              <a:spcBef>
+                <a:spcPts val="200"/>
+              </a:spcBef>
+              <a:spcAft>
+                <a:spcPts val="400"/>
+              </a:spcAft>
+              <a:buClr>
+                <a:schemeClr val="accent1"/>
+              </a:buClr>
+              <a:buFont typeface="Calibri" pitchFamily="34" charset="0"/>
+              <a:buChar char="◦"/>
+              <a:defRPr sz="1400" kern="1200">
+                <a:solidFill>
+                  <a:schemeClr val="tx1">
+                    <a:lumMod val="75000"/>
+                    <a:lumOff val="25000"/>
+                  </a:schemeClr>
+                </a:solidFill>
+                <a:latin typeface="+mn-lt"/>
+                <a:ea typeface="+mn-ea"/>
+                <a:cs typeface="+mn-cs"/>
+              </a:defRPr>
+            </a:lvl9pPr>
+          </a:lstStyle>
           <a:p>
             <a:pPr>
               <a:lnSpc>
@@ -7443,16 +8073,8 @@
               </a:lnSpc>
             </a:pPr>
             <a:r>
-              <a:rPr lang="en-US" dirty="0"/>
-              <a:t>1. </a:t>
-            </a:r>
-            <a:r>
-              <a:rPr lang="en-US" dirty="0" err="1"/>
-              <a:t>Class_weight</a:t>
-            </a:r>
-            <a:r>
-              <a:rPr lang="en-US" dirty="0"/>
-              <a:t> = ‘balanced’</a:t>
+              <a:rPr lang="en-US"/>
+              <a:t>1. Class_weight = ‘balanced’</a:t>
             </a:r>
           </a:p>
           <a:p>
@@ -7462,30 +8084,9 @@
               </a:lnSpc>
             </a:pPr>
             <a:r>
-              <a:rPr lang="en-US" dirty="0"/>
-              <a:t>2. SMOTE, un technique de </a:t>
-            </a:r>
-            <a:r>
-              <a:rPr lang="en-US" dirty="0" err="1"/>
-              <a:t>undersampling</a:t>
-            </a:r>
-            <a:r>
-              <a:rPr lang="en-US" dirty="0"/>
-              <a:t>: </a:t>
-            </a:r>
-            <a:r>
-              <a:rPr lang="en-US" dirty="0" err="1"/>
-              <a:t>encombre</a:t>
-            </a:r>
-            <a:r>
-              <a:rPr lang="en-US" dirty="0"/>
-              <a:t> la </a:t>
-            </a:r>
-            <a:r>
-              <a:rPr lang="en-US" dirty="0" err="1"/>
-              <a:t>mémoire</a:t>
-            </a:r>
-            <a:endParaRPr lang="en-US" dirty="0"/>
+              <a:rPr lang="en-US"/>
+              <a:t>ou scale_pos_weight = class1 / classe0 pour XGB</a:t>
+            </a:r>
           </a:p>
           <a:p>
             <a:pPr>
@@ -7494,17 +8095,28 @@
               </a:lnSpc>
             </a:pPr>
             <a:r>
-              <a:rPr lang="en-US" dirty="0"/>
-              <a:t>3. Il faut essayer avec des techniques de </a:t>
-            </a:r>
-            <a:r>
-              <a:rPr lang="en-US" dirty="0" err="1"/>
-              <a:t>undersampling</a:t>
-            </a:r>
-            <a:r>
-              <a:rPr lang="en-US" dirty="0"/>
-              <a:t> (Tomek Links, ENN)</a:t>
-            </a:r>
+              <a:rPr lang="en-US"/>
+              <a:t>2. SMOTE, une technique de oversampling: encombre la mémoire</a:t>
+            </a:r>
+          </a:p>
+          <a:p>
+            <a:pPr>
+              <a:lnSpc>
+                <a:spcPct val="100000"/>
+              </a:lnSpc>
+            </a:pPr>
+            <a:r>
+              <a:rPr lang="en-US"/>
+              <a:t>3. Il faut essayer avec des techniques de undersampling (Tomek Links, ENN)</a:t>
+            </a:r>
+          </a:p>
+          <a:p>
+            <a:pPr>
+              <a:lnSpc>
+                <a:spcPct val="100000"/>
+              </a:lnSpc>
+            </a:pPr>
+            <a:endParaRPr lang="en-US" dirty="0"/>
           </a:p>
         </p:txBody>
       </p:sp>
@@ -7532,8 +8144,8 @@
         </p:blipFill>
         <p:spPr>
           <a:xfrm>
-            <a:off x="7556687" y="924146"/>
-            <a:ext cx="4001315" cy="1940637"/>
+            <a:off x="6738255" y="725676"/>
+            <a:ext cx="4819748" cy="2337577"/>
           </a:xfrm>
           <a:prstGeom prst="rect">
             <a:avLst/>
@@ -7568,8 +8180,8 @@
         </p:blipFill>
         <p:spPr bwMode="auto">
           <a:xfrm>
-            <a:off x="7644653" y="3257225"/>
-            <a:ext cx="3596348" cy="2697261"/>
+            <a:off x="8984995" y="3189543"/>
+            <a:ext cx="2977267" cy="2232949"/>
           </a:xfrm>
           <a:prstGeom prst="rect">
             <a:avLst/>
@@ -7588,7 +8200,7 @@
       </p:pic>
       <p:sp>
         <p:nvSpPr>
-          <p:cNvPr id="79" name="Rectangle 78">
+          <p:cNvPr id="207" name="Rectangle 206">
             <a:extLst>
               <a:ext uri="{FF2B5EF4-FFF2-40B4-BE49-F238E27FC236}">
                 <a16:creationId xmlns:a16="http://schemas.microsoft.com/office/drawing/2014/main" id="{811CBAFA-D7E0-40A7-BB94-2C05304B407B}"/>
@@ -7641,6 +8253,99 @@
           </a:fontRef>
         </p:style>
       </p:sp>
+      <p:sp>
+        <p:nvSpPr>
+          <p:cNvPr id="4" name="Slide Number Placeholder 3">
+            <a:extLst>
+              <a:ext uri="{FF2B5EF4-FFF2-40B4-BE49-F238E27FC236}">
+                <a16:creationId xmlns:a16="http://schemas.microsoft.com/office/drawing/2014/main" id="{48811C7E-CDDB-4066-B38F-4146B925F68E}"/>
+              </a:ext>
+            </a:extLst>
+          </p:cNvPr>
+          <p:cNvSpPr>
+            <a:spLocks noGrp="1"/>
+          </p:cNvSpPr>
+          <p:nvPr>
+            <p:ph type="sldNum" sz="quarter" idx="12"/>
+          </p:nvPr>
+        </p:nvSpPr>
+        <p:spPr>
+          <a:xfrm>
+            <a:off x="10993582" y="6446838"/>
+            <a:ext cx="780010" cy="365125"/>
+          </a:xfrm>
+        </p:spPr>
+        <p:txBody>
+          <a:bodyPr vert="horz" lIns="91440" tIns="45720" rIns="91440" bIns="45720" rtlCol="0" anchor="ctr">
+            <a:normAutofit/>
+          </a:bodyPr>
+          <a:lstStyle/>
+          <a:p>
+            <a:pPr>
+              <a:spcAft>
+                <a:spcPts val="600"/>
+              </a:spcAft>
+            </a:pPr>
+            <a:fld id="{3A98EE3D-8CD1-4C3F-BD1C-C98C9596463C}" type="slidenum">
+              <a:rPr lang="en-US" sz="1050" smtClean="0"/>
+              <a:pPr>
+                <a:spcAft>
+                  <a:spcPts val="600"/>
+                </a:spcAft>
+              </a:pPr>
+              <a:t>10</a:t>
+            </a:fld>
+            <a:endParaRPr lang="en-US" sz="1050"/>
+          </a:p>
+        </p:txBody>
+      </p:sp>
+      <p:pic>
+        <p:nvPicPr>
+          <p:cNvPr id="1028" name="Picture 4">
+            <a:extLst>
+              <a:ext uri="{FF2B5EF4-FFF2-40B4-BE49-F238E27FC236}">
+                <a16:creationId xmlns:a16="http://schemas.microsoft.com/office/drawing/2014/main" id="{B1881914-084D-4302-9A11-207B2DD462D0}"/>
+              </a:ext>
+            </a:extLst>
+          </p:cNvPr>
+          <p:cNvPicPr>
+            <a:picLocks noChangeAspect="1" noChangeArrowheads="1"/>
+          </p:cNvPicPr>
+          <p:nvPr/>
+        </p:nvPicPr>
+        <p:blipFill>
+          <a:blip r:embed="rId4">
+            <a:extLst>
+              <a:ext uri="{28A0092B-C50C-407E-A947-70E740481C1C}">
+                <a14:useLocalDpi xmlns:a14="http://schemas.microsoft.com/office/drawing/2010/main" val="0"/>
+              </a:ext>
+            </a:extLst>
+          </a:blip>
+          <a:srcRect/>
+          <a:stretch>
+            <a:fillRect/>
+          </a:stretch>
+        </p:blipFill>
+        <p:spPr bwMode="auto">
+          <a:xfrm>
+            <a:off x="5473732" y="3384986"/>
+            <a:ext cx="3406210" cy="2037504"/>
+          </a:xfrm>
+          <a:prstGeom prst="rect">
+            <a:avLst/>
+          </a:prstGeom>
+          <a:noFill/>
+          <a:extLst>
+            <a:ext uri="{909E8E84-426E-40DD-AFC4-6F175D3DCCD1}">
+              <a14:hiddenFill xmlns:a14="http://schemas.microsoft.com/office/drawing/2010/main">
+                <a:solidFill>
+                  <a:srgbClr val="FFFFFF"/>
+                </a:solidFill>
+              </a14:hiddenFill>
+            </a:ext>
+          </a:extLst>
+        </p:spPr>
+      </p:pic>
     </p:spTree>
     <p:extLst>
       <p:ext uri="{BB962C8B-B14F-4D97-AF65-F5344CB8AC3E}">
@@ -8225,6 +8930,35 @@
           </a:p>
         </p:txBody>
       </p:sp>
+      <p:sp>
+        <p:nvSpPr>
+          <p:cNvPr id="6" name="Slide Number Placeholder 5">
+            <a:extLst>
+              <a:ext uri="{FF2B5EF4-FFF2-40B4-BE49-F238E27FC236}">
+                <a16:creationId xmlns:a16="http://schemas.microsoft.com/office/drawing/2014/main" id="{08718FC9-1BD5-4E94-AC87-75D026A079B3}"/>
+              </a:ext>
+            </a:extLst>
+          </p:cNvPr>
+          <p:cNvSpPr>
+            <a:spLocks noGrp="1"/>
+          </p:cNvSpPr>
+          <p:nvPr>
+            <p:ph type="sldNum" sz="quarter" idx="12"/>
+          </p:nvPr>
+        </p:nvSpPr>
+        <p:spPr/>
+        <p:txBody>
+          <a:bodyPr/>
+          <a:lstStyle/>
+          <a:p>
+            <a:fld id="{3A98EE3D-8CD1-4C3F-BD1C-C98C9596463C}" type="slidenum">
+              <a:rPr lang="en-US" smtClean="0"/>
+              <a:t>11</a:t>
+            </a:fld>
+            <a:endParaRPr lang="en-US" dirty="0"/>
+          </a:p>
+        </p:txBody>
+      </p:sp>
     </p:spTree>
     <p:extLst>
       <p:ext uri="{BB962C8B-B14F-4D97-AF65-F5344CB8AC3E}">
@@ -8449,45 +9183,68 @@
           <a:lstStyle/>
           <a:p>
             <a:r>
+              <a:rPr lang="fr-FR" dirty="0" err="1"/>
+              <a:t>Accuracy</a:t>
+            </a:r>
+            <a:r>
+              <a:rPr lang="fr-FR" dirty="0"/>
+              <a:t> estime </a:t>
+            </a:r>
+            <a:r>
+              <a:rPr lang="fr-FR" dirty="0" err="1"/>
+              <a:t>Dummy</a:t>
+            </a:r>
+            <a:r>
+              <a:rPr lang="fr-FR" dirty="0"/>
+              <a:t> Classifier à 92% - ne convient pas pour des classes </a:t>
+            </a:r>
+            <a:r>
+              <a:rPr lang="fr-FR" dirty="0" err="1"/>
+              <a:t>désequilibrées</a:t>
+            </a:r>
+            <a:endParaRPr lang="fr-FR" dirty="0"/>
+          </a:p>
+          <a:p>
+            <a:r>
               <a:rPr lang="fr-FR" dirty="0"/>
               <a:t>Comparer des modèles par ROC_AUC (FN vs FP)</a:t>
             </a:r>
           </a:p>
           <a:p>
             <a:r>
-              <a:rPr lang="fr-FR" dirty="0"/>
+              <a:rPr lang="fr-FR" b="1" dirty="0"/>
               <a:t>Le meilleur modèle est </a:t>
             </a:r>
             <a:r>
-              <a:rPr lang="fr-FR" dirty="0" err="1"/>
+              <a:rPr lang="fr-FR" b="1" dirty="0" err="1"/>
               <a:t>Logistic</a:t>
             </a:r>
             <a:r>
-              <a:rPr lang="fr-FR" dirty="0"/>
+              <a:rPr lang="fr-FR" b="1" dirty="0"/>
               <a:t> </a:t>
             </a:r>
             <a:r>
-              <a:rPr lang="fr-FR" dirty="0" err="1"/>
+              <a:rPr lang="fr-FR" b="1" dirty="0" err="1"/>
               <a:t>Regression</a:t>
             </a:r>
             <a:r>
-              <a:rPr lang="fr-FR" dirty="0"/>
+              <a:rPr lang="fr-FR" b="1" dirty="0"/>
               <a:t> avec </a:t>
             </a:r>
             <a:r>
-              <a:rPr lang="fr-FR" dirty="0" err="1"/>
+              <a:rPr lang="fr-FR" b="1" dirty="0" err="1"/>
               <a:t>class_weight</a:t>
             </a:r>
             <a:r>
-              <a:rPr lang="fr-FR" dirty="0"/>
+              <a:rPr lang="fr-FR" b="1" dirty="0"/>
               <a:t> ‘</a:t>
             </a:r>
             <a:r>
-              <a:rPr lang="fr-FR" dirty="0" err="1"/>
+              <a:rPr lang="fr-FR" b="1" dirty="0" err="1"/>
               <a:t>balanced</a:t>
             </a:r>
             <a:r>
-              <a:rPr lang="fr-FR" dirty="0"/>
+              <a:rPr lang="fr-FR" b="1" dirty="0"/>
               <a:t>’</a:t>
             </a:r>
           </a:p>
@@ -8683,6 +9440,40 @@
           </a:prstGeom>
         </p:spPr>
       </p:pic>
+      <p:sp>
+        <p:nvSpPr>
+          <p:cNvPr id="11" name="Slide Number Placeholder 1">
+            <a:extLst>
+              <a:ext uri="{FF2B5EF4-FFF2-40B4-BE49-F238E27FC236}">
+                <a16:creationId xmlns:a16="http://schemas.microsoft.com/office/drawing/2014/main" id="{CD52EF9E-5118-43C9-9CCF-850CD6FA2D96}"/>
+              </a:ext>
+            </a:extLst>
+          </p:cNvPr>
+          <p:cNvSpPr>
+            <a:spLocks noGrp="1"/>
+          </p:cNvSpPr>
+          <p:nvPr>
+            <p:ph type="sldNum" sz="quarter" idx="12"/>
+          </p:nvPr>
+        </p:nvSpPr>
+        <p:spPr>
+          <a:xfrm>
+            <a:off x="10993582" y="6446838"/>
+            <a:ext cx="780010" cy="365125"/>
+          </a:xfrm>
+        </p:spPr>
+        <p:txBody>
+          <a:bodyPr/>
+          <a:lstStyle/>
+          <a:p>
+            <a:fld id="{3A98EE3D-8CD1-4C3F-BD1C-C98C9596463C}" type="slidenum">
+              <a:rPr lang="en-US" sz="1100" b="1" smtClean="0"/>
+              <a:t>12</a:t>
+            </a:fld>
+            <a:endParaRPr lang="en-US" sz="1100" b="1" dirty="0"/>
+          </a:p>
+        </p:txBody>
+      </p:sp>
     </p:spTree>
     <p:extLst>
       <p:ext uri="{BB962C8B-B14F-4D97-AF65-F5344CB8AC3E}">
@@ -8697,6 +9488,653 @@
 </file>
 
 <file path=ppt/slides/slide13.xml><?xml version="1.0" encoding="utf-8"?>
+<p:sld xmlns:a="http://schemas.openxmlformats.org/drawingml/2006/main" xmlns:r="http://schemas.openxmlformats.org/officeDocument/2006/relationships" xmlns:p="http://schemas.openxmlformats.org/presentationml/2006/main">
+  <p:cSld>
+    <p:bg>
+      <p:bgPr>
+        <a:solidFill>
+          <a:schemeClr val="bg1"/>
+        </a:solidFill>
+        <a:effectLst/>
+      </p:bgPr>
+    </p:bg>
+    <p:spTree>
+      <p:nvGrpSpPr>
+        <p:cNvPr id="1" name=""/>
+        <p:cNvGrpSpPr/>
+        <p:nvPr/>
+      </p:nvGrpSpPr>
+      <p:grpSpPr>
+        <a:xfrm>
+          <a:off x="0" y="0"/>
+          <a:ext cx="0" cy="0"/>
+          <a:chOff x="0" y="0"/>
+          <a:chExt cx="0" cy="0"/>
+        </a:xfrm>
+      </p:grpSpPr>
+      <p:sp>
+        <p:nvSpPr>
+          <p:cNvPr id="38" name="Rectangle 27">
+            <a:extLst>
+              <a:ext uri="{FF2B5EF4-FFF2-40B4-BE49-F238E27FC236}">
+                <a16:creationId xmlns:a16="http://schemas.microsoft.com/office/drawing/2014/main" id="{416A0E3C-60E6-4F39-BC55-5F7C224E1F7C}"/>
+              </a:ext>
+              <a:ext uri="{C183D7F6-B498-43B3-948B-1728B52AA6E4}">
+                <adec:decorative xmlns:adec="http://schemas.microsoft.com/office/drawing/2017/decorative" val="1"/>
+              </a:ext>
+            </a:extLst>
+          </p:cNvPr>
+          <p:cNvSpPr>
+            <a:spLocks noGrp="1" noRot="1" noChangeAspect="1" noMove="1" noResize="1" noEditPoints="1" noAdjustHandles="1" noChangeArrowheads="1" noChangeShapeType="1" noTextEdit="1"/>
+          </p:cNvSpPr>
+          <p:nvPr>
+            <p:extLst>
+              <p:ext uri="{386F3935-93C4-4BCD-93E2-E3B085C9AB24}">
+                <p16:designElem xmlns:p16="http://schemas.microsoft.com/office/powerpoint/2015/main" val="1"/>
+              </p:ext>
+            </p:extLst>
+          </p:nvPr>
+        </p:nvSpPr>
+        <p:spPr>
+          <a:xfrm>
+            <a:off x="3175" y="6400800"/>
+            <a:ext cx="12188825" cy="457200"/>
+          </a:xfrm>
+          <a:prstGeom prst="rect">
+            <a:avLst/>
+          </a:prstGeom>
+          <a:solidFill>
+            <a:srgbClr val="262626"/>
+          </a:solidFill>
+          <a:ln>
+            <a:noFill/>
+          </a:ln>
+        </p:spPr>
+        <p:style>
+          <a:lnRef idx="2">
+            <a:schemeClr val="accent1">
+              <a:shade val="50000"/>
+            </a:schemeClr>
+          </a:lnRef>
+          <a:fillRef idx="1">
+            <a:schemeClr val="accent1"/>
+          </a:fillRef>
+          <a:effectRef idx="0">
+            <a:schemeClr val="accent1"/>
+          </a:effectRef>
+          <a:fontRef idx="minor">
+            <a:schemeClr val="lt1"/>
+          </a:fontRef>
+        </p:style>
+      </p:sp>
+      <p:cxnSp>
+        <p:nvCxnSpPr>
+          <p:cNvPr id="39" name="Straight Connector 29">
+            <a:extLst>
+              <a:ext uri="{FF2B5EF4-FFF2-40B4-BE49-F238E27FC236}">
+                <a16:creationId xmlns:a16="http://schemas.microsoft.com/office/drawing/2014/main" id="{C5025DAC-8B93-4160-B017-3A274A5828C0}"/>
+              </a:ext>
+              <a:ext uri="{C183D7F6-B498-43B3-948B-1728B52AA6E4}">
+                <adec:decorative xmlns:adec="http://schemas.microsoft.com/office/drawing/2017/decorative" val="1"/>
+              </a:ext>
+            </a:extLst>
+          </p:cNvPr>
+          <p:cNvCxnSpPr>
+            <a:cxnSpLocks noGrp="1" noRot="1" noChangeAspect="1" noMove="1" noResize="1" noEditPoints="1" noAdjustHandles="1" noChangeArrowheads="1" noChangeShapeType="1"/>
+          </p:cNvCxnSpPr>
+          <p:nvPr>
+            <p:extLst>
+              <p:ext uri="{386F3935-93C4-4BCD-93E2-E3B085C9AB24}">
+                <p16:designElem xmlns:p16="http://schemas.microsoft.com/office/powerpoint/2015/main" val="1"/>
+              </p:ext>
+            </p:extLst>
+          </p:nvPr>
+        </p:nvCxnSpPr>
+        <p:spPr>
+          <a:xfrm>
+            <a:off x="1193532" y="1897380"/>
+            <a:ext cx="9966960" cy="0"/>
+          </a:xfrm>
+          <a:prstGeom prst="line">
+            <a:avLst/>
+          </a:prstGeom>
+          <a:ln w="12700">
+            <a:solidFill>
+              <a:schemeClr val="tx1">
+                <a:lumMod val="75000"/>
+                <a:lumOff val="25000"/>
+              </a:schemeClr>
+            </a:solidFill>
+          </a:ln>
+        </p:spPr>
+        <p:style>
+          <a:lnRef idx="1">
+            <a:schemeClr val="accent1"/>
+          </a:lnRef>
+          <a:fillRef idx="0">
+            <a:schemeClr val="accent1"/>
+          </a:fillRef>
+          <a:effectRef idx="0">
+            <a:schemeClr val="accent1"/>
+          </a:effectRef>
+          <a:fontRef idx="minor">
+            <a:schemeClr val="tx1"/>
+          </a:fontRef>
+        </p:style>
+      </p:cxnSp>
+      <p:sp useBgFill="1">
+        <p:nvSpPr>
+          <p:cNvPr id="40" name="Rectangle 31">
+            <a:extLst>
+              <a:ext uri="{FF2B5EF4-FFF2-40B4-BE49-F238E27FC236}">
+                <a16:creationId xmlns:a16="http://schemas.microsoft.com/office/drawing/2014/main" id="{990D0034-F768-41E7-85D4-F38C4DE85770}"/>
+              </a:ext>
+              <a:ext uri="{C183D7F6-B498-43B3-948B-1728B52AA6E4}">
+                <adec:decorative xmlns:adec="http://schemas.microsoft.com/office/drawing/2017/decorative" val="1"/>
+              </a:ext>
+            </a:extLst>
+          </p:cNvPr>
+          <p:cNvSpPr>
+            <a:spLocks noGrp="1" noRot="1" noChangeAspect="1" noMove="1" noResize="1" noEditPoints="1" noAdjustHandles="1" noChangeArrowheads="1" noChangeShapeType="1" noTextEdit="1"/>
+          </p:cNvSpPr>
+          <p:nvPr>
+            <p:extLst>
+              <p:ext uri="{386F3935-93C4-4BCD-93E2-E3B085C9AB24}">
+                <p16:designElem xmlns:p16="http://schemas.microsoft.com/office/powerpoint/2015/main" val="1"/>
+              </p:ext>
+            </p:extLst>
+          </p:nvPr>
+        </p:nvSpPr>
+        <p:spPr>
+          <a:xfrm>
+            <a:off x="0" y="0"/>
+            <a:ext cx="12186315" cy="6858000"/>
+          </a:xfrm>
+          <a:prstGeom prst="rect">
+            <a:avLst/>
+          </a:prstGeom>
+          <a:ln>
+            <a:noFill/>
+          </a:ln>
+        </p:spPr>
+        <p:style>
+          <a:lnRef idx="2">
+            <a:schemeClr val="accent6">
+              <a:shade val="50000"/>
+            </a:schemeClr>
+          </a:lnRef>
+          <a:fillRef idx="1001">
+            <a:schemeClr val="lt1"/>
+          </a:fillRef>
+          <a:effectRef idx="0">
+            <a:schemeClr val="accent6"/>
+          </a:effectRef>
+          <a:fontRef idx="minor">
+            <a:schemeClr val="lt1"/>
+          </a:fontRef>
+        </p:style>
+        <p:txBody>
+          <a:bodyPr rtlCol="0" anchor="ctr"/>
+          <a:lstStyle/>
+          <a:p>
+            <a:pPr marL="0" marR="0" lvl="0" indent="0" algn="ctr" defTabSz="914400" rtl="0" eaLnBrk="1" fontAlgn="auto" latinLnBrk="0" hangingPunct="1">
+              <a:lnSpc>
+                <a:spcPct val="100000"/>
+              </a:lnSpc>
+              <a:spcBef>
+                <a:spcPts val="0"/>
+              </a:spcBef>
+              <a:spcAft>
+                <a:spcPts val="0"/>
+              </a:spcAft>
+              <a:buClrTx/>
+              <a:buSzTx/>
+              <a:buFontTx/>
+              <a:buNone/>
+              <a:tabLst/>
+              <a:defRPr/>
+            </a:pPr>
+            <a:endParaRPr kumimoji="0" lang="en-US" sz="1800" b="0" i="0" u="none" strike="noStrike" kern="1200" cap="none" spc="0" normalizeH="0" baseline="0" noProof="0">
+              <a:ln>
+                <a:noFill/>
+              </a:ln>
+              <a:solidFill>
+                <a:srgbClr val="FFFFFF"/>
+              </a:solidFill>
+              <a:effectLst/>
+              <a:uLnTx/>
+              <a:uFillTx/>
+              <a:latin typeface="Speak Pro" panose="020F0502020204030204"/>
+              <a:ea typeface="+mn-ea"/>
+              <a:cs typeface="+mn-cs"/>
+            </a:endParaRPr>
+          </a:p>
+        </p:txBody>
+      </p:sp>
+      <p:cxnSp>
+        <p:nvCxnSpPr>
+          <p:cNvPr id="41" name="Straight Connector 33">
+            <a:extLst>
+              <a:ext uri="{FF2B5EF4-FFF2-40B4-BE49-F238E27FC236}">
+                <a16:creationId xmlns:a16="http://schemas.microsoft.com/office/drawing/2014/main" id="{5A0A5CF6-407C-4691-8122-49DF69D0020D}"/>
+              </a:ext>
+              <a:ext uri="{C183D7F6-B498-43B3-948B-1728B52AA6E4}">
+                <adec:decorative xmlns:adec="http://schemas.microsoft.com/office/drawing/2017/decorative" val="1"/>
+              </a:ext>
+            </a:extLst>
+          </p:cNvPr>
+          <p:cNvCxnSpPr>
+            <a:cxnSpLocks noGrp="1" noRot="1" noChangeAspect="1" noMove="1" noResize="1" noEditPoints="1" noAdjustHandles="1" noChangeArrowheads="1" noChangeShapeType="1"/>
+          </p:cNvCxnSpPr>
+          <p:nvPr>
+            <p:extLst>
+              <p:ext uri="{386F3935-93C4-4BCD-93E2-E3B085C9AB24}">
+                <p16:designElem xmlns:p16="http://schemas.microsoft.com/office/powerpoint/2015/main" val="1"/>
+              </p:ext>
+            </p:extLst>
+          </p:nvPr>
+        </p:nvCxnSpPr>
+        <p:spPr>
+          <a:xfrm>
+            <a:off x="590927" y="2633962"/>
+            <a:ext cx="2834640" cy="0"/>
+          </a:xfrm>
+          <a:prstGeom prst="line">
+            <a:avLst/>
+          </a:prstGeom>
+          <a:ln w="12700">
+            <a:solidFill>
+              <a:schemeClr val="tx1">
+                <a:lumMod val="75000"/>
+                <a:lumOff val="25000"/>
+              </a:schemeClr>
+            </a:solidFill>
+          </a:ln>
+        </p:spPr>
+        <p:style>
+          <a:lnRef idx="1">
+            <a:schemeClr val="accent1"/>
+          </a:lnRef>
+          <a:fillRef idx="0">
+            <a:schemeClr val="accent1"/>
+          </a:fillRef>
+          <a:effectRef idx="0">
+            <a:schemeClr val="accent1"/>
+          </a:effectRef>
+          <a:fontRef idx="minor">
+            <a:schemeClr val="tx1"/>
+          </a:fontRef>
+        </p:style>
+      </p:cxnSp>
+      <p:sp>
+        <p:nvSpPr>
+          <p:cNvPr id="14" name="Title 3">
+            <a:extLst>
+              <a:ext uri="{FF2B5EF4-FFF2-40B4-BE49-F238E27FC236}">
+                <a16:creationId xmlns:a16="http://schemas.microsoft.com/office/drawing/2014/main" id="{0EB149D9-C2EF-4542-8E66-4A0CD0737117}"/>
+              </a:ext>
+            </a:extLst>
+          </p:cNvPr>
+          <p:cNvSpPr txBox="1">
+            <a:spLocks/>
+          </p:cNvSpPr>
+          <p:nvPr/>
+        </p:nvSpPr>
+        <p:spPr>
+          <a:xfrm>
+            <a:off x="477078" y="516836"/>
+            <a:ext cx="3100136" cy="1960234"/>
+          </a:xfrm>
+          <a:prstGeom prst="rect">
+            <a:avLst/>
+          </a:prstGeom>
+        </p:spPr>
+        <p:txBody>
+          <a:bodyPr vert="horz" lIns="91440" tIns="45720" rIns="91440" bIns="45720" rtlCol="0" anchor="b">
+            <a:normAutofit/>
+          </a:bodyPr>
+          <a:lstStyle>
+            <a:lvl1pPr algn="l" defTabSz="914400" rtl="0" eaLnBrk="1" latinLnBrk="0" hangingPunct="1">
+              <a:lnSpc>
+                <a:spcPct val="90000"/>
+              </a:lnSpc>
+              <a:spcBef>
+                <a:spcPct val="0"/>
+              </a:spcBef>
+              <a:buNone/>
+              <a:defRPr sz="3600" b="0" kern="1200" spc="-50" baseline="0">
+                <a:solidFill>
+                  <a:srgbClr val="FFFFFF"/>
+                </a:solidFill>
+                <a:latin typeface="+mj-lt"/>
+                <a:ea typeface="+mj-ea"/>
+                <a:cs typeface="+mj-cs"/>
+              </a:defRPr>
+            </a:lvl1pPr>
+          </a:lstStyle>
+          <a:p>
+            <a:r>
+              <a:rPr lang="en-US" sz="3400">
+                <a:solidFill>
+                  <a:schemeClr val="tx1"/>
+                </a:solidFill>
+              </a:rPr>
+              <a:t>L’interprétabilité locale du modèle</a:t>
+            </a:r>
+            <a:endParaRPr lang="en-US" sz="3400" dirty="0">
+              <a:solidFill>
+                <a:schemeClr val="tx1"/>
+              </a:solidFill>
+            </a:endParaRPr>
+          </a:p>
+        </p:txBody>
+      </p:sp>
+      <p:pic>
+        <p:nvPicPr>
+          <p:cNvPr id="15" name="Picture 6">
+            <a:extLst>
+              <a:ext uri="{FF2B5EF4-FFF2-40B4-BE49-F238E27FC236}">
+                <a16:creationId xmlns:a16="http://schemas.microsoft.com/office/drawing/2014/main" id="{B7E842E0-8BAE-415A-B83F-C3EBD884F4B3}"/>
+              </a:ext>
+            </a:extLst>
+          </p:cNvPr>
+          <p:cNvPicPr>
+            <a:picLocks noChangeAspect="1" noChangeArrowheads="1"/>
+          </p:cNvPicPr>
+          <p:nvPr/>
+        </p:nvPicPr>
+        <p:blipFill>
+          <a:blip r:embed="rId2">
+            <a:extLst>
+              <a:ext uri="{28A0092B-C50C-407E-A947-70E740481C1C}">
+                <a14:useLocalDpi xmlns:a14="http://schemas.microsoft.com/office/drawing/2010/main" val="0"/>
+              </a:ext>
+            </a:extLst>
+          </a:blip>
+          <a:stretch>
+            <a:fillRect/>
+          </a:stretch>
+        </p:blipFill>
+        <p:spPr bwMode="auto">
+          <a:xfrm>
+            <a:off x="6832475" y="116417"/>
+            <a:ext cx="3380581" cy="1884673"/>
+          </a:xfrm>
+          <a:prstGeom prst="rect">
+            <a:avLst/>
+          </a:prstGeom>
+          <a:noFill/>
+          <a:extLst>
+            <a:ext uri="{909E8E84-426E-40DD-AFC4-6F175D3DCCD1}">
+              <a14:hiddenFill xmlns:a14="http://schemas.microsoft.com/office/drawing/2010/main">
+                <a:solidFill>
+                  <a:srgbClr val="FFFFFF"/>
+                </a:solidFill>
+              </a14:hiddenFill>
+            </a:ext>
+          </a:extLst>
+        </p:spPr>
+      </p:pic>
+      <p:pic>
+        <p:nvPicPr>
+          <p:cNvPr id="16" name="Content Placeholder 8">
+            <a:extLst>
+              <a:ext uri="{FF2B5EF4-FFF2-40B4-BE49-F238E27FC236}">
+                <a16:creationId xmlns:a16="http://schemas.microsoft.com/office/drawing/2014/main" id="{BF1B1E16-E9D1-4F87-B5F7-07AC8E30849A}"/>
+              </a:ext>
+            </a:extLst>
+          </p:cNvPr>
+          <p:cNvPicPr>
+            <a:picLocks noChangeAspect="1"/>
+          </p:cNvPicPr>
+          <p:nvPr/>
+        </p:nvPicPr>
+        <p:blipFill>
+          <a:blip r:embed="rId3"/>
+          <a:stretch>
+            <a:fillRect/>
+          </a:stretch>
+        </p:blipFill>
+        <p:spPr>
+          <a:xfrm>
+            <a:off x="3541099" y="116418"/>
+            <a:ext cx="3218770" cy="1882980"/>
+          </a:xfrm>
+          <a:prstGeom prst="rect">
+            <a:avLst/>
+          </a:prstGeom>
+        </p:spPr>
+      </p:pic>
+      <p:pic>
+        <p:nvPicPr>
+          <p:cNvPr id="17" name="Picture 2">
+            <a:extLst>
+              <a:ext uri="{FF2B5EF4-FFF2-40B4-BE49-F238E27FC236}">
+                <a16:creationId xmlns:a16="http://schemas.microsoft.com/office/drawing/2014/main" id="{37843BA7-0EF8-4267-9AB2-C0C29097F0E2}"/>
+              </a:ext>
+            </a:extLst>
+          </p:cNvPr>
+          <p:cNvPicPr>
+            <a:picLocks noChangeAspect="1" noChangeArrowheads="1"/>
+          </p:cNvPicPr>
+          <p:nvPr/>
+        </p:nvPicPr>
+        <p:blipFill>
+          <a:blip r:embed="rId4">
+            <a:extLst>
+              <a:ext uri="{28A0092B-C50C-407E-A947-70E740481C1C}">
+                <a14:useLocalDpi xmlns:a14="http://schemas.microsoft.com/office/drawing/2010/main" val="0"/>
+              </a:ext>
+            </a:extLst>
+          </a:blip>
+          <a:srcRect/>
+          <a:stretch>
+            <a:fillRect/>
+          </a:stretch>
+        </p:blipFill>
+        <p:spPr bwMode="auto">
+          <a:xfrm>
+            <a:off x="56160" y="2770650"/>
+            <a:ext cx="4572168" cy="3527795"/>
+          </a:xfrm>
+          <a:prstGeom prst="rect">
+            <a:avLst/>
+          </a:prstGeom>
+          <a:noFill/>
+          <a:extLst>
+            <a:ext uri="{909E8E84-426E-40DD-AFC4-6F175D3DCCD1}">
+              <a14:hiddenFill xmlns:a14="http://schemas.microsoft.com/office/drawing/2010/main">
+                <a:solidFill>
+                  <a:srgbClr val="FFFFFF"/>
+                </a:solidFill>
+              </a14:hiddenFill>
+            </a:ext>
+          </a:extLst>
+        </p:spPr>
+      </p:pic>
+      <p:pic>
+        <p:nvPicPr>
+          <p:cNvPr id="18" name="Picture 2">
+            <a:extLst>
+              <a:ext uri="{FF2B5EF4-FFF2-40B4-BE49-F238E27FC236}">
+                <a16:creationId xmlns:a16="http://schemas.microsoft.com/office/drawing/2014/main" id="{EC0BC441-1D9E-4399-8B50-503B92843BA2}"/>
+              </a:ext>
+            </a:extLst>
+          </p:cNvPr>
+          <p:cNvPicPr>
+            <a:picLocks noChangeAspect="1" noChangeArrowheads="1"/>
+          </p:cNvPicPr>
+          <p:nvPr/>
+        </p:nvPicPr>
+        <p:blipFill>
+          <a:blip r:embed="rId5">
+            <a:extLst>
+              <a:ext uri="{28A0092B-C50C-407E-A947-70E740481C1C}">
+                <a14:useLocalDpi xmlns:a14="http://schemas.microsoft.com/office/drawing/2010/main" val="0"/>
+              </a:ext>
+            </a:extLst>
+          </a:blip>
+          <a:srcRect/>
+          <a:stretch>
+            <a:fillRect/>
+          </a:stretch>
+        </p:blipFill>
+        <p:spPr bwMode="auto">
+          <a:xfrm>
+            <a:off x="3925461" y="2755788"/>
+            <a:ext cx="4644402" cy="3583529"/>
+          </a:xfrm>
+          <a:prstGeom prst="rect">
+            <a:avLst/>
+          </a:prstGeom>
+          <a:noFill/>
+          <a:extLst>
+            <a:ext uri="{909E8E84-426E-40DD-AFC4-6F175D3DCCD1}">
+              <a14:hiddenFill xmlns:a14="http://schemas.microsoft.com/office/drawing/2010/main">
+                <a:solidFill>
+                  <a:srgbClr val="FFFFFF"/>
+                </a:solidFill>
+              </a14:hiddenFill>
+            </a:ext>
+          </a:extLst>
+        </p:spPr>
+      </p:pic>
+      <p:pic>
+        <p:nvPicPr>
+          <p:cNvPr id="19" name="Picture 12">
+            <a:extLst>
+              <a:ext uri="{FF2B5EF4-FFF2-40B4-BE49-F238E27FC236}">
+                <a16:creationId xmlns:a16="http://schemas.microsoft.com/office/drawing/2014/main" id="{53F19417-A280-4DAB-8B93-8BEDEE181A82}"/>
+              </a:ext>
+            </a:extLst>
+          </p:cNvPr>
+          <p:cNvPicPr>
+            <a:picLocks noChangeAspect="1" noChangeArrowheads="1"/>
+          </p:cNvPicPr>
+          <p:nvPr/>
+        </p:nvPicPr>
+        <p:blipFill>
+          <a:blip r:embed="rId6">
+            <a:extLst>
+              <a:ext uri="{28A0092B-C50C-407E-A947-70E740481C1C}">
+                <a14:useLocalDpi xmlns:a14="http://schemas.microsoft.com/office/drawing/2010/main" val="0"/>
+              </a:ext>
+            </a:extLst>
+          </a:blip>
+          <a:stretch>
+            <a:fillRect/>
+          </a:stretch>
+        </p:blipFill>
+        <p:spPr bwMode="auto">
+          <a:xfrm>
+            <a:off x="8497629" y="2505010"/>
+            <a:ext cx="3529599" cy="1553022"/>
+          </a:xfrm>
+          <a:prstGeom prst="rect">
+            <a:avLst/>
+          </a:prstGeom>
+          <a:noFill/>
+          <a:extLst>
+            <a:ext uri="{909E8E84-426E-40DD-AFC4-6F175D3DCCD1}">
+              <a14:hiddenFill xmlns:a14="http://schemas.microsoft.com/office/drawing/2010/main">
+                <a:solidFill>
+                  <a:srgbClr val="FFFFFF"/>
+                </a:solidFill>
+              </a14:hiddenFill>
+            </a:ext>
+          </a:extLst>
+        </p:spPr>
+      </p:pic>
+      <p:pic>
+        <p:nvPicPr>
+          <p:cNvPr id="20" name="Picture 14">
+            <a:extLst>
+              <a:ext uri="{FF2B5EF4-FFF2-40B4-BE49-F238E27FC236}">
+                <a16:creationId xmlns:a16="http://schemas.microsoft.com/office/drawing/2014/main" id="{7FD54465-3D9F-4D7B-BD89-72C0D98E7DD0}"/>
+              </a:ext>
+            </a:extLst>
+          </p:cNvPr>
+          <p:cNvPicPr>
+            <a:picLocks noChangeAspect="1" noChangeArrowheads="1"/>
+          </p:cNvPicPr>
+          <p:nvPr/>
+        </p:nvPicPr>
+        <p:blipFill>
+          <a:blip r:embed="rId7">
+            <a:extLst>
+              <a:ext uri="{28A0092B-C50C-407E-A947-70E740481C1C}">
+                <a14:useLocalDpi xmlns:a14="http://schemas.microsoft.com/office/drawing/2010/main" val="0"/>
+              </a:ext>
+            </a:extLst>
+          </a:blip>
+          <a:stretch>
+            <a:fillRect/>
+          </a:stretch>
+        </p:blipFill>
+        <p:spPr bwMode="auto">
+          <a:xfrm>
+            <a:off x="8497629" y="4486115"/>
+            <a:ext cx="3529598" cy="1553022"/>
+          </a:xfrm>
+          <a:prstGeom prst="rect">
+            <a:avLst/>
+          </a:prstGeom>
+          <a:noFill/>
+          <a:extLst>
+            <a:ext uri="{909E8E84-426E-40DD-AFC4-6F175D3DCCD1}">
+              <a14:hiddenFill xmlns:a14="http://schemas.microsoft.com/office/drawing/2010/main">
+                <a:solidFill>
+                  <a:srgbClr val="FFFFFF"/>
+                </a:solidFill>
+              </a14:hiddenFill>
+            </a:ext>
+          </a:extLst>
+        </p:spPr>
+      </p:pic>
+      <p:sp>
+        <p:nvSpPr>
+          <p:cNvPr id="2" name="Slide Number Placeholder 1">
+            <a:extLst>
+              <a:ext uri="{FF2B5EF4-FFF2-40B4-BE49-F238E27FC236}">
+                <a16:creationId xmlns:a16="http://schemas.microsoft.com/office/drawing/2014/main" id="{2A7013EE-CCC0-4310-ACA5-0B9C1A9FCB04}"/>
+              </a:ext>
+            </a:extLst>
+          </p:cNvPr>
+          <p:cNvSpPr>
+            <a:spLocks noGrp="1"/>
+          </p:cNvSpPr>
+          <p:nvPr>
+            <p:ph type="sldNum" sz="quarter" idx="12"/>
+          </p:nvPr>
+        </p:nvSpPr>
+        <p:spPr/>
+        <p:txBody>
+          <a:bodyPr/>
+          <a:lstStyle/>
+          <a:p>
+            <a:fld id="{3A98EE3D-8CD1-4C3F-BD1C-C98C9596463C}" type="slidenum">
+              <a:rPr lang="en-US" sz="1100" b="1" smtClean="0"/>
+              <a:pPr/>
+              <a:t>13</a:t>
+            </a:fld>
+            <a:endParaRPr lang="en-US" sz="1100" b="1" dirty="0"/>
+          </a:p>
+        </p:txBody>
+      </p:sp>
+    </p:spTree>
+    <p:extLst>
+      <p:ext uri="{BB962C8B-B14F-4D97-AF65-F5344CB8AC3E}">
+        <p14:creationId xmlns:p14="http://schemas.microsoft.com/office/powerpoint/2010/main" val="4154748801"/>
+      </p:ext>
+    </p:extLst>
+  </p:cSld>
+  <p:clrMapOvr>
+    <a:masterClrMapping/>
+  </p:clrMapOvr>
+</p:sld>
+</file>
+
+<file path=ppt/slides/slide14.xml><?xml version="1.0" encoding="utf-8"?>
 <p:sld xmlns:a="http://schemas.openxmlformats.org/drawingml/2006/main" xmlns:r="http://schemas.openxmlformats.org/officeDocument/2006/relationships" xmlns:p="http://schemas.openxmlformats.org/presentationml/2006/main">
   <p:cSld>
     <p:bg>
@@ -9079,6 +10517,34 @@
           </a:extLst>
         </p:spPr>
       </p:pic>
+      <p:sp>
+        <p:nvSpPr>
+          <p:cNvPr id="2" name="Slide Number Placeholder 1">
+            <a:extLst>
+              <a:ext uri="{FF2B5EF4-FFF2-40B4-BE49-F238E27FC236}">
+                <a16:creationId xmlns:a16="http://schemas.microsoft.com/office/drawing/2014/main" id="{73901221-5A6B-4AB0-8D4C-A52703D6DF1B}"/>
+              </a:ext>
+            </a:extLst>
+          </p:cNvPr>
+          <p:cNvSpPr>
+            <a:spLocks noGrp="1"/>
+          </p:cNvSpPr>
+          <p:nvPr>
+            <p:ph type="sldNum" sz="quarter" idx="12"/>
+          </p:nvPr>
+        </p:nvSpPr>
+        <p:spPr/>
+        <p:txBody>
+          <a:bodyPr/>
+          <a:lstStyle/>
+          <a:p>
+            <a:r>
+              <a:rPr lang="en-US" sz="1100" b="1" dirty="0"/>
+              <a:t>14</a:t>
+            </a:r>
+          </a:p>
+        </p:txBody>
+      </p:sp>
     </p:spTree>
     <p:extLst>
       <p:ext uri="{BB962C8B-B14F-4D97-AF65-F5344CB8AC3E}">
@@ -9092,7 +10558,7 @@
 </p:sld>
 </file>
 
-<file path=ppt/slides/slide14.xml><?xml version="1.0" encoding="utf-8"?>
+<file path=ppt/slides/slide15.xml><?xml version="1.0" encoding="utf-8"?>
 <p:sld xmlns:a="http://schemas.openxmlformats.org/drawingml/2006/main" xmlns:r="http://schemas.openxmlformats.org/officeDocument/2006/relationships" xmlns:p="http://schemas.openxmlformats.org/presentationml/2006/main">
   <p:cSld>
     <p:bg>
@@ -9373,623 +10839,6 @@
       </p:cxnSp>
       <p:sp>
         <p:nvSpPr>
-          <p:cNvPr id="14" name="Title 3">
-            <a:extLst>
-              <a:ext uri="{FF2B5EF4-FFF2-40B4-BE49-F238E27FC236}">
-                <a16:creationId xmlns:a16="http://schemas.microsoft.com/office/drawing/2014/main" id="{0EB149D9-C2EF-4542-8E66-4A0CD0737117}"/>
-              </a:ext>
-            </a:extLst>
-          </p:cNvPr>
-          <p:cNvSpPr txBox="1">
-            <a:spLocks/>
-          </p:cNvSpPr>
-          <p:nvPr/>
-        </p:nvSpPr>
-        <p:spPr>
-          <a:xfrm>
-            <a:off x="477078" y="516836"/>
-            <a:ext cx="3100136" cy="1960234"/>
-          </a:xfrm>
-          <a:prstGeom prst="rect">
-            <a:avLst/>
-          </a:prstGeom>
-        </p:spPr>
-        <p:txBody>
-          <a:bodyPr vert="horz" lIns="91440" tIns="45720" rIns="91440" bIns="45720" rtlCol="0" anchor="b">
-            <a:normAutofit/>
-          </a:bodyPr>
-          <a:lstStyle>
-            <a:lvl1pPr algn="l" defTabSz="914400" rtl="0" eaLnBrk="1" latinLnBrk="0" hangingPunct="1">
-              <a:lnSpc>
-                <a:spcPct val="90000"/>
-              </a:lnSpc>
-              <a:spcBef>
-                <a:spcPct val="0"/>
-              </a:spcBef>
-              <a:buNone/>
-              <a:defRPr sz="3600" b="0" kern="1200" spc="-50" baseline="0">
-                <a:solidFill>
-                  <a:srgbClr val="FFFFFF"/>
-                </a:solidFill>
-                <a:latin typeface="+mj-lt"/>
-                <a:ea typeface="+mj-ea"/>
-                <a:cs typeface="+mj-cs"/>
-              </a:defRPr>
-            </a:lvl1pPr>
-          </a:lstStyle>
-          <a:p>
-            <a:r>
-              <a:rPr lang="en-US" sz="3400">
-                <a:solidFill>
-                  <a:schemeClr val="tx1"/>
-                </a:solidFill>
-              </a:rPr>
-              <a:t>L’interprétabilité locale du modèle</a:t>
-            </a:r>
-            <a:endParaRPr lang="en-US" sz="3400" dirty="0">
-              <a:solidFill>
-                <a:schemeClr val="tx1"/>
-              </a:solidFill>
-            </a:endParaRPr>
-          </a:p>
-        </p:txBody>
-      </p:sp>
-      <p:pic>
-        <p:nvPicPr>
-          <p:cNvPr id="15" name="Picture 6">
-            <a:extLst>
-              <a:ext uri="{FF2B5EF4-FFF2-40B4-BE49-F238E27FC236}">
-                <a16:creationId xmlns:a16="http://schemas.microsoft.com/office/drawing/2014/main" id="{B7E842E0-8BAE-415A-B83F-C3EBD884F4B3}"/>
-              </a:ext>
-            </a:extLst>
-          </p:cNvPr>
-          <p:cNvPicPr>
-            <a:picLocks noChangeAspect="1" noChangeArrowheads="1"/>
-          </p:cNvPicPr>
-          <p:nvPr/>
-        </p:nvPicPr>
-        <p:blipFill>
-          <a:blip r:embed="rId2">
-            <a:extLst>
-              <a:ext uri="{28A0092B-C50C-407E-A947-70E740481C1C}">
-                <a14:useLocalDpi xmlns:a14="http://schemas.microsoft.com/office/drawing/2010/main" val="0"/>
-              </a:ext>
-            </a:extLst>
-          </a:blip>
-          <a:stretch>
-            <a:fillRect/>
-          </a:stretch>
-        </p:blipFill>
-        <p:spPr bwMode="auto">
-          <a:xfrm>
-            <a:off x="6832475" y="116417"/>
-            <a:ext cx="3380581" cy="1884673"/>
-          </a:xfrm>
-          <a:prstGeom prst="rect">
-            <a:avLst/>
-          </a:prstGeom>
-          <a:noFill/>
-          <a:extLst>
-            <a:ext uri="{909E8E84-426E-40DD-AFC4-6F175D3DCCD1}">
-              <a14:hiddenFill xmlns:a14="http://schemas.microsoft.com/office/drawing/2010/main">
-                <a:solidFill>
-                  <a:srgbClr val="FFFFFF"/>
-                </a:solidFill>
-              </a14:hiddenFill>
-            </a:ext>
-          </a:extLst>
-        </p:spPr>
-      </p:pic>
-      <p:pic>
-        <p:nvPicPr>
-          <p:cNvPr id="16" name="Content Placeholder 8">
-            <a:extLst>
-              <a:ext uri="{FF2B5EF4-FFF2-40B4-BE49-F238E27FC236}">
-                <a16:creationId xmlns:a16="http://schemas.microsoft.com/office/drawing/2014/main" id="{BF1B1E16-E9D1-4F87-B5F7-07AC8E30849A}"/>
-              </a:ext>
-            </a:extLst>
-          </p:cNvPr>
-          <p:cNvPicPr>
-            <a:picLocks noChangeAspect="1"/>
-          </p:cNvPicPr>
-          <p:nvPr/>
-        </p:nvPicPr>
-        <p:blipFill>
-          <a:blip r:embed="rId3"/>
-          <a:stretch>
-            <a:fillRect/>
-          </a:stretch>
-        </p:blipFill>
-        <p:spPr>
-          <a:xfrm>
-            <a:off x="3541099" y="116418"/>
-            <a:ext cx="3218770" cy="1882980"/>
-          </a:xfrm>
-          <a:prstGeom prst="rect">
-            <a:avLst/>
-          </a:prstGeom>
-        </p:spPr>
-      </p:pic>
-      <p:pic>
-        <p:nvPicPr>
-          <p:cNvPr id="17" name="Picture 2">
-            <a:extLst>
-              <a:ext uri="{FF2B5EF4-FFF2-40B4-BE49-F238E27FC236}">
-                <a16:creationId xmlns:a16="http://schemas.microsoft.com/office/drawing/2014/main" id="{37843BA7-0EF8-4267-9AB2-C0C29097F0E2}"/>
-              </a:ext>
-            </a:extLst>
-          </p:cNvPr>
-          <p:cNvPicPr>
-            <a:picLocks noChangeAspect="1" noChangeArrowheads="1"/>
-          </p:cNvPicPr>
-          <p:nvPr/>
-        </p:nvPicPr>
-        <p:blipFill>
-          <a:blip r:embed="rId4">
-            <a:extLst>
-              <a:ext uri="{28A0092B-C50C-407E-A947-70E740481C1C}">
-                <a14:useLocalDpi xmlns:a14="http://schemas.microsoft.com/office/drawing/2010/main" val="0"/>
-              </a:ext>
-            </a:extLst>
-          </a:blip>
-          <a:srcRect/>
-          <a:stretch>
-            <a:fillRect/>
-          </a:stretch>
-        </p:blipFill>
-        <p:spPr bwMode="auto">
-          <a:xfrm>
-            <a:off x="56160" y="2770650"/>
-            <a:ext cx="4572168" cy="3527795"/>
-          </a:xfrm>
-          <a:prstGeom prst="rect">
-            <a:avLst/>
-          </a:prstGeom>
-          <a:noFill/>
-          <a:extLst>
-            <a:ext uri="{909E8E84-426E-40DD-AFC4-6F175D3DCCD1}">
-              <a14:hiddenFill xmlns:a14="http://schemas.microsoft.com/office/drawing/2010/main">
-                <a:solidFill>
-                  <a:srgbClr val="FFFFFF"/>
-                </a:solidFill>
-              </a14:hiddenFill>
-            </a:ext>
-          </a:extLst>
-        </p:spPr>
-      </p:pic>
-      <p:pic>
-        <p:nvPicPr>
-          <p:cNvPr id="18" name="Picture 2">
-            <a:extLst>
-              <a:ext uri="{FF2B5EF4-FFF2-40B4-BE49-F238E27FC236}">
-                <a16:creationId xmlns:a16="http://schemas.microsoft.com/office/drawing/2014/main" id="{EC0BC441-1D9E-4399-8B50-503B92843BA2}"/>
-              </a:ext>
-            </a:extLst>
-          </p:cNvPr>
-          <p:cNvPicPr>
-            <a:picLocks noChangeAspect="1" noChangeArrowheads="1"/>
-          </p:cNvPicPr>
-          <p:nvPr/>
-        </p:nvPicPr>
-        <p:blipFill>
-          <a:blip r:embed="rId5">
-            <a:extLst>
-              <a:ext uri="{28A0092B-C50C-407E-A947-70E740481C1C}">
-                <a14:useLocalDpi xmlns:a14="http://schemas.microsoft.com/office/drawing/2010/main" val="0"/>
-              </a:ext>
-            </a:extLst>
-          </a:blip>
-          <a:srcRect/>
-          <a:stretch>
-            <a:fillRect/>
-          </a:stretch>
-        </p:blipFill>
-        <p:spPr bwMode="auto">
-          <a:xfrm>
-            <a:off x="3925461" y="2755788"/>
-            <a:ext cx="4644402" cy="3583529"/>
-          </a:xfrm>
-          <a:prstGeom prst="rect">
-            <a:avLst/>
-          </a:prstGeom>
-          <a:noFill/>
-          <a:extLst>
-            <a:ext uri="{909E8E84-426E-40DD-AFC4-6F175D3DCCD1}">
-              <a14:hiddenFill xmlns:a14="http://schemas.microsoft.com/office/drawing/2010/main">
-                <a:solidFill>
-                  <a:srgbClr val="FFFFFF"/>
-                </a:solidFill>
-              </a14:hiddenFill>
-            </a:ext>
-          </a:extLst>
-        </p:spPr>
-      </p:pic>
-      <p:pic>
-        <p:nvPicPr>
-          <p:cNvPr id="19" name="Picture 12">
-            <a:extLst>
-              <a:ext uri="{FF2B5EF4-FFF2-40B4-BE49-F238E27FC236}">
-                <a16:creationId xmlns:a16="http://schemas.microsoft.com/office/drawing/2014/main" id="{53F19417-A280-4DAB-8B93-8BEDEE181A82}"/>
-              </a:ext>
-            </a:extLst>
-          </p:cNvPr>
-          <p:cNvPicPr>
-            <a:picLocks noChangeAspect="1" noChangeArrowheads="1"/>
-          </p:cNvPicPr>
-          <p:nvPr/>
-        </p:nvPicPr>
-        <p:blipFill>
-          <a:blip r:embed="rId6">
-            <a:extLst>
-              <a:ext uri="{28A0092B-C50C-407E-A947-70E740481C1C}">
-                <a14:useLocalDpi xmlns:a14="http://schemas.microsoft.com/office/drawing/2010/main" val="0"/>
-              </a:ext>
-            </a:extLst>
-          </a:blip>
-          <a:stretch>
-            <a:fillRect/>
-          </a:stretch>
-        </p:blipFill>
-        <p:spPr bwMode="auto">
-          <a:xfrm>
-            <a:off x="8497629" y="2505010"/>
-            <a:ext cx="3529599" cy="1553022"/>
-          </a:xfrm>
-          <a:prstGeom prst="rect">
-            <a:avLst/>
-          </a:prstGeom>
-          <a:noFill/>
-          <a:extLst>
-            <a:ext uri="{909E8E84-426E-40DD-AFC4-6F175D3DCCD1}">
-              <a14:hiddenFill xmlns:a14="http://schemas.microsoft.com/office/drawing/2010/main">
-                <a:solidFill>
-                  <a:srgbClr val="FFFFFF"/>
-                </a:solidFill>
-              </a14:hiddenFill>
-            </a:ext>
-          </a:extLst>
-        </p:spPr>
-      </p:pic>
-      <p:pic>
-        <p:nvPicPr>
-          <p:cNvPr id="20" name="Picture 14">
-            <a:extLst>
-              <a:ext uri="{FF2B5EF4-FFF2-40B4-BE49-F238E27FC236}">
-                <a16:creationId xmlns:a16="http://schemas.microsoft.com/office/drawing/2014/main" id="{7FD54465-3D9F-4D7B-BD89-72C0D98E7DD0}"/>
-              </a:ext>
-            </a:extLst>
-          </p:cNvPr>
-          <p:cNvPicPr>
-            <a:picLocks noChangeAspect="1" noChangeArrowheads="1"/>
-          </p:cNvPicPr>
-          <p:nvPr/>
-        </p:nvPicPr>
-        <p:blipFill>
-          <a:blip r:embed="rId7">
-            <a:extLst>
-              <a:ext uri="{28A0092B-C50C-407E-A947-70E740481C1C}">
-                <a14:useLocalDpi xmlns:a14="http://schemas.microsoft.com/office/drawing/2010/main" val="0"/>
-              </a:ext>
-            </a:extLst>
-          </a:blip>
-          <a:stretch>
-            <a:fillRect/>
-          </a:stretch>
-        </p:blipFill>
-        <p:spPr bwMode="auto">
-          <a:xfrm>
-            <a:off x="8497629" y="4486115"/>
-            <a:ext cx="3529598" cy="1553022"/>
-          </a:xfrm>
-          <a:prstGeom prst="rect">
-            <a:avLst/>
-          </a:prstGeom>
-          <a:noFill/>
-          <a:extLst>
-            <a:ext uri="{909E8E84-426E-40DD-AFC4-6F175D3DCCD1}">
-              <a14:hiddenFill xmlns:a14="http://schemas.microsoft.com/office/drawing/2010/main">
-                <a:solidFill>
-                  <a:srgbClr val="FFFFFF"/>
-                </a:solidFill>
-              </a14:hiddenFill>
-            </a:ext>
-          </a:extLst>
-        </p:spPr>
-      </p:pic>
-    </p:spTree>
-    <p:extLst>
-      <p:ext uri="{BB962C8B-B14F-4D97-AF65-F5344CB8AC3E}">
-        <p14:creationId xmlns:p14="http://schemas.microsoft.com/office/powerpoint/2010/main" val="4154748801"/>
-      </p:ext>
-    </p:extLst>
-  </p:cSld>
-  <p:clrMapOvr>
-    <a:masterClrMapping/>
-  </p:clrMapOvr>
-</p:sld>
-</file>
-
-<file path=ppt/slides/slide15.xml><?xml version="1.0" encoding="utf-8"?>
-<p:sld xmlns:a="http://schemas.openxmlformats.org/drawingml/2006/main" xmlns:r="http://schemas.openxmlformats.org/officeDocument/2006/relationships" xmlns:p="http://schemas.openxmlformats.org/presentationml/2006/main">
-  <p:cSld>
-    <p:bg>
-      <p:bgPr>
-        <a:solidFill>
-          <a:schemeClr val="bg1"/>
-        </a:solidFill>
-        <a:effectLst/>
-      </p:bgPr>
-    </p:bg>
-    <p:spTree>
-      <p:nvGrpSpPr>
-        <p:cNvPr id="1" name=""/>
-        <p:cNvGrpSpPr/>
-        <p:nvPr/>
-      </p:nvGrpSpPr>
-      <p:grpSpPr>
-        <a:xfrm>
-          <a:off x="0" y="0"/>
-          <a:ext cx="0" cy="0"/>
-          <a:chOff x="0" y="0"/>
-          <a:chExt cx="0" cy="0"/>
-        </a:xfrm>
-      </p:grpSpPr>
-      <p:sp>
-        <p:nvSpPr>
-          <p:cNvPr id="38" name="Rectangle 27">
-            <a:extLst>
-              <a:ext uri="{FF2B5EF4-FFF2-40B4-BE49-F238E27FC236}">
-                <a16:creationId xmlns:a16="http://schemas.microsoft.com/office/drawing/2014/main" id="{416A0E3C-60E6-4F39-BC55-5F7C224E1F7C}"/>
-              </a:ext>
-              <a:ext uri="{C183D7F6-B498-43B3-948B-1728B52AA6E4}">
-                <adec:decorative xmlns:adec="http://schemas.microsoft.com/office/drawing/2017/decorative" val="1"/>
-              </a:ext>
-            </a:extLst>
-          </p:cNvPr>
-          <p:cNvSpPr>
-            <a:spLocks noGrp="1" noRot="1" noChangeAspect="1" noMove="1" noResize="1" noEditPoints="1" noAdjustHandles="1" noChangeArrowheads="1" noChangeShapeType="1" noTextEdit="1"/>
-          </p:cNvSpPr>
-          <p:nvPr>
-            <p:extLst>
-              <p:ext uri="{386F3935-93C4-4BCD-93E2-E3B085C9AB24}">
-                <p16:designElem xmlns:p16="http://schemas.microsoft.com/office/powerpoint/2015/main" val="1"/>
-              </p:ext>
-            </p:extLst>
-          </p:nvPr>
-        </p:nvSpPr>
-        <p:spPr>
-          <a:xfrm>
-            <a:off x="3175" y="6400800"/>
-            <a:ext cx="12188825" cy="457200"/>
-          </a:xfrm>
-          <a:prstGeom prst="rect">
-            <a:avLst/>
-          </a:prstGeom>
-          <a:solidFill>
-            <a:srgbClr val="262626"/>
-          </a:solidFill>
-          <a:ln>
-            <a:noFill/>
-          </a:ln>
-        </p:spPr>
-        <p:style>
-          <a:lnRef idx="2">
-            <a:schemeClr val="accent1">
-              <a:shade val="50000"/>
-            </a:schemeClr>
-          </a:lnRef>
-          <a:fillRef idx="1">
-            <a:schemeClr val="accent1"/>
-          </a:fillRef>
-          <a:effectRef idx="0">
-            <a:schemeClr val="accent1"/>
-          </a:effectRef>
-          <a:fontRef idx="minor">
-            <a:schemeClr val="lt1"/>
-          </a:fontRef>
-        </p:style>
-      </p:sp>
-      <p:cxnSp>
-        <p:nvCxnSpPr>
-          <p:cNvPr id="39" name="Straight Connector 29">
-            <a:extLst>
-              <a:ext uri="{FF2B5EF4-FFF2-40B4-BE49-F238E27FC236}">
-                <a16:creationId xmlns:a16="http://schemas.microsoft.com/office/drawing/2014/main" id="{C5025DAC-8B93-4160-B017-3A274A5828C0}"/>
-              </a:ext>
-              <a:ext uri="{C183D7F6-B498-43B3-948B-1728B52AA6E4}">
-                <adec:decorative xmlns:adec="http://schemas.microsoft.com/office/drawing/2017/decorative" val="1"/>
-              </a:ext>
-            </a:extLst>
-          </p:cNvPr>
-          <p:cNvCxnSpPr>
-            <a:cxnSpLocks noGrp="1" noRot="1" noChangeAspect="1" noMove="1" noResize="1" noEditPoints="1" noAdjustHandles="1" noChangeArrowheads="1" noChangeShapeType="1"/>
-          </p:cNvCxnSpPr>
-          <p:nvPr>
-            <p:extLst>
-              <p:ext uri="{386F3935-93C4-4BCD-93E2-E3B085C9AB24}">
-                <p16:designElem xmlns:p16="http://schemas.microsoft.com/office/powerpoint/2015/main" val="1"/>
-              </p:ext>
-            </p:extLst>
-          </p:nvPr>
-        </p:nvCxnSpPr>
-        <p:spPr>
-          <a:xfrm>
-            <a:off x="1193532" y="1897380"/>
-            <a:ext cx="9966960" cy="0"/>
-          </a:xfrm>
-          <a:prstGeom prst="line">
-            <a:avLst/>
-          </a:prstGeom>
-          <a:ln w="12700">
-            <a:solidFill>
-              <a:schemeClr val="tx1">
-                <a:lumMod val="75000"/>
-                <a:lumOff val="25000"/>
-              </a:schemeClr>
-            </a:solidFill>
-          </a:ln>
-        </p:spPr>
-        <p:style>
-          <a:lnRef idx="1">
-            <a:schemeClr val="accent1"/>
-          </a:lnRef>
-          <a:fillRef idx="0">
-            <a:schemeClr val="accent1"/>
-          </a:fillRef>
-          <a:effectRef idx="0">
-            <a:schemeClr val="accent1"/>
-          </a:effectRef>
-          <a:fontRef idx="minor">
-            <a:schemeClr val="tx1"/>
-          </a:fontRef>
-        </p:style>
-      </p:cxnSp>
-      <p:sp useBgFill="1">
-        <p:nvSpPr>
-          <p:cNvPr id="40" name="Rectangle 31">
-            <a:extLst>
-              <a:ext uri="{FF2B5EF4-FFF2-40B4-BE49-F238E27FC236}">
-                <a16:creationId xmlns:a16="http://schemas.microsoft.com/office/drawing/2014/main" id="{990D0034-F768-41E7-85D4-F38C4DE85770}"/>
-              </a:ext>
-              <a:ext uri="{C183D7F6-B498-43B3-948B-1728B52AA6E4}">
-                <adec:decorative xmlns:adec="http://schemas.microsoft.com/office/drawing/2017/decorative" val="1"/>
-              </a:ext>
-            </a:extLst>
-          </p:cNvPr>
-          <p:cNvSpPr>
-            <a:spLocks noGrp="1" noRot="1" noChangeAspect="1" noMove="1" noResize="1" noEditPoints="1" noAdjustHandles="1" noChangeArrowheads="1" noChangeShapeType="1" noTextEdit="1"/>
-          </p:cNvSpPr>
-          <p:nvPr>
-            <p:extLst>
-              <p:ext uri="{386F3935-93C4-4BCD-93E2-E3B085C9AB24}">
-                <p16:designElem xmlns:p16="http://schemas.microsoft.com/office/powerpoint/2015/main" val="1"/>
-              </p:ext>
-            </p:extLst>
-          </p:nvPr>
-        </p:nvSpPr>
-        <p:spPr>
-          <a:xfrm>
-            <a:off x="0" y="0"/>
-            <a:ext cx="12186315" cy="6858000"/>
-          </a:xfrm>
-          <a:prstGeom prst="rect">
-            <a:avLst/>
-          </a:prstGeom>
-          <a:ln>
-            <a:noFill/>
-          </a:ln>
-        </p:spPr>
-        <p:style>
-          <a:lnRef idx="2">
-            <a:schemeClr val="accent6">
-              <a:shade val="50000"/>
-            </a:schemeClr>
-          </a:lnRef>
-          <a:fillRef idx="1001">
-            <a:schemeClr val="lt1"/>
-          </a:fillRef>
-          <a:effectRef idx="0">
-            <a:schemeClr val="accent6"/>
-          </a:effectRef>
-          <a:fontRef idx="minor">
-            <a:schemeClr val="lt1"/>
-          </a:fontRef>
-        </p:style>
-        <p:txBody>
-          <a:bodyPr rtlCol="0" anchor="ctr"/>
-          <a:lstStyle/>
-          <a:p>
-            <a:pPr marL="0" marR="0" lvl="0" indent="0" algn="ctr" defTabSz="914400" rtl="0" eaLnBrk="1" fontAlgn="auto" latinLnBrk="0" hangingPunct="1">
-              <a:lnSpc>
-                <a:spcPct val="100000"/>
-              </a:lnSpc>
-              <a:spcBef>
-                <a:spcPts val="0"/>
-              </a:spcBef>
-              <a:spcAft>
-                <a:spcPts val="0"/>
-              </a:spcAft>
-              <a:buClrTx/>
-              <a:buSzTx/>
-              <a:buFontTx/>
-              <a:buNone/>
-              <a:tabLst/>
-              <a:defRPr/>
-            </a:pPr>
-            <a:endParaRPr kumimoji="0" lang="en-US" sz="1800" b="0" i="0" u="none" strike="noStrike" kern="1200" cap="none" spc="0" normalizeH="0" baseline="0" noProof="0">
-              <a:ln>
-                <a:noFill/>
-              </a:ln>
-              <a:solidFill>
-                <a:srgbClr val="FFFFFF"/>
-              </a:solidFill>
-              <a:effectLst/>
-              <a:uLnTx/>
-              <a:uFillTx/>
-              <a:latin typeface="Speak Pro" panose="020F0502020204030204"/>
-              <a:ea typeface="+mn-ea"/>
-              <a:cs typeface="+mn-cs"/>
-            </a:endParaRPr>
-          </a:p>
-        </p:txBody>
-      </p:sp>
-      <p:cxnSp>
-        <p:nvCxnSpPr>
-          <p:cNvPr id="41" name="Straight Connector 33">
-            <a:extLst>
-              <a:ext uri="{FF2B5EF4-FFF2-40B4-BE49-F238E27FC236}">
-                <a16:creationId xmlns:a16="http://schemas.microsoft.com/office/drawing/2014/main" id="{5A0A5CF6-407C-4691-8122-49DF69D0020D}"/>
-              </a:ext>
-              <a:ext uri="{C183D7F6-B498-43B3-948B-1728B52AA6E4}">
-                <adec:decorative xmlns:adec="http://schemas.microsoft.com/office/drawing/2017/decorative" val="1"/>
-              </a:ext>
-            </a:extLst>
-          </p:cNvPr>
-          <p:cNvCxnSpPr>
-            <a:cxnSpLocks noGrp="1" noRot="1" noChangeAspect="1" noMove="1" noResize="1" noEditPoints="1" noAdjustHandles="1" noChangeArrowheads="1" noChangeShapeType="1"/>
-          </p:cNvCxnSpPr>
-          <p:nvPr>
-            <p:extLst>
-              <p:ext uri="{386F3935-93C4-4BCD-93E2-E3B085C9AB24}">
-                <p16:designElem xmlns:p16="http://schemas.microsoft.com/office/powerpoint/2015/main" val="1"/>
-              </p:ext>
-            </p:extLst>
-          </p:nvPr>
-        </p:nvCxnSpPr>
-        <p:spPr>
-          <a:xfrm>
-            <a:off x="590927" y="2633962"/>
-            <a:ext cx="2834640" cy="0"/>
-          </a:xfrm>
-          <a:prstGeom prst="line">
-            <a:avLst/>
-          </a:prstGeom>
-          <a:ln w="12700">
-            <a:solidFill>
-              <a:schemeClr val="tx1">
-                <a:lumMod val="75000"/>
-                <a:lumOff val="25000"/>
-              </a:schemeClr>
-            </a:solidFill>
-          </a:ln>
-        </p:spPr>
-        <p:style>
-          <a:lnRef idx="1">
-            <a:schemeClr val="accent1"/>
-          </a:lnRef>
-          <a:fillRef idx="0">
-            <a:schemeClr val="accent1"/>
-          </a:fillRef>
-          <a:effectRef idx="0">
-            <a:schemeClr val="accent1"/>
-          </a:effectRef>
-          <a:fontRef idx="minor">
-            <a:schemeClr val="tx1"/>
-          </a:fontRef>
-        </p:style>
-      </p:cxnSp>
-      <p:sp>
-        <p:nvSpPr>
           <p:cNvPr id="13" name="Title 4">
             <a:extLst>
               <a:ext uri="{FF2B5EF4-FFF2-40B4-BE49-F238E27FC236}">
@@ -10320,6 +11169,36 @@
           </a:extLst>
         </p:spPr>
       </p:pic>
+      <p:sp>
+        <p:nvSpPr>
+          <p:cNvPr id="2" name="Slide Number Placeholder 1">
+            <a:extLst>
+              <a:ext uri="{FF2B5EF4-FFF2-40B4-BE49-F238E27FC236}">
+                <a16:creationId xmlns:a16="http://schemas.microsoft.com/office/drawing/2014/main" id="{FC1F66FD-6085-4CB1-AB6A-841B425E37F2}"/>
+              </a:ext>
+            </a:extLst>
+          </p:cNvPr>
+          <p:cNvSpPr>
+            <a:spLocks noGrp="1"/>
+          </p:cNvSpPr>
+          <p:nvPr>
+            <p:ph type="sldNum" sz="quarter" idx="12"/>
+          </p:nvPr>
+        </p:nvSpPr>
+        <p:spPr/>
+        <p:txBody>
+          <a:bodyPr/>
+          <a:lstStyle/>
+          <a:p>
+            <a:fld id="{3A98EE3D-8CD1-4C3F-BD1C-C98C9596463C}" type="slidenum">
+              <a:rPr lang="en-US" sz="1100" b="1" smtClean="0"/>
+              <a:pPr/>
+              <a:t>15</a:t>
+            </a:fld>
+            <a:endParaRPr lang="en-US" sz="1100" b="1" dirty="0"/>
+          </a:p>
+        </p:txBody>
+      </p:sp>
     </p:spTree>
     <p:extLst>
       <p:ext uri="{BB962C8B-B14F-4D97-AF65-F5344CB8AC3E}">
@@ -11427,6 +12306,44 @@
           </a:p>
         </p:txBody>
       </p:sp>
+      <p:sp>
+        <p:nvSpPr>
+          <p:cNvPr id="2" name="Slide Number Placeholder 1">
+            <a:extLst>
+              <a:ext uri="{FF2B5EF4-FFF2-40B4-BE49-F238E27FC236}">
+                <a16:creationId xmlns:a16="http://schemas.microsoft.com/office/drawing/2014/main" id="{04470D5F-56F5-43C5-B53A-D4F52921597B}"/>
+              </a:ext>
+            </a:extLst>
+          </p:cNvPr>
+          <p:cNvSpPr>
+            <a:spLocks noGrp="1"/>
+          </p:cNvSpPr>
+          <p:nvPr>
+            <p:ph type="sldNum" sz="quarter" idx="12"/>
+          </p:nvPr>
+        </p:nvSpPr>
+        <p:spPr/>
+        <p:txBody>
+          <a:bodyPr/>
+          <a:lstStyle/>
+          <a:p>
+            <a:fld id="{3A98EE3D-8CD1-4C3F-BD1C-C98C9596463C}" type="slidenum">
+              <a:rPr lang="en-US" sz="1100" b="1" smtClean="0">
+                <a:solidFill>
+                  <a:schemeClr val="bg1"/>
+                </a:solidFill>
+              </a:rPr>
+              <a:pPr/>
+              <a:t>16</a:t>
+            </a:fld>
+            <a:endParaRPr lang="en-US" sz="1100" b="1" dirty="0">
+              <a:solidFill>
+                <a:schemeClr val="bg1"/>
+              </a:solidFill>
+            </a:endParaRPr>
+          </a:p>
+        </p:txBody>
+      </p:sp>
     </p:spTree>
     <p:extLst>
       <p:ext uri="{BB962C8B-B14F-4D97-AF65-F5344CB8AC3E}">
@@ -11532,6 +12449,35 @@
           </a:graphicData>
         </a:graphic>
       </p:graphicFrame>
+      <p:sp>
+        <p:nvSpPr>
+          <p:cNvPr id="3" name="Slide Number Placeholder 2">
+            <a:extLst>
+              <a:ext uri="{FF2B5EF4-FFF2-40B4-BE49-F238E27FC236}">
+                <a16:creationId xmlns:a16="http://schemas.microsoft.com/office/drawing/2014/main" id="{10E23E09-18D6-4DD5-B64B-E31B9DF2D41F}"/>
+              </a:ext>
+            </a:extLst>
+          </p:cNvPr>
+          <p:cNvSpPr>
+            <a:spLocks noGrp="1"/>
+          </p:cNvSpPr>
+          <p:nvPr>
+            <p:ph type="sldNum" sz="quarter" idx="12"/>
+          </p:nvPr>
+        </p:nvSpPr>
+        <p:spPr/>
+        <p:txBody>
+          <a:bodyPr/>
+          <a:lstStyle/>
+          <a:p>
+            <a:r>
+              <a:rPr lang="en-US" sz="1100" b="1" dirty="0"/>
+              <a:t>2</a:t>
+            </a:r>
+            <a:endParaRPr lang="en-US" b="1" dirty="0"/>
+          </a:p>
+        </p:txBody>
+      </p:sp>
     </p:spTree>
     <p:extLst>
       <p:ext uri="{BB962C8B-B14F-4D97-AF65-F5344CB8AC3E}">
@@ -11785,6 +12731,35 @@
           </a:p>
         </p:txBody>
       </p:sp>
+      <p:sp>
+        <p:nvSpPr>
+          <p:cNvPr id="3" name="Slide Number Placeholder 2">
+            <a:extLst>
+              <a:ext uri="{FF2B5EF4-FFF2-40B4-BE49-F238E27FC236}">
+                <a16:creationId xmlns:a16="http://schemas.microsoft.com/office/drawing/2014/main" id="{6675DDE0-D6D1-4401-957B-30AA8AACF92D}"/>
+              </a:ext>
+            </a:extLst>
+          </p:cNvPr>
+          <p:cNvSpPr>
+            <a:spLocks noGrp="1"/>
+          </p:cNvSpPr>
+          <p:nvPr>
+            <p:ph type="sldNum" sz="quarter" idx="12"/>
+          </p:nvPr>
+        </p:nvSpPr>
+        <p:spPr/>
+        <p:txBody>
+          <a:bodyPr/>
+          <a:lstStyle/>
+          <a:p>
+            <a:fld id="{3A98EE3D-8CD1-4C3F-BD1C-C98C9596463C}" type="slidenum">
+              <a:rPr lang="en-US" smtClean="0"/>
+              <a:t>3</a:t>
+            </a:fld>
+            <a:endParaRPr lang="en-US" dirty="0"/>
+          </a:p>
+        </p:txBody>
+      </p:sp>
     </p:spTree>
     <p:extLst>
       <p:ext uri="{BB962C8B-B14F-4D97-AF65-F5344CB8AC3E}">
@@ -11817,6 +12792,142 @@
       </p:grpSpPr>
       <p:sp>
         <p:nvSpPr>
+          <p:cNvPr id="36" name="Rectangle: Rounded Corners 35">
+            <a:extLst>
+              <a:ext uri="{FF2B5EF4-FFF2-40B4-BE49-F238E27FC236}">
+                <a16:creationId xmlns:a16="http://schemas.microsoft.com/office/drawing/2014/main" id="{AEF9ACD8-C1EC-4BAC-A712-30217C816E3D}"/>
+              </a:ext>
+            </a:extLst>
+          </p:cNvPr>
+          <p:cNvSpPr/>
+          <p:nvPr/>
+        </p:nvSpPr>
+        <p:spPr>
+          <a:xfrm>
+            <a:off x="6557730" y="2079747"/>
+            <a:ext cx="2213603" cy="496592"/>
+          </a:xfrm>
+          <a:prstGeom prst="roundRect">
+            <a:avLst/>
+          </a:prstGeom>
+          <a:solidFill>
+            <a:schemeClr val="accent1">
+              <a:alpha val="20000"/>
+            </a:schemeClr>
+          </a:solidFill>
+          <a:ln>
+            <a:solidFill>
+              <a:schemeClr val="accent1"/>
+            </a:solidFill>
+          </a:ln>
+        </p:spPr>
+        <p:style>
+          <a:lnRef idx="2">
+            <a:schemeClr val="accent1">
+              <a:shade val="50000"/>
+            </a:schemeClr>
+          </a:lnRef>
+          <a:fillRef idx="1">
+            <a:schemeClr val="accent1"/>
+          </a:fillRef>
+          <a:effectRef idx="0">
+            <a:schemeClr val="accent1"/>
+          </a:effectRef>
+          <a:fontRef idx="minor">
+            <a:schemeClr val="lt1"/>
+          </a:fontRef>
+        </p:style>
+        <p:txBody>
+          <a:bodyPr rtlCol="0" anchor="ctr"/>
+          <a:lstStyle/>
+          <a:p>
+            <a:pPr algn="ctr"/>
+            <a:endParaRPr lang="fr-FR">
+              <a:ln w="0"/>
+              <a:solidFill>
+                <a:schemeClr val="accent1"/>
+              </a:solidFill>
+              <a:effectLst>
+                <a:outerShdw blurRad="38100" dist="25400" dir="5400000" algn="ctr" rotWithShape="0">
+                  <a:srgbClr val="6E747A">
+                    <a:alpha val="43000"/>
+                  </a:srgbClr>
+                </a:outerShdw>
+              </a:effectLst>
+            </a:endParaRPr>
+          </a:p>
+        </p:txBody>
+      </p:sp>
+      <p:sp>
+        <p:nvSpPr>
+          <p:cNvPr id="5" name="Rectangle: Rounded Corners 4">
+            <a:extLst>
+              <a:ext uri="{FF2B5EF4-FFF2-40B4-BE49-F238E27FC236}">
+                <a16:creationId xmlns:a16="http://schemas.microsoft.com/office/drawing/2014/main" id="{49BC5241-7C77-4471-8279-908523122E70}"/>
+              </a:ext>
+            </a:extLst>
+          </p:cNvPr>
+          <p:cNvSpPr/>
+          <p:nvPr/>
+        </p:nvSpPr>
+        <p:spPr>
+          <a:xfrm>
+            <a:off x="985652" y="2120900"/>
+            <a:ext cx="3431969" cy="901370"/>
+          </a:xfrm>
+          <a:prstGeom prst="roundRect">
+            <a:avLst/>
+          </a:prstGeom>
+          <a:solidFill>
+            <a:schemeClr val="accent1">
+              <a:alpha val="40000"/>
+            </a:schemeClr>
+          </a:solidFill>
+          <a:ln>
+            <a:solidFill>
+              <a:schemeClr val="accent1"/>
+            </a:solidFill>
+          </a:ln>
+        </p:spPr>
+        <p:style>
+          <a:lnRef idx="2">
+            <a:schemeClr val="accent1">
+              <a:shade val="50000"/>
+            </a:schemeClr>
+          </a:lnRef>
+          <a:fillRef idx="1">
+            <a:schemeClr val="accent1"/>
+          </a:fillRef>
+          <a:effectRef idx="0">
+            <a:schemeClr val="accent1"/>
+          </a:effectRef>
+          <a:fontRef idx="minor">
+            <a:schemeClr val="lt1"/>
+          </a:fontRef>
+        </p:style>
+        <p:txBody>
+          <a:bodyPr rtlCol="0" anchor="ctr"/>
+          <a:lstStyle/>
+          <a:p>
+            <a:pPr algn="ctr"/>
+            <a:endParaRPr lang="fr-FR">
+              <a:ln w="0"/>
+              <a:solidFill>
+                <a:schemeClr val="accent1"/>
+              </a:solidFill>
+              <a:effectLst>
+                <a:outerShdw blurRad="38100" dist="25400" dir="5400000" algn="ctr" rotWithShape="0">
+                  <a:srgbClr val="6E747A">
+                    <a:alpha val="43000"/>
+                  </a:srgbClr>
+                </a:outerShdw>
+              </a:effectLst>
+            </a:endParaRPr>
+          </a:p>
+        </p:txBody>
+      </p:sp>
+      <p:sp>
+        <p:nvSpPr>
           <p:cNvPr id="2" name="Title 1">
             <a:extLst>
               <a:ext uri="{FF2B5EF4-FFF2-40B4-BE49-F238E27FC236}">
@@ -11839,6 +12950,132 @@
             <a:r>
               <a:rPr lang="fr-CH" dirty="0"/>
               <a:t>Jeu de données</a:t>
+            </a:r>
+            <a:endParaRPr lang="en-CH" dirty="0"/>
+          </a:p>
+        </p:txBody>
+      </p:sp>
+      <p:sp>
+        <p:nvSpPr>
+          <p:cNvPr id="4" name="Content Placeholder 3">
+            <a:extLst>
+              <a:ext uri="{FF2B5EF4-FFF2-40B4-BE49-F238E27FC236}">
+                <a16:creationId xmlns:a16="http://schemas.microsoft.com/office/drawing/2014/main" id="{B3FE6735-9943-440E-875E-ADFC2008AF6F}"/>
+              </a:ext>
+            </a:extLst>
+          </p:cNvPr>
+          <p:cNvSpPr>
+            <a:spLocks noGrp="1"/>
+          </p:cNvSpPr>
+          <p:nvPr>
+            <p:ph sz="half" idx="2"/>
+          </p:nvPr>
+        </p:nvSpPr>
+        <p:spPr/>
+        <p:txBody>
+          <a:bodyPr>
+            <a:normAutofit lnSpcReduction="10000"/>
+          </a:bodyPr>
+          <a:lstStyle/>
+          <a:p>
+            <a:r>
+              <a:rPr lang="en-US" dirty="0" err="1"/>
+              <a:t>Previous_application</a:t>
+            </a:r>
+            <a:endParaRPr lang="en-US" dirty="0"/>
+          </a:p>
+          <a:p>
+            <a:r>
+              <a:rPr lang="en-US" i="1" dirty="0" err="1"/>
+              <a:t>Quelques</a:t>
+            </a:r>
+            <a:r>
+              <a:rPr lang="en-US" i="1" dirty="0"/>
+              <a:t> </a:t>
+            </a:r>
+            <a:r>
+              <a:rPr lang="en-US" i="1" dirty="0" err="1"/>
+              <a:t>informations</a:t>
+            </a:r>
+            <a:r>
+              <a:rPr lang="en-US" i="1" dirty="0"/>
+              <a:t> </a:t>
+            </a:r>
+            <a:r>
+              <a:rPr lang="en-US" i="1" dirty="0" err="1"/>
+              <a:t>supplemantaires</a:t>
+            </a:r>
+            <a:r>
+              <a:rPr lang="en-US" i="1" dirty="0"/>
+              <a:t> sur des credits </a:t>
+            </a:r>
+            <a:r>
+              <a:rPr lang="fr-FR" i="1" dirty="0" err="1"/>
+              <a:t>précédants</a:t>
+            </a:r>
+            <a:r>
+              <a:rPr lang="fr-FR" i="1" dirty="0"/>
+              <a:t>:</a:t>
+            </a:r>
+          </a:p>
+          <a:p>
+            <a:r>
+              <a:rPr lang="en-US" dirty="0" err="1"/>
+              <a:t>POS_CASH_balance</a:t>
+            </a:r>
+            <a:r>
+              <a:rPr lang="en-US" dirty="0"/>
+              <a:t> (</a:t>
+            </a:r>
+            <a:r>
+              <a:rPr lang="en-US" dirty="0" err="1"/>
+              <a:t>infos</a:t>
+            </a:r>
+            <a:r>
+              <a:rPr lang="en-US" dirty="0"/>
+              <a:t> divers, </a:t>
+            </a:r>
+            <a:r>
+              <a:rPr lang="en-US" dirty="0" err="1"/>
+              <a:t>notamment</a:t>
+            </a:r>
+            <a:r>
+              <a:rPr lang="en-US" dirty="0"/>
+              <a:t> </a:t>
+            </a:r>
+            <a:r>
+              <a:rPr lang="en-US" dirty="0" err="1"/>
+              <a:t>DaysPast</a:t>
+            </a:r>
+            <a:r>
+              <a:rPr lang="en-US" dirty="0"/>
+              <a:t> Due – </a:t>
+            </a:r>
+            <a:r>
+              <a:rPr lang="en-US" dirty="0" err="1"/>
+              <a:t>jours</a:t>
+            </a:r>
+            <a:r>
+              <a:rPr lang="en-US" dirty="0"/>
+              <a:t> de retard)</a:t>
+            </a:r>
+            <a:endParaRPr lang="en-CH" dirty="0"/>
+          </a:p>
+          <a:p>
+            <a:r>
+              <a:rPr lang="en-US" dirty="0" err="1"/>
+              <a:t>Credit_card_balance</a:t>
+            </a:r>
+            <a:endParaRPr lang="en-US" dirty="0"/>
+          </a:p>
+          <a:p>
+            <a:r>
+              <a:rPr lang="fr-FR" dirty="0" err="1"/>
+              <a:t>Installments_payments</a:t>
+            </a:r>
+            <a:r>
+              <a:rPr lang="fr-FR" dirty="0"/>
+              <a:t> (Versements/ Paiements échelonnés)</a:t>
             </a:r>
             <a:endParaRPr lang="en-CH" dirty="0"/>
           </a:p>
@@ -11889,7 +13126,14 @@
           <a:p>
             <a:r>
               <a:rPr lang="fr-CH" dirty="0"/>
-              <a:t>Bureau (tous les crédits du client)</a:t>
+              <a:t>Bureau </a:t>
+            </a:r>
+            <a:br>
+              <a:rPr lang="fr-CH" dirty="0"/>
+            </a:br>
+            <a:r>
+              <a:rPr lang="fr-CH" dirty="0"/>
+              <a:t>(tous les crédits du client)</a:t>
             </a:r>
           </a:p>
           <a:p>
@@ -11899,17 +13143,468 @@
             </a:r>
             <a:r>
               <a:rPr lang="fr-CH" dirty="0"/>
-              <a:t> (dépendante de Bureau)</a:t>
+              <a:t> </a:t>
+            </a:r>
+            <a:br>
+              <a:rPr lang="fr-CH" dirty="0"/>
+            </a:br>
+            <a:r>
+              <a:rPr lang="fr-CH" dirty="0"/>
+              <a:t>(dépendante de Bureau)</a:t>
             </a:r>
           </a:p>
         </p:txBody>
       </p:sp>
       <p:sp>
         <p:nvSpPr>
-          <p:cNvPr id="4" name="Content Placeholder 3">
+          <p:cNvPr id="11" name="Arc 10">
             <a:extLst>
               <a:ext uri="{FF2B5EF4-FFF2-40B4-BE49-F238E27FC236}">
-                <a16:creationId xmlns:a16="http://schemas.microsoft.com/office/drawing/2014/main" id="{B3FE6735-9943-440E-875E-ADFC2008AF6F}"/>
+                <a16:creationId xmlns:a16="http://schemas.microsoft.com/office/drawing/2014/main" id="{80215CB9-D1CA-4A12-875E-982C42059337}"/>
+              </a:ext>
+            </a:extLst>
+          </p:cNvPr>
+          <p:cNvSpPr/>
+          <p:nvPr/>
+        </p:nvSpPr>
+        <p:spPr>
+          <a:xfrm rot="10479674">
+            <a:off x="662302" y="2390142"/>
+            <a:ext cx="1334928" cy="1149393"/>
+          </a:xfrm>
+          <a:prstGeom prst="arc">
+            <a:avLst>
+              <a:gd name="adj1" fmla="val 18335251"/>
+              <a:gd name="adj2" fmla="val 3071370"/>
+            </a:avLst>
+          </a:prstGeom>
+          <a:ln w="9525" cap="flat" cmpd="sng" algn="ctr">
+            <a:solidFill>
+              <a:schemeClr val="accent1"/>
+            </a:solidFill>
+            <a:prstDash val="solid"/>
+            <a:round/>
+            <a:headEnd type="none" w="med" len="med"/>
+            <a:tailEnd type="triangle" w="med" len="med"/>
+          </a:ln>
+        </p:spPr>
+        <p:style>
+          <a:lnRef idx="0">
+            <a:scrgbClr r="0" g="0" b="0"/>
+          </a:lnRef>
+          <a:fillRef idx="0">
+            <a:scrgbClr r="0" g="0" b="0"/>
+          </a:fillRef>
+          <a:effectRef idx="0">
+            <a:scrgbClr r="0" g="0" b="0"/>
+          </a:effectRef>
+          <a:fontRef idx="minor">
+            <a:schemeClr val="tx1"/>
+          </a:fontRef>
+        </p:style>
+        <p:txBody>
+          <a:bodyPr rtlCol="0" anchor="ctr"/>
+          <a:lstStyle/>
+          <a:p>
+            <a:pPr algn="ctr"/>
+            <a:endParaRPr lang="fr-FR"/>
+          </a:p>
+        </p:txBody>
+      </p:sp>
+      <p:sp>
+        <p:nvSpPr>
+          <p:cNvPr id="12" name="Arc 11">
+            <a:extLst>
+              <a:ext uri="{FF2B5EF4-FFF2-40B4-BE49-F238E27FC236}">
+                <a16:creationId xmlns:a16="http://schemas.microsoft.com/office/drawing/2014/main" id="{5ABA0046-4172-467E-ABAA-6F104121A15C}"/>
+              </a:ext>
+            </a:extLst>
+          </p:cNvPr>
+          <p:cNvSpPr/>
+          <p:nvPr/>
+        </p:nvSpPr>
+        <p:spPr>
+          <a:xfrm rot="15146708">
+            <a:off x="270135" y="2359618"/>
+            <a:ext cx="1900418" cy="1848824"/>
+          </a:xfrm>
+          <a:prstGeom prst="arc">
+            <a:avLst>
+              <a:gd name="adj1" fmla="val 12746499"/>
+              <a:gd name="adj2" fmla="val 0"/>
+            </a:avLst>
+          </a:prstGeom>
+          <a:ln w="9525" cap="flat" cmpd="sng" algn="ctr">
+            <a:solidFill>
+              <a:schemeClr val="accent1"/>
+            </a:solidFill>
+            <a:prstDash val="solid"/>
+            <a:round/>
+            <a:headEnd type="none" w="med" len="med"/>
+            <a:tailEnd type="triangle" w="med" len="med"/>
+          </a:ln>
+        </p:spPr>
+        <p:style>
+          <a:lnRef idx="0">
+            <a:scrgbClr r="0" g="0" b="0"/>
+          </a:lnRef>
+          <a:fillRef idx="0">
+            <a:scrgbClr r="0" g="0" b="0"/>
+          </a:fillRef>
+          <a:effectRef idx="0">
+            <a:scrgbClr r="0" g="0" b="0"/>
+          </a:effectRef>
+          <a:fontRef idx="minor">
+            <a:schemeClr val="tx1"/>
+          </a:fontRef>
+        </p:style>
+        <p:txBody>
+          <a:bodyPr rtlCol="0" anchor="ctr"/>
+          <a:lstStyle/>
+          <a:p>
+            <a:pPr algn="ctr"/>
+            <a:endParaRPr lang="fr-FR"/>
+          </a:p>
+        </p:txBody>
+      </p:sp>
+      <p:cxnSp>
+        <p:nvCxnSpPr>
+          <p:cNvPr id="14" name="Straight Arrow Connector 13">
+            <a:extLst>
+              <a:ext uri="{FF2B5EF4-FFF2-40B4-BE49-F238E27FC236}">
+                <a16:creationId xmlns:a16="http://schemas.microsoft.com/office/drawing/2014/main" id="{B30011E5-A9AB-4CFE-8886-B51678FF4E8B}"/>
+              </a:ext>
+            </a:extLst>
+          </p:cNvPr>
+          <p:cNvCxnSpPr/>
+          <p:nvPr/>
+        </p:nvCxnSpPr>
+        <p:spPr>
+          <a:xfrm flipH="1">
+            <a:off x="4551977" y="2330531"/>
+            <a:ext cx="1828800" cy="0"/>
+          </a:xfrm>
+          <a:prstGeom prst="straightConnector1">
+            <a:avLst/>
+          </a:prstGeom>
+          <a:ln>
+            <a:tailEnd type="triangle"/>
+          </a:ln>
+        </p:spPr>
+        <p:style>
+          <a:lnRef idx="1">
+            <a:schemeClr val="accent1"/>
+          </a:lnRef>
+          <a:fillRef idx="0">
+            <a:schemeClr val="accent1"/>
+          </a:fillRef>
+          <a:effectRef idx="0">
+            <a:schemeClr val="accent1"/>
+          </a:effectRef>
+          <a:fontRef idx="minor">
+            <a:schemeClr val="tx1"/>
+          </a:fontRef>
+        </p:style>
+      </p:cxnSp>
+      <p:cxnSp>
+        <p:nvCxnSpPr>
+          <p:cNvPr id="20" name="Straight Arrow Connector 19">
+            <a:extLst>
+              <a:ext uri="{FF2B5EF4-FFF2-40B4-BE49-F238E27FC236}">
+                <a16:creationId xmlns:a16="http://schemas.microsoft.com/office/drawing/2014/main" id="{904B1A1B-87BD-4D06-87D7-ED7ECBE5AF47}"/>
+              </a:ext>
+            </a:extLst>
+          </p:cNvPr>
+          <p:cNvCxnSpPr>
+            <a:cxnSpLocks/>
+            <a:stCxn id="28" idx="0"/>
+          </p:cNvCxnSpPr>
+          <p:nvPr/>
+        </p:nvCxnSpPr>
+        <p:spPr>
+          <a:xfrm flipH="1" flipV="1">
+            <a:off x="4528416" y="2403950"/>
+            <a:ext cx="1994576" cy="1169586"/>
+          </a:xfrm>
+          <a:prstGeom prst="straightConnector1">
+            <a:avLst/>
+          </a:prstGeom>
+          <a:ln>
+            <a:tailEnd type="triangle"/>
+          </a:ln>
+        </p:spPr>
+        <p:style>
+          <a:lnRef idx="1">
+            <a:schemeClr val="accent1"/>
+          </a:lnRef>
+          <a:fillRef idx="0">
+            <a:schemeClr val="accent1"/>
+          </a:fillRef>
+          <a:effectRef idx="0">
+            <a:schemeClr val="accent1"/>
+          </a:effectRef>
+          <a:fontRef idx="minor">
+            <a:schemeClr val="tx1"/>
+          </a:fontRef>
+        </p:style>
+      </p:cxnSp>
+      <p:cxnSp>
+        <p:nvCxnSpPr>
+          <p:cNvPr id="22" name="Straight Arrow Connector 21">
+            <a:extLst>
+              <a:ext uri="{FF2B5EF4-FFF2-40B4-BE49-F238E27FC236}">
+                <a16:creationId xmlns:a16="http://schemas.microsoft.com/office/drawing/2014/main" id="{03D0ECAF-99EE-473C-B8C0-D61DAC006ED9}"/>
+              </a:ext>
+            </a:extLst>
+          </p:cNvPr>
+          <p:cNvCxnSpPr>
+            <a:cxnSpLocks/>
+          </p:cNvCxnSpPr>
+          <p:nvPr/>
+        </p:nvCxnSpPr>
+        <p:spPr>
+          <a:xfrm flipH="1" flipV="1">
+            <a:off x="4511930" y="2502920"/>
+            <a:ext cx="2022640" cy="2162522"/>
+          </a:xfrm>
+          <a:prstGeom prst="straightConnector1">
+            <a:avLst/>
+          </a:prstGeom>
+          <a:ln>
+            <a:tailEnd type="triangle"/>
+          </a:ln>
+        </p:spPr>
+        <p:style>
+          <a:lnRef idx="1">
+            <a:schemeClr val="accent1"/>
+          </a:lnRef>
+          <a:fillRef idx="0">
+            <a:schemeClr val="accent1"/>
+          </a:fillRef>
+          <a:effectRef idx="0">
+            <a:schemeClr val="accent1"/>
+          </a:effectRef>
+          <a:fontRef idx="minor">
+            <a:schemeClr val="tx1"/>
+          </a:fontRef>
+        </p:style>
+      </p:cxnSp>
+      <p:cxnSp>
+        <p:nvCxnSpPr>
+          <p:cNvPr id="24" name="Straight Arrow Connector 23">
+            <a:extLst>
+              <a:ext uri="{FF2B5EF4-FFF2-40B4-BE49-F238E27FC236}">
+                <a16:creationId xmlns:a16="http://schemas.microsoft.com/office/drawing/2014/main" id="{7BC9FD95-55AD-491B-B8F0-EF37BCD0EDEB}"/>
+              </a:ext>
+            </a:extLst>
+          </p:cNvPr>
+          <p:cNvCxnSpPr>
+            <a:cxnSpLocks/>
+            <a:stCxn id="35" idx="0"/>
+          </p:cNvCxnSpPr>
+          <p:nvPr/>
+        </p:nvCxnSpPr>
+        <p:spPr>
+          <a:xfrm flipH="1" flipV="1">
+            <a:off x="4511932" y="2681635"/>
+            <a:ext cx="2034186" cy="2436236"/>
+          </a:xfrm>
+          <a:prstGeom prst="straightConnector1">
+            <a:avLst/>
+          </a:prstGeom>
+          <a:ln>
+            <a:tailEnd type="triangle"/>
+          </a:ln>
+        </p:spPr>
+        <p:style>
+          <a:lnRef idx="1">
+            <a:schemeClr val="accent1"/>
+          </a:lnRef>
+          <a:fillRef idx="0">
+            <a:schemeClr val="accent1"/>
+          </a:fillRef>
+          <a:effectRef idx="0">
+            <a:schemeClr val="accent1"/>
+          </a:effectRef>
+          <a:fontRef idx="minor">
+            <a:schemeClr val="tx1"/>
+          </a:fontRef>
+        </p:style>
+      </p:cxnSp>
+      <p:sp>
+        <p:nvSpPr>
+          <p:cNvPr id="28" name="Arc 27">
+            <a:extLst>
+              <a:ext uri="{FF2B5EF4-FFF2-40B4-BE49-F238E27FC236}">
+                <a16:creationId xmlns:a16="http://schemas.microsoft.com/office/drawing/2014/main" id="{BEC1B5AC-D877-48C0-99E8-1778CD7E8B2D}"/>
+              </a:ext>
+            </a:extLst>
+          </p:cNvPr>
+          <p:cNvSpPr/>
+          <p:nvPr/>
+        </p:nvSpPr>
+        <p:spPr>
+          <a:xfrm rot="14264862">
+            <a:off x="6163118" y="2551947"/>
+            <a:ext cx="1326124" cy="1093565"/>
+          </a:xfrm>
+          <a:prstGeom prst="arc">
+            <a:avLst>
+              <a:gd name="adj1" fmla="val 14688755"/>
+              <a:gd name="adj2" fmla="val 0"/>
+            </a:avLst>
+          </a:prstGeom>
+          <a:ln w="9525" cap="flat" cmpd="sng" algn="ctr">
+            <a:solidFill>
+              <a:schemeClr val="accent1"/>
+            </a:solidFill>
+            <a:prstDash val="solid"/>
+            <a:round/>
+            <a:headEnd type="none" w="med" len="med"/>
+            <a:tailEnd type="triangle" w="med" len="med"/>
+          </a:ln>
+        </p:spPr>
+        <p:style>
+          <a:lnRef idx="0">
+            <a:scrgbClr r="0" g="0" b="0"/>
+          </a:lnRef>
+          <a:fillRef idx="0">
+            <a:scrgbClr r="0" g="0" b="0"/>
+          </a:fillRef>
+          <a:effectRef idx="0">
+            <a:scrgbClr r="0" g="0" b="0"/>
+          </a:effectRef>
+          <a:fontRef idx="minor">
+            <a:schemeClr val="tx1"/>
+          </a:fontRef>
+        </p:style>
+        <p:txBody>
+          <a:bodyPr rtlCol="0" anchor="ctr"/>
+          <a:lstStyle/>
+          <a:p>
+            <a:pPr algn="ctr"/>
+            <a:endParaRPr lang="fr-FR"/>
+          </a:p>
+        </p:txBody>
+      </p:sp>
+      <p:sp>
+        <p:nvSpPr>
+          <p:cNvPr id="34" name="Arc 33">
+            <a:extLst>
+              <a:ext uri="{FF2B5EF4-FFF2-40B4-BE49-F238E27FC236}">
+                <a16:creationId xmlns:a16="http://schemas.microsoft.com/office/drawing/2014/main" id="{DB9CA4F5-BE79-40A9-AFCB-A2A236E9BEEB}"/>
+              </a:ext>
+            </a:extLst>
+          </p:cNvPr>
+          <p:cNvSpPr/>
+          <p:nvPr/>
+        </p:nvSpPr>
+        <p:spPr>
+          <a:xfrm rot="16200000">
+            <a:off x="5734213" y="2363614"/>
+            <a:ext cx="2408330" cy="2342162"/>
+          </a:xfrm>
+          <a:prstGeom prst="arc">
+            <a:avLst>
+              <a:gd name="adj1" fmla="val 12015984"/>
+              <a:gd name="adj2" fmla="val 20083339"/>
+            </a:avLst>
+          </a:prstGeom>
+          <a:ln w="9525" cap="flat" cmpd="sng" algn="ctr">
+            <a:solidFill>
+              <a:schemeClr val="accent1"/>
+            </a:solidFill>
+            <a:prstDash val="solid"/>
+            <a:round/>
+            <a:headEnd type="none" w="med" len="med"/>
+            <a:tailEnd type="triangle" w="med" len="med"/>
+          </a:ln>
+        </p:spPr>
+        <p:style>
+          <a:lnRef idx="0">
+            <a:scrgbClr r="0" g="0" b="0"/>
+          </a:lnRef>
+          <a:fillRef idx="0">
+            <a:scrgbClr r="0" g="0" b="0"/>
+          </a:fillRef>
+          <a:effectRef idx="0">
+            <a:scrgbClr r="0" g="0" b="0"/>
+          </a:effectRef>
+          <a:fontRef idx="minor">
+            <a:schemeClr val="tx1"/>
+          </a:fontRef>
+        </p:style>
+        <p:txBody>
+          <a:bodyPr rtlCol="0" anchor="ctr"/>
+          <a:lstStyle/>
+          <a:p>
+            <a:pPr algn="ctr"/>
+            <a:endParaRPr lang="fr-FR"/>
+          </a:p>
+        </p:txBody>
+      </p:sp>
+      <p:sp>
+        <p:nvSpPr>
+          <p:cNvPr id="35" name="Arc 34">
+            <a:extLst>
+              <a:ext uri="{FF2B5EF4-FFF2-40B4-BE49-F238E27FC236}">
+                <a16:creationId xmlns:a16="http://schemas.microsoft.com/office/drawing/2014/main" id="{892FF1C6-61AE-4469-A9CA-DD06FF066CE6}"/>
+              </a:ext>
+            </a:extLst>
+          </p:cNvPr>
+          <p:cNvSpPr/>
+          <p:nvPr/>
+        </p:nvSpPr>
+        <p:spPr>
+          <a:xfrm rot="16200000">
+            <a:off x="5563445" y="2186189"/>
+            <a:ext cx="2935619" cy="3077468"/>
+          </a:xfrm>
+          <a:prstGeom prst="arc">
+            <a:avLst>
+              <a:gd name="adj1" fmla="val 11952136"/>
+              <a:gd name="adj2" fmla="val 20083339"/>
+            </a:avLst>
+          </a:prstGeom>
+          <a:ln w="9525" cap="flat" cmpd="sng" algn="ctr">
+            <a:solidFill>
+              <a:schemeClr val="accent1"/>
+            </a:solidFill>
+            <a:prstDash val="solid"/>
+            <a:round/>
+            <a:headEnd type="none" w="med" len="med"/>
+            <a:tailEnd type="triangle" w="med" len="med"/>
+          </a:ln>
+        </p:spPr>
+        <p:style>
+          <a:lnRef idx="0">
+            <a:scrgbClr r="0" g="0" b="0"/>
+          </a:lnRef>
+          <a:fillRef idx="0">
+            <a:scrgbClr r="0" g="0" b="0"/>
+          </a:fillRef>
+          <a:effectRef idx="0">
+            <a:scrgbClr r="0" g="0" b="0"/>
+          </a:effectRef>
+          <a:fontRef idx="minor">
+            <a:schemeClr val="tx1"/>
+          </a:fontRef>
+        </p:style>
+        <p:txBody>
+          <a:bodyPr rtlCol="0" anchor="ctr"/>
+          <a:lstStyle/>
+          <a:p>
+            <a:pPr algn="ctr"/>
+            <a:endParaRPr lang="fr-FR"/>
+          </a:p>
+        </p:txBody>
+      </p:sp>
+      <p:sp>
+        <p:nvSpPr>
+          <p:cNvPr id="37" name="Slide Number Placeholder 36">
+            <a:extLst>
+              <a:ext uri="{FF2B5EF4-FFF2-40B4-BE49-F238E27FC236}">
+                <a16:creationId xmlns:a16="http://schemas.microsoft.com/office/drawing/2014/main" id="{0E43B2AC-F465-4001-85D5-1CAC95CC2910}"/>
               </a:ext>
             </a:extLst>
           </p:cNvPr>
@@ -11917,116 +13612,19 @@
             <a:spLocks noGrp="1"/>
           </p:cNvSpPr>
           <p:nvPr>
-            <p:ph sz="half" idx="2"/>
+            <p:ph type="sldNum" sz="quarter" idx="12"/>
           </p:nvPr>
         </p:nvSpPr>
         <p:spPr/>
         <p:txBody>
-          <a:bodyPr>
-            <a:normAutofit lnSpcReduction="10000"/>
-          </a:bodyPr>
+          <a:bodyPr/>
           <a:lstStyle/>
           <a:p>
-            <a:r>
-              <a:rPr lang="en-US" dirty="0" err="1"/>
-              <a:t>Previous_application</a:t>
-            </a:r>
+            <a:fld id="{3A98EE3D-8CD1-4C3F-BD1C-C98C9596463C}" type="slidenum">
+              <a:rPr lang="en-US" smtClean="0"/>
+              <a:t>4</a:t>
+            </a:fld>
             <a:endParaRPr lang="en-US" dirty="0"/>
-          </a:p>
-          <a:p>
-            <a:r>
-              <a:rPr lang="en-US" dirty="0" err="1"/>
-              <a:t>Quelques</a:t>
-            </a:r>
-            <a:r>
-              <a:rPr lang="en-US" dirty="0"/>
-              <a:t> </a:t>
-            </a:r>
-            <a:r>
-              <a:rPr lang="en-US" dirty="0" err="1"/>
-              <a:t>informations</a:t>
-            </a:r>
-            <a:r>
-              <a:rPr lang="en-US" dirty="0"/>
-              <a:t> </a:t>
-            </a:r>
-            <a:r>
-              <a:rPr lang="en-US" dirty="0" err="1"/>
-              <a:t>supplemantaires</a:t>
-            </a:r>
-            <a:r>
-              <a:rPr lang="en-US" dirty="0"/>
-              <a:t> sur des credits </a:t>
-            </a:r>
-            <a:r>
-              <a:rPr lang="fr-FR" dirty="0" err="1"/>
-              <a:t>précédants</a:t>
-            </a:r>
-            <a:r>
-              <a:rPr lang="fr-FR" dirty="0"/>
-              <a:t>:</a:t>
-            </a:r>
-          </a:p>
-          <a:p>
-            <a:r>
-              <a:rPr lang="en-US" dirty="0" err="1"/>
-              <a:t>POS_CASH_balance</a:t>
-            </a:r>
-            <a:r>
-              <a:rPr lang="en-US" dirty="0"/>
-              <a:t> (</a:t>
-            </a:r>
-            <a:r>
-              <a:rPr lang="en-US" dirty="0" err="1"/>
-              <a:t>infos</a:t>
-            </a:r>
-            <a:r>
-              <a:rPr lang="en-US" dirty="0"/>
-              <a:t> divers, </a:t>
-            </a:r>
-            <a:r>
-              <a:rPr lang="en-US" dirty="0" err="1"/>
-              <a:t>notamment</a:t>
-            </a:r>
-            <a:r>
-              <a:rPr lang="en-US" dirty="0"/>
-              <a:t> </a:t>
-            </a:r>
-            <a:r>
-              <a:rPr lang="en-US" dirty="0" err="1"/>
-              <a:t>DaysPast</a:t>
-            </a:r>
-            <a:r>
-              <a:rPr lang="en-US" dirty="0"/>
-              <a:t> Due – </a:t>
-            </a:r>
-            <a:r>
-              <a:rPr lang="en-US" dirty="0" err="1"/>
-              <a:t>jours</a:t>
-            </a:r>
-            <a:r>
-              <a:rPr lang="en-US" dirty="0"/>
-              <a:t> de retard)</a:t>
-            </a:r>
-            <a:endParaRPr lang="en-CH" dirty="0"/>
-          </a:p>
-          <a:p>
-            <a:r>
-              <a:rPr lang="en-US" dirty="0" err="1"/>
-              <a:t>Credit_card_balance</a:t>
-            </a:r>
-            <a:endParaRPr lang="en-US" dirty="0"/>
-          </a:p>
-          <a:p>
-            <a:r>
-              <a:rPr lang="fr-FR" dirty="0" err="1"/>
-              <a:t>Installments_payments</a:t>
-            </a:r>
-            <a:r>
-              <a:rPr lang="fr-FR" dirty="0"/>
-              <a:t> (Versements/ Paiements échelonnés)</a:t>
-            </a:r>
-            <a:endParaRPr lang="en-CH" dirty="0"/>
           </a:p>
         </p:txBody>
       </p:sp>
@@ -13705,6 +15303,35 @@
           </a:p>
         </p:txBody>
       </p:sp>
+      <p:sp>
+        <p:nvSpPr>
+          <p:cNvPr id="3" name="Slide Number Placeholder 2">
+            <a:extLst>
+              <a:ext uri="{FF2B5EF4-FFF2-40B4-BE49-F238E27FC236}">
+                <a16:creationId xmlns:a16="http://schemas.microsoft.com/office/drawing/2014/main" id="{FD644382-E1B3-4724-ACBE-15697A13E0BB}"/>
+              </a:ext>
+            </a:extLst>
+          </p:cNvPr>
+          <p:cNvSpPr>
+            <a:spLocks noGrp="1"/>
+          </p:cNvSpPr>
+          <p:nvPr>
+            <p:ph type="sldNum" sz="quarter" idx="12"/>
+          </p:nvPr>
+        </p:nvSpPr>
+        <p:spPr/>
+        <p:txBody>
+          <a:bodyPr/>
+          <a:lstStyle/>
+          <a:p>
+            <a:fld id="{3A98EE3D-8CD1-4C3F-BD1C-C98C9596463C}" type="slidenum">
+              <a:rPr lang="en-US" sz="1100" b="1" smtClean="0"/>
+              <a:t>5</a:t>
+            </a:fld>
+            <a:endParaRPr lang="en-US" sz="1100" b="1" dirty="0"/>
+          </a:p>
+        </p:txBody>
+      </p:sp>
     </p:spTree>
     <p:extLst>
       <p:ext uri="{BB962C8B-B14F-4D97-AF65-F5344CB8AC3E}">
@@ -14227,6 +15854,44 @@
           </a:prstGeom>
         </p:spPr>
       </p:pic>
+      <p:sp>
+        <p:nvSpPr>
+          <p:cNvPr id="2" name="Slide Number Placeholder 1">
+            <a:extLst>
+              <a:ext uri="{FF2B5EF4-FFF2-40B4-BE49-F238E27FC236}">
+                <a16:creationId xmlns:a16="http://schemas.microsoft.com/office/drawing/2014/main" id="{A2831C63-4CF8-467B-93BF-3130DC662D20}"/>
+              </a:ext>
+            </a:extLst>
+          </p:cNvPr>
+          <p:cNvSpPr>
+            <a:spLocks noGrp="1"/>
+          </p:cNvSpPr>
+          <p:nvPr>
+            <p:ph type="sldNum" sz="quarter" idx="12"/>
+          </p:nvPr>
+        </p:nvSpPr>
+        <p:spPr/>
+        <p:txBody>
+          <a:bodyPr/>
+          <a:lstStyle/>
+          <a:p>
+            <a:fld id="{3A98EE3D-8CD1-4C3F-BD1C-C98C9596463C}" type="slidenum">
+              <a:rPr lang="en-US" sz="1100" b="1" smtClean="0">
+                <a:solidFill>
+                  <a:schemeClr val="bg1"/>
+                </a:solidFill>
+              </a:rPr>
+              <a:pPr/>
+              <a:t>6</a:t>
+            </a:fld>
+            <a:endParaRPr lang="en-US" sz="1100" b="1" dirty="0">
+              <a:solidFill>
+                <a:schemeClr val="bg1"/>
+              </a:solidFill>
+            </a:endParaRPr>
+          </a:p>
+        </p:txBody>
+      </p:sp>
     </p:spTree>
     <p:extLst>
       <p:ext uri="{BB962C8B-B14F-4D97-AF65-F5344CB8AC3E}">
@@ -14927,6 +16592,36 @@
           </a:p>
         </p:txBody>
       </p:sp>
+      <p:sp>
+        <p:nvSpPr>
+          <p:cNvPr id="2" name="Slide Number Placeholder 1">
+            <a:extLst>
+              <a:ext uri="{FF2B5EF4-FFF2-40B4-BE49-F238E27FC236}">
+                <a16:creationId xmlns:a16="http://schemas.microsoft.com/office/drawing/2014/main" id="{99CE6DED-BE4D-4334-AF77-6270D1ACAEB1}"/>
+              </a:ext>
+            </a:extLst>
+          </p:cNvPr>
+          <p:cNvSpPr>
+            <a:spLocks noGrp="1"/>
+          </p:cNvSpPr>
+          <p:nvPr>
+            <p:ph type="sldNum" sz="quarter" idx="12"/>
+          </p:nvPr>
+        </p:nvSpPr>
+        <p:spPr/>
+        <p:txBody>
+          <a:bodyPr/>
+          <a:lstStyle/>
+          <a:p>
+            <a:fld id="{3A98EE3D-8CD1-4C3F-BD1C-C98C9596463C}" type="slidenum">
+              <a:rPr lang="en-US" sz="1100" b="1" smtClean="0"/>
+              <a:pPr/>
+              <a:t>7</a:t>
+            </a:fld>
+            <a:endParaRPr lang="en-US" sz="1100" b="1" dirty="0"/>
+          </a:p>
+        </p:txBody>
+      </p:sp>
     </p:spTree>
     <p:extLst>
       <p:ext uri="{BB962C8B-B14F-4D97-AF65-F5344CB8AC3E}">
@@ -15129,6 +16824,171 @@
               <a:rPr lang="fr-FR" dirty="0"/>
               <a:t>Imputer des valeurs manquantes venants du Bureau</a:t>
             </a:r>
+          </a:p>
+        </p:txBody>
+      </p:sp>
+      <p:sp>
+        <p:nvSpPr>
+          <p:cNvPr id="2" name="Slide Number Placeholder 1">
+            <a:extLst>
+              <a:ext uri="{FF2B5EF4-FFF2-40B4-BE49-F238E27FC236}">
+                <a16:creationId xmlns:a16="http://schemas.microsoft.com/office/drawing/2014/main" id="{4A198176-9D5C-4B48-8579-46A08DF9F749}"/>
+              </a:ext>
+            </a:extLst>
+          </p:cNvPr>
+          <p:cNvSpPr>
+            <a:spLocks noGrp="1"/>
+          </p:cNvSpPr>
+          <p:nvPr>
+            <p:ph type="sldNum" sz="quarter" idx="12"/>
+          </p:nvPr>
+        </p:nvSpPr>
+        <p:spPr/>
+        <p:txBody>
+          <a:bodyPr/>
+          <a:lstStyle/>
+          <a:p>
+            <a:fld id="{3A98EE3D-8CD1-4C3F-BD1C-C98C9596463C}" type="slidenum">
+              <a:rPr lang="en-US" smtClean="0"/>
+              <a:t>8</a:t>
+            </a:fld>
+            <a:endParaRPr lang="en-US" dirty="0"/>
+          </a:p>
+        </p:txBody>
+      </p:sp>
+      <p:sp>
+        <p:nvSpPr>
+          <p:cNvPr id="8" name="Rectangle: Rounded Corners 7">
+            <a:extLst>
+              <a:ext uri="{FF2B5EF4-FFF2-40B4-BE49-F238E27FC236}">
+                <a16:creationId xmlns:a16="http://schemas.microsoft.com/office/drawing/2014/main" id="{4D922436-57B3-4E68-9933-20E9F369653E}"/>
+              </a:ext>
+            </a:extLst>
+          </p:cNvPr>
+          <p:cNvSpPr/>
+          <p:nvPr/>
+        </p:nvSpPr>
+        <p:spPr>
+          <a:xfrm>
+            <a:off x="6557730" y="2079747"/>
+            <a:ext cx="2213603" cy="496592"/>
+          </a:xfrm>
+          <a:prstGeom prst="roundRect">
+            <a:avLst/>
+          </a:prstGeom>
+          <a:solidFill>
+            <a:schemeClr val="accent1">
+              <a:alpha val="20000"/>
+            </a:schemeClr>
+          </a:solidFill>
+          <a:ln>
+            <a:solidFill>
+              <a:schemeClr val="accent1"/>
+            </a:solidFill>
+          </a:ln>
+        </p:spPr>
+        <p:style>
+          <a:lnRef idx="2">
+            <a:schemeClr val="accent1">
+              <a:shade val="50000"/>
+            </a:schemeClr>
+          </a:lnRef>
+          <a:fillRef idx="1">
+            <a:schemeClr val="accent1"/>
+          </a:fillRef>
+          <a:effectRef idx="0">
+            <a:schemeClr val="accent1"/>
+          </a:effectRef>
+          <a:fontRef idx="minor">
+            <a:schemeClr val="lt1"/>
+          </a:fontRef>
+        </p:style>
+        <p:txBody>
+          <a:bodyPr rtlCol="0" anchor="ctr"/>
+          <a:lstStyle/>
+          <a:p>
+            <a:pPr algn="ctr"/>
+            <a:endParaRPr lang="fr-FR">
+              <a:ln w="0"/>
+              <a:solidFill>
+                <a:schemeClr val="accent1"/>
+              </a:solidFill>
+              <a:effectLst>
+                <a:outerShdw blurRad="38100" dist="25400" dir="5400000" algn="ctr" rotWithShape="0">
+                  <a:srgbClr val="6E747A">
+                    <a:alpha val="43000"/>
+                  </a:srgbClr>
+                </a:outerShdw>
+              </a:effectLst>
+            </a:endParaRPr>
+          </a:p>
+        </p:txBody>
+      </p:sp>
+      <p:sp>
+        <p:nvSpPr>
+          <p:cNvPr id="9" name="Rectangle: Rounded Corners 8">
+            <a:extLst>
+              <a:ext uri="{FF2B5EF4-FFF2-40B4-BE49-F238E27FC236}">
+                <a16:creationId xmlns:a16="http://schemas.microsoft.com/office/drawing/2014/main" id="{4945147E-32B3-42E4-A8D6-15EB8D766435}"/>
+              </a:ext>
+            </a:extLst>
+          </p:cNvPr>
+          <p:cNvSpPr/>
+          <p:nvPr/>
+        </p:nvSpPr>
+        <p:spPr>
+          <a:xfrm>
+            <a:off x="1116910" y="2085303"/>
+            <a:ext cx="2213603" cy="496592"/>
+          </a:xfrm>
+          <a:prstGeom prst="roundRect">
+            <a:avLst/>
+          </a:prstGeom>
+          <a:solidFill>
+            <a:schemeClr val="accent1">
+              <a:alpha val="20000"/>
+            </a:schemeClr>
+          </a:solidFill>
+          <a:ln>
+            <a:solidFill>
+              <a:schemeClr val="accent1"/>
+            </a:solidFill>
+          </a:ln>
+        </p:spPr>
+        <p:style>
+          <a:lnRef idx="2">
+            <a:schemeClr val="accent1">
+              <a:shade val="50000"/>
+            </a:schemeClr>
+          </a:lnRef>
+          <a:fillRef idx="1">
+            <a:schemeClr val="accent1"/>
+          </a:fillRef>
+          <a:effectRef idx="0">
+            <a:schemeClr val="accent1"/>
+          </a:effectRef>
+          <a:fontRef idx="minor">
+            <a:schemeClr val="lt1"/>
+          </a:fontRef>
+        </p:style>
+        <p:txBody>
+          <a:bodyPr rtlCol="0" anchor="ctr"/>
+          <a:lstStyle/>
+          <a:p>
+            <a:pPr algn="ctr"/>
+            <a:endParaRPr lang="fr-FR">
+              <a:ln w="0"/>
+              <a:solidFill>
+                <a:schemeClr val="accent1"/>
+              </a:solidFill>
+              <a:effectLst>
+                <a:outerShdw blurRad="38100" dist="25400" dir="5400000" algn="ctr" rotWithShape="0">
+                  <a:srgbClr val="6E747A">
+                    <a:alpha val="43000"/>
+                  </a:srgbClr>
+                </a:outerShdw>
+              </a:effectLst>
+            </a:endParaRPr>
           </a:p>
         </p:txBody>
       </p:sp>
@@ -15266,15 +17126,7 @@
           <a:p>
             <a:r>
               <a:rPr lang="fr-FR" dirty="0"/>
-              <a:t>Tailler le jeu de données </a:t>
-            </a:r>
-            <a:r>
-              <a:rPr lang="fr-FR" dirty="0" err="1"/>
-              <a:t>por</a:t>
-            </a:r>
-            <a:r>
-              <a:rPr lang="fr-FR" dirty="0"/>
-              <a:t> réduire le temps d’exécution de notebook</a:t>
+              <a:t>Tailler le jeu de données pour réduire le temps d’exécution de notebook</a:t>
             </a:r>
           </a:p>
           <a:p>
@@ -15350,6 +17202,35 @@
           </a:xfrm>
         </p:spPr>
       </p:pic>
+      <p:sp>
+        <p:nvSpPr>
+          <p:cNvPr id="4" name="Slide Number Placeholder 3">
+            <a:extLst>
+              <a:ext uri="{FF2B5EF4-FFF2-40B4-BE49-F238E27FC236}">
+                <a16:creationId xmlns:a16="http://schemas.microsoft.com/office/drawing/2014/main" id="{EC8225AB-0853-47E3-8F61-29FB41878AEC}"/>
+              </a:ext>
+            </a:extLst>
+          </p:cNvPr>
+          <p:cNvSpPr>
+            <a:spLocks noGrp="1"/>
+          </p:cNvSpPr>
+          <p:nvPr>
+            <p:ph type="sldNum" sz="quarter" idx="12"/>
+          </p:nvPr>
+        </p:nvSpPr>
+        <p:spPr/>
+        <p:txBody>
+          <a:bodyPr/>
+          <a:lstStyle/>
+          <a:p>
+            <a:fld id="{3A98EE3D-8CD1-4C3F-BD1C-C98C9596463C}" type="slidenum">
+              <a:rPr lang="en-US" smtClean="0"/>
+              <a:t>9</a:t>
+            </a:fld>
+            <a:endParaRPr lang="en-US" dirty="0"/>
+          </a:p>
+        </p:txBody>
+      </p:sp>
     </p:spTree>
     <p:extLst>
       <p:ext uri="{BB962C8B-B14F-4D97-AF65-F5344CB8AC3E}">
@@ -15646,6 +17527,301 @@
 </a:theme>
 </file>
 
+<file path=ppt/theme/theme2.xml><?xml version="1.0" encoding="utf-8"?>
+<a:theme xmlns:a="http://schemas.openxmlformats.org/drawingml/2006/main" name="Office Theme">
+  <a:themeElements>
+    <a:clrScheme name="Office">
+      <a:dk1>
+        <a:sysClr val="windowText" lastClr="000000"/>
+      </a:dk1>
+      <a:lt1>
+        <a:sysClr val="window" lastClr="FFFFFF"/>
+      </a:lt1>
+      <a:dk2>
+        <a:srgbClr val="44546A"/>
+      </a:dk2>
+      <a:lt2>
+        <a:srgbClr val="E7E6E6"/>
+      </a:lt2>
+      <a:accent1>
+        <a:srgbClr val="4472C4"/>
+      </a:accent1>
+      <a:accent2>
+        <a:srgbClr val="ED7D31"/>
+      </a:accent2>
+      <a:accent3>
+        <a:srgbClr val="A5A5A5"/>
+      </a:accent3>
+      <a:accent4>
+        <a:srgbClr val="FFC000"/>
+      </a:accent4>
+      <a:accent5>
+        <a:srgbClr val="5B9BD5"/>
+      </a:accent5>
+      <a:accent6>
+        <a:srgbClr val="70AD47"/>
+      </a:accent6>
+      <a:hlink>
+        <a:srgbClr val="0563C1"/>
+      </a:hlink>
+      <a:folHlink>
+        <a:srgbClr val="954F72"/>
+      </a:folHlink>
+    </a:clrScheme>
+    <a:fontScheme name="Office">
+      <a:majorFont>
+        <a:latin typeface="Calibri Light" panose="020F0302020204030204"/>
+        <a:ea typeface=""/>
+        <a:cs typeface=""/>
+        <a:font script="Jpan" typeface="游ゴシック Light"/>
+        <a:font script="Hang" typeface="맑은 고딕"/>
+        <a:font script="Hans" typeface="等线 Light"/>
+        <a:font script="Hant" typeface="新細明體"/>
+        <a:font script="Arab" typeface="Times New Roman"/>
+        <a:font script="Hebr" typeface="Times New Roman"/>
+        <a:font script="Thai" typeface="Angsana New"/>
+        <a:font script="Ethi" typeface="Nyala"/>
+        <a:font script="Beng" typeface="Vrinda"/>
+        <a:font script="Gujr" typeface="Shruti"/>
+        <a:font script="Khmr" typeface="MoolBoran"/>
+        <a:font script="Knda" typeface="Tunga"/>
+        <a:font script="Guru" typeface="Raavi"/>
+        <a:font script="Cans" typeface="Euphemia"/>
+        <a:font script="Cher" typeface="Plantagenet Cherokee"/>
+        <a:font script="Yiii" typeface="Microsoft Yi Baiti"/>
+        <a:font script="Tibt" typeface="Microsoft Himalaya"/>
+        <a:font script="Thaa" typeface="MV Boli"/>
+        <a:font script="Deva" typeface="Mangal"/>
+        <a:font script="Telu" typeface="Gautami"/>
+        <a:font script="Taml" typeface="Latha"/>
+        <a:font script="Syrc" typeface="Estrangelo Edessa"/>
+        <a:font script="Orya" typeface="Kalinga"/>
+        <a:font script="Mlym" typeface="Kartika"/>
+        <a:font script="Laoo" typeface="DokChampa"/>
+        <a:font script="Sinh" typeface="Iskoola Pota"/>
+        <a:font script="Mong" typeface="Mongolian Baiti"/>
+        <a:font script="Viet" typeface="Times New Roman"/>
+        <a:font script="Uigh" typeface="Microsoft Uighur"/>
+        <a:font script="Geor" typeface="Sylfaen"/>
+        <a:font script="Armn" typeface="Arial"/>
+        <a:font script="Bugi" typeface="Leelawadee UI"/>
+        <a:font script="Bopo" typeface="Microsoft JhengHei"/>
+        <a:font script="Java" typeface="Javanese Text"/>
+        <a:font script="Lisu" typeface="Segoe UI"/>
+        <a:font script="Mymr" typeface="Myanmar Text"/>
+        <a:font script="Nkoo" typeface="Ebrima"/>
+        <a:font script="Olck" typeface="Nirmala UI"/>
+        <a:font script="Osma" typeface="Ebrima"/>
+        <a:font script="Phag" typeface="Phagspa"/>
+        <a:font script="Syrn" typeface="Estrangelo Edessa"/>
+        <a:font script="Syrj" typeface="Estrangelo Edessa"/>
+        <a:font script="Syre" typeface="Estrangelo Edessa"/>
+        <a:font script="Sora" typeface="Nirmala UI"/>
+        <a:font script="Tale" typeface="Microsoft Tai Le"/>
+        <a:font script="Talu" typeface="Microsoft New Tai Lue"/>
+        <a:font script="Tfng" typeface="Ebrima"/>
+      </a:majorFont>
+      <a:minorFont>
+        <a:latin typeface="Calibri" panose="020F0502020204030204"/>
+        <a:ea typeface=""/>
+        <a:cs typeface=""/>
+        <a:font script="Jpan" typeface="游ゴシック"/>
+        <a:font script="Hang" typeface="맑은 고딕"/>
+        <a:font script="Hans" typeface="等线"/>
+        <a:font script="Hant" typeface="新細明體"/>
+        <a:font script="Arab" typeface="Arial"/>
+        <a:font script="Hebr" typeface="Arial"/>
+        <a:font script="Thai" typeface="Cordia New"/>
+        <a:font script="Ethi" typeface="Nyala"/>
+        <a:font script="Beng" typeface="Vrinda"/>
+        <a:font script="Gujr" typeface="Shruti"/>
+        <a:font script="Khmr" typeface="DaunPenh"/>
+        <a:font script="Knda" typeface="Tunga"/>
+        <a:font script="Guru" typeface="Raavi"/>
+        <a:font script="Cans" typeface="Euphemia"/>
+        <a:font script="Cher" typeface="Plantagenet Cherokee"/>
+        <a:font script="Yiii" typeface="Microsoft Yi Baiti"/>
+        <a:font script="Tibt" typeface="Microsoft Himalaya"/>
+        <a:font script="Thaa" typeface="MV Boli"/>
+        <a:font script="Deva" typeface="Mangal"/>
+        <a:font script="Telu" typeface="Gautami"/>
+        <a:font script="Taml" typeface="Latha"/>
+        <a:font script="Syrc" typeface="Estrangelo Edessa"/>
+        <a:font script="Orya" typeface="Kalinga"/>
+        <a:font script="Mlym" typeface="Kartika"/>
+        <a:font script="Laoo" typeface="DokChampa"/>
+        <a:font script="Sinh" typeface="Iskoola Pota"/>
+        <a:font script="Mong" typeface="Mongolian Baiti"/>
+        <a:font script="Viet" typeface="Arial"/>
+        <a:font script="Uigh" typeface="Microsoft Uighur"/>
+        <a:font script="Geor" typeface="Sylfaen"/>
+        <a:font script="Armn" typeface="Arial"/>
+        <a:font script="Bugi" typeface="Leelawadee UI"/>
+        <a:font script="Bopo" typeface="Microsoft JhengHei"/>
+        <a:font script="Java" typeface="Javanese Text"/>
+        <a:font script="Lisu" typeface="Segoe UI"/>
+        <a:font script="Mymr" typeface="Myanmar Text"/>
+        <a:font script="Nkoo" typeface="Ebrima"/>
+        <a:font script="Olck" typeface="Nirmala UI"/>
+        <a:font script="Osma" typeface="Ebrima"/>
+        <a:font script="Phag" typeface="Phagspa"/>
+        <a:font script="Syrn" typeface="Estrangelo Edessa"/>
+        <a:font script="Syrj" typeface="Estrangelo Edessa"/>
+        <a:font script="Syre" typeface="Estrangelo Edessa"/>
+        <a:font script="Sora" typeface="Nirmala UI"/>
+        <a:font script="Tale" typeface="Microsoft Tai Le"/>
+        <a:font script="Talu" typeface="Microsoft New Tai Lue"/>
+        <a:font script="Tfng" typeface="Ebrima"/>
+      </a:minorFont>
+    </a:fontScheme>
+    <a:fmtScheme name="Office">
+      <a:fillStyleLst>
+        <a:solidFill>
+          <a:schemeClr val="phClr"/>
+        </a:solidFill>
+        <a:gradFill rotWithShape="1">
+          <a:gsLst>
+            <a:gs pos="0">
+              <a:schemeClr val="phClr">
+                <a:lumMod val="110000"/>
+                <a:satMod val="105000"/>
+                <a:tint val="67000"/>
+              </a:schemeClr>
+            </a:gs>
+            <a:gs pos="50000">
+              <a:schemeClr val="phClr">
+                <a:lumMod val="105000"/>
+                <a:satMod val="103000"/>
+                <a:tint val="73000"/>
+              </a:schemeClr>
+            </a:gs>
+            <a:gs pos="100000">
+              <a:schemeClr val="phClr">
+                <a:lumMod val="105000"/>
+                <a:satMod val="109000"/>
+                <a:tint val="81000"/>
+              </a:schemeClr>
+            </a:gs>
+          </a:gsLst>
+          <a:lin ang="5400000" scaled="0"/>
+        </a:gradFill>
+        <a:gradFill rotWithShape="1">
+          <a:gsLst>
+            <a:gs pos="0">
+              <a:schemeClr val="phClr">
+                <a:satMod val="103000"/>
+                <a:lumMod val="102000"/>
+                <a:tint val="94000"/>
+              </a:schemeClr>
+            </a:gs>
+            <a:gs pos="50000">
+              <a:schemeClr val="phClr">
+                <a:satMod val="110000"/>
+                <a:lumMod val="100000"/>
+                <a:shade val="100000"/>
+              </a:schemeClr>
+            </a:gs>
+            <a:gs pos="100000">
+              <a:schemeClr val="phClr">
+                <a:lumMod val="99000"/>
+                <a:satMod val="120000"/>
+                <a:shade val="78000"/>
+              </a:schemeClr>
+            </a:gs>
+          </a:gsLst>
+          <a:lin ang="5400000" scaled="0"/>
+        </a:gradFill>
+      </a:fillStyleLst>
+      <a:lnStyleLst>
+        <a:ln w="6350" cap="flat" cmpd="sng" algn="ctr">
+          <a:solidFill>
+            <a:schemeClr val="phClr"/>
+          </a:solidFill>
+          <a:prstDash val="solid"/>
+          <a:miter lim="800000"/>
+        </a:ln>
+        <a:ln w="12700" cap="flat" cmpd="sng" algn="ctr">
+          <a:solidFill>
+            <a:schemeClr val="phClr"/>
+          </a:solidFill>
+          <a:prstDash val="solid"/>
+          <a:miter lim="800000"/>
+        </a:ln>
+        <a:ln w="19050" cap="flat" cmpd="sng" algn="ctr">
+          <a:solidFill>
+            <a:schemeClr val="phClr"/>
+          </a:solidFill>
+          <a:prstDash val="solid"/>
+          <a:miter lim="800000"/>
+        </a:ln>
+      </a:lnStyleLst>
+      <a:effectStyleLst>
+        <a:effectStyle>
+          <a:effectLst/>
+        </a:effectStyle>
+        <a:effectStyle>
+          <a:effectLst/>
+        </a:effectStyle>
+        <a:effectStyle>
+          <a:effectLst>
+            <a:outerShdw blurRad="57150" dist="19050" dir="5400000" algn="ctr" rotWithShape="0">
+              <a:srgbClr val="000000">
+                <a:alpha val="63000"/>
+              </a:srgbClr>
+            </a:outerShdw>
+          </a:effectLst>
+        </a:effectStyle>
+      </a:effectStyleLst>
+      <a:bgFillStyleLst>
+        <a:solidFill>
+          <a:schemeClr val="phClr"/>
+        </a:solidFill>
+        <a:solidFill>
+          <a:schemeClr val="phClr">
+            <a:tint val="95000"/>
+            <a:satMod val="170000"/>
+          </a:schemeClr>
+        </a:solidFill>
+        <a:gradFill rotWithShape="1">
+          <a:gsLst>
+            <a:gs pos="0">
+              <a:schemeClr val="phClr">
+                <a:tint val="93000"/>
+                <a:satMod val="150000"/>
+                <a:shade val="98000"/>
+                <a:lumMod val="102000"/>
+              </a:schemeClr>
+            </a:gs>
+            <a:gs pos="50000">
+              <a:schemeClr val="phClr">
+                <a:tint val="98000"/>
+                <a:satMod val="130000"/>
+                <a:shade val="90000"/>
+                <a:lumMod val="103000"/>
+              </a:schemeClr>
+            </a:gs>
+            <a:gs pos="100000">
+              <a:schemeClr val="phClr">
+                <a:shade val="63000"/>
+                <a:satMod val="120000"/>
+              </a:schemeClr>
+            </a:gs>
+          </a:gsLst>
+          <a:lin ang="5400000" scaled="0"/>
+        </a:gradFill>
+      </a:bgFillStyleLst>
+    </a:fmtScheme>
+  </a:themeElements>
+  <a:objectDefaults/>
+  <a:extraClrSchemeLst/>
+  <a:extLst>
+    <a:ext uri="{05A4C25C-085E-4340-85A3-A5531E510DB2}">
+      <thm15:themeFamily xmlns:thm15="http://schemas.microsoft.com/office/thememl/2012/main" name="Office Theme" id="{62F939B6-93AF-4DB8-9C6B-D6C7DFDC589F}" vid="{4A3C46E8-61CC-4603-A589-7422A47A8E4A}"/>
+    </a:ext>
+  </a:extLst>
+</a:theme>
+</file>
+
 <file path=ppt/theme/themeOverride1.xml><?xml version="1.0" encoding="utf-8"?>
 <a:themeOverride xmlns:a="http://schemas.openxmlformats.org/drawingml/2006/main">
   <a:clrScheme name="Custom 40">
@@ -15699,6 +17875,15 @@
 </file>
 
 <file path=customXml/item2.xml><?xml version="1.0" encoding="utf-8"?>
+<?mso-contentType ?>
+<FormTemplates xmlns="http://schemas.microsoft.com/sharepoint/v3/contenttype/forms">
+  <Display>DocumentLibraryForm</Display>
+  <Edit>DocumentLibraryForm</Edit>
+  <New>DocumentLibraryForm</New>
+</FormTemplates>
+</file>
+
+<file path=customXml/item3.xml><?xml version="1.0" encoding="utf-8"?>
 <ct:contentTypeSchema xmlns:ct="http://schemas.microsoft.com/office/2006/metadata/contentType" xmlns:ma="http://schemas.microsoft.com/office/2006/metadata/properties/metaAttributes" ct:_="" ma:_="" ma:contentTypeName="Document" ma:contentTypeID="0x01010079F111ED35F8CC479449609E8A0923A6" ma:contentTypeVersion="12" ma:contentTypeDescription="Create a new document." ma:contentTypeScope="" ma:versionID="a410dd7f93c95333ffa1b60ed6adedd1">
   <xsd:schema xmlns:xsd="http://www.w3.org/2001/XMLSchema" xmlns:xs="http://www.w3.org/2001/XMLSchema" xmlns:p="http://schemas.microsoft.com/office/2006/metadata/properties" xmlns:ns2="71af3243-3dd4-4a8d-8c0d-dd76da1f02a5" xmlns:ns3="16c05727-aa75-4e4a-9b5f-8a80a1165891" targetNamespace="http://schemas.microsoft.com/office/2006/metadata/properties" ma:root="true" ma:fieldsID="a936d9baba76aa3866493feff160faab" ns2:_="" ns3:_="">
     <xsd:import namespace="71af3243-3dd4-4a8d-8c0d-dd76da1f02a5"/>
@@ -15919,26 +18104,32 @@
 </ct:contentTypeSchema>
 </file>
 
-<file path=customXml/item3.xml><?xml version="1.0" encoding="utf-8"?>
-<?mso-contentType ?>
-<FormTemplates xmlns="http://schemas.microsoft.com/sharepoint/v3/contenttype/forms">
-  <Display>DocumentLibraryForm</Display>
-  <Edit>DocumentLibraryForm</Edit>
-  <New>DocumentLibraryForm</New>
-</FormTemplates>
-</file>
-
 <file path=customXml/itemProps1.xml><?xml version="1.0" encoding="utf-8"?>
 <ds:datastoreItem xmlns:ds="http://schemas.openxmlformats.org/officeDocument/2006/customXml" ds:itemID="{8F3CD65D-61A5-43C9-A837-6EC73C7DA8AB}">
   <ds:schemaRefs>
+    <ds:schemaRef ds:uri="71af3243-3dd4-4a8d-8c0d-dd76da1f02a5"/>
     <ds:schemaRef ds:uri="http://schemas.microsoft.com/office/2006/metadata/properties"/>
+    <ds:schemaRef ds:uri="http://schemas.microsoft.com/office/2006/documentManagement/types"/>
     <ds:schemaRef ds:uri="http://schemas.microsoft.com/office/infopath/2007/PartnerControls"/>
-    <ds:schemaRef ds:uri="71af3243-3dd4-4a8d-8c0d-dd76da1f02a5"/>
+    <ds:schemaRef ds:uri="http://www.w3.org/XML/1998/namespace"/>
+    <ds:schemaRef ds:uri="http://purl.org/dc/elements/1.1/"/>
+    <ds:schemaRef ds:uri="16c05727-aa75-4e4a-9b5f-8a80a1165891"/>
+    <ds:schemaRef ds:uri="http://purl.org/dc/dcmitype/"/>
+    <ds:schemaRef ds:uri="http://schemas.openxmlformats.org/package/2006/metadata/core-properties"/>
+    <ds:schemaRef ds:uri="http://purl.org/dc/terms/"/>
   </ds:schemaRefs>
 </ds:datastoreItem>
 </file>
 
 <file path=customXml/itemProps2.xml><?xml version="1.0" encoding="utf-8"?>
+<ds:datastoreItem xmlns:ds="http://schemas.openxmlformats.org/officeDocument/2006/customXml" ds:itemID="{31F006B4-A9E1-4F39-85C8-FB836F919348}">
+  <ds:schemaRefs>
+    <ds:schemaRef ds:uri="http://schemas.microsoft.com/sharepoint/v3/contenttype/forms"/>
+  </ds:schemaRefs>
+</ds:datastoreItem>
+</file>
+
+<file path=customXml/itemProps3.xml><?xml version="1.0" encoding="utf-8"?>
 <ds:datastoreItem xmlns:ds="http://schemas.openxmlformats.org/officeDocument/2006/customXml" ds:itemID="{16377351-63A1-4C2E-8C9A-66CDD70F16AC}">
   <ds:schemaRefs>
     <ds:schemaRef ds:uri="http://schemas.microsoft.com/office/2006/metadata/contentType"/>
@@ -15955,12 +18146,4 @@
     <ds:schemaRef ds:uri="http://schemas.microsoft.com/internal/obd"/>
   </ds:schemaRefs>
 </ds:datastoreItem>
-</file>
-
-<file path=customXml/itemProps3.xml><?xml version="1.0" encoding="utf-8"?>
-<ds:datastoreItem xmlns:ds="http://schemas.openxmlformats.org/officeDocument/2006/customXml" ds:itemID="{31F006B4-A9E1-4F39-85C8-FB836F919348}">
-  <ds:schemaRefs>
-    <ds:schemaRef ds:uri="http://schemas.microsoft.com/sharepoint/v3/contenttype/forms"/>
-  </ds:schemaRefs>
-</ds:datastoreItem>
 </file>
</xml_diff>